<commit_message>
Started cleaning up to use knitr
</commit_message>
<xml_diff>
--- a/MalcolmCarlsonBeerDataEDA.DDS6306.pptx
+++ b/MalcolmCarlsonBeerDataEDA.DDS6306.pptx
@@ -5,7 +5,7 @@
     <p:sldMasterId id="2147483648" r:id="rId1"/>
   </p:sldMasterIdLst>
   <p:notesMasterIdLst>
-    <p:notesMasterId r:id="rId20"/>
+    <p:notesMasterId r:id="rId23"/>
   </p:notesMasterIdLst>
   <p:sldIdLst>
     <p:sldId id="256" r:id="rId2"/>
@@ -16,16 +16,19 @@
     <p:sldId id="261" r:id="rId7"/>
     <p:sldId id="274" r:id="rId8"/>
     <p:sldId id="262" r:id="rId9"/>
-    <p:sldId id="269" r:id="rId10"/>
-    <p:sldId id="271" r:id="rId11"/>
-    <p:sldId id="272" r:id="rId12"/>
-    <p:sldId id="273" r:id="rId13"/>
-    <p:sldId id="265" r:id="rId14"/>
-    <p:sldId id="270" r:id="rId15"/>
-    <p:sldId id="266" r:id="rId16"/>
-    <p:sldId id="264" r:id="rId17"/>
-    <p:sldId id="263" r:id="rId18"/>
-    <p:sldId id="267" r:id="rId19"/>
+    <p:sldId id="271" r:id="rId10"/>
+    <p:sldId id="272" r:id="rId11"/>
+    <p:sldId id="275" r:id="rId12"/>
+    <p:sldId id="276" r:id="rId13"/>
+    <p:sldId id="277" r:id="rId14"/>
+    <p:sldId id="273" r:id="rId15"/>
+    <p:sldId id="265" r:id="rId16"/>
+    <p:sldId id="270" r:id="rId17"/>
+    <p:sldId id="266" r:id="rId18"/>
+    <p:sldId id="264" r:id="rId19"/>
+    <p:sldId id="263" r:id="rId20"/>
+    <p:sldId id="269" r:id="rId21"/>
+    <p:sldId id="267" r:id="rId22"/>
   </p:sldIdLst>
   <p:sldSz cx="12192000" cy="6858000"/>
   <p:notesSz cx="6858000" cy="9144000"/>
@@ -226,7 +229,7 @@
           <a:p>
             <a:fld id="{A6D10619-A5AD-4FBE-8267-47BE2B1199F7}" type="datetimeFigureOut">
               <a:rPr lang="en-US" smtClean="0"/>
-              <a:t>10/21/2019</a:t>
+              <a:t>10/23/2019</a:t>
             </a:fld>
             <a:endParaRPr lang="en-US"/>
           </a:p>
@@ -1216,7 +1219,7 @@
             <a:fld id="{B61BEF0D-F0BB-DE4B-95CE-6DB70DBA9567}" type="datetimeFigureOut">
               <a:rPr lang="en-US" dirty="0"/>
               <a:pPr/>
-              <a:t>10/21/2019</a:t>
+              <a:t>10/23/2019</a:t>
             </a:fld>
             <a:endParaRPr lang="en-US" dirty="0"/>
           </a:p>
@@ -1464,7 +1467,7 @@
             <a:fld id="{B61BEF0D-F0BB-DE4B-95CE-6DB70DBA9567}" type="datetimeFigureOut">
               <a:rPr lang="en-US" dirty="0"/>
               <a:pPr/>
-              <a:t>10/21/2019</a:t>
+              <a:t>10/23/2019</a:t>
             </a:fld>
             <a:endParaRPr lang="en-US" dirty="0"/>
           </a:p>
@@ -1775,7 +1778,7 @@
             <a:fld id="{B61BEF0D-F0BB-DE4B-95CE-6DB70DBA9567}" type="datetimeFigureOut">
               <a:rPr lang="en-US" dirty="0"/>
               <a:pPr/>
-              <a:t>10/21/2019</a:t>
+              <a:t>10/23/2019</a:t>
             </a:fld>
             <a:endParaRPr lang="en-US" dirty="0"/>
           </a:p>
@@ -2113,7 +2116,7 @@
             <a:fld id="{B61BEF0D-F0BB-DE4B-95CE-6DB70DBA9567}" type="datetimeFigureOut">
               <a:rPr lang="en-US" dirty="0"/>
               <a:pPr/>
-              <a:t>10/21/2019</a:t>
+              <a:t>10/23/2019</a:t>
             </a:fld>
             <a:endParaRPr lang="en-US" dirty="0"/>
           </a:p>
@@ -2424,7 +2427,7 @@
             <a:fld id="{B61BEF0D-F0BB-DE4B-95CE-6DB70DBA9567}" type="datetimeFigureOut">
               <a:rPr lang="en-US" dirty="0"/>
               <a:pPr/>
-              <a:t>10/21/2019</a:t>
+              <a:t>10/23/2019</a:t>
             </a:fld>
             <a:endParaRPr lang="en-US" dirty="0"/>
           </a:p>
@@ -2814,7 +2817,7 @@
             <a:fld id="{B61BEF0D-F0BB-DE4B-95CE-6DB70DBA9567}" type="datetimeFigureOut">
               <a:rPr lang="en-US" dirty="0"/>
               <a:pPr/>
-              <a:t>10/21/2019</a:t>
+              <a:t>10/23/2019</a:t>
             </a:fld>
             <a:endParaRPr lang="en-US" dirty="0"/>
           </a:p>
@@ -2980,7 +2983,7 @@
           <a:p>
             <a:fld id="{55C6B4A9-1611-4792-9094-5F34BCA07E0B}" type="datetimeFigureOut">
               <a:rPr lang="en-US" dirty="0"/>
-              <a:t>10/21/2019</a:t>
+              <a:t>10/23/2019</a:t>
             </a:fld>
             <a:endParaRPr lang="en-US" dirty="0"/>
           </a:p>
@@ -3156,7 +3159,7 @@
             <a:fld id="{B61BEF0D-F0BB-DE4B-95CE-6DB70DBA9567}" type="datetimeFigureOut">
               <a:rPr lang="en-US" dirty="0"/>
               <a:pPr/>
-              <a:t>10/21/2019</a:t>
+              <a:t>10/23/2019</a:t>
             </a:fld>
             <a:endParaRPr lang="en-US" dirty="0"/>
           </a:p>
@@ -3329,7 +3332,7 @@
             <a:fld id="{B61BEF0D-F0BB-DE4B-95CE-6DB70DBA9567}" type="datetimeFigureOut">
               <a:rPr lang="en-US" dirty="0"/>
               <a:pPr/>
-              <a:t>10/21/2019</a:t>
+              <a:t>10/23/2019</a:t>
             </a:fld>
             <a:endParaRPr lang="en-US" dirty="0"/>
           </a:p>
@@ -3573,7 +3576,7 @@
             <a:fld id="{B61BEF0D-F0BB-DE4B-95CE-6DB70DBA9567}" type="datetimeFigureOut">
               <a:rPr lang="en-US" dirty="0"/>
               <a:pPr/>
-              <a:t>10/21/2019</a:t>
+              <a:t>10/23/2019</a:t>
             </a:fld>
             <a:endParaRPr lang="en-US" dirty="0"/>
           </a:p>
@@ -3801,7 +3804,7 @@
           <a:p>
             <a:fld id="{EB712588-04B1-427B-82EE-E8DB90309F08}" type="datetimeFigureOut">
               <a:rPr lang="en-US" dirty="0"/>
-              <a:t>10/21/2019</a:t>
+              <a:t>10/23/2019</a:t>
             </a:fld>
             <a:endParaRPr lang="en-US" dirty="0"/>
           </a:p>
@@ -4171,7 +4174,7 @@
             <a:fld id="{B61BEF0D-F0BB-DE4B-95CE-6DB70DBA9567}" type="datetimeFigureOut">
               <a:rPr lang="en-US" dirty="0"/>
               <a:pPr/>
-              <a:t>10/21/2019</a:t>
+              <a:t>10/23/2019</a:t>
             </a:fld>
             <a:endParaRPr lang="en-US" dirty="0"/>
           </a:p>
@@ -4291,7 +4294,7 @@
             <a:fld id="{B61BEF0D-F0BB-DE4B-95CE-6DB70DBA9567}" type="datetimeFigureOut">
               <a:rPr lang="en-US" dirty="0"/>
               <a:pPr/>
-              <a:t>10/21/2019</a:t>
+              <a:t>10/23/2019</a:t>
             </a:fld>
             <a:endParaRPr lang="en-US" dirty="0"/>
           </a:p>
@@ -4383,7 +4386,7 @@
             <a:fld id="{B61BEF0D-F0BB-DE4B-95CE-6DB70DBA9567}" type="datetimeFigureOut">
               <a:rPr lang="en-US" dirty="0"/>
               <a:pPr/>
-              <a:t>10/21/2019</a:t>
+              <a:t>10/23/2019</a:t>
             </a:fld>
             <a:endParaRPr lang="en-US" dirty="0"/>
           </a:p>
@@ -4634,7 +4637,7 @@
           <a:p>
             <a:fld id="{42A54C80-263E-416B-A8E0-580EDEADCBDC}" type="datetimeFigureOut">
               <a:rPr lang="en-US" dirty="0"/>
-              <a:t>10/21/2019</a:t>
+              <a:t>10/23/2019</a:t>
             </a:fld>
             <a:endParaRPr lang="en-US" dirty="0"/>
           </a:p>
@@ -4893,7 +4896,7 @@
             <a:fld id="{B61BEF0D-F0BB-DE4B-95CE-6DB70DBA9567}" type="datetimeFigureOut">
               <a:rPr lang="en-US" dirty="0"/>
               <a:pPr/>
-              <a:t>10/21/2019</a:t>
+              <a:t>10/23/2019</a:t>
             </a:fld>
             <a:endParaRPr lang="en-US" dirty="0"/>
           </a:p>
@@ -5633,7 +5636,7 @@
             <a:fld id="{B61BEF0D-F0BB-DE4B-95CE-6DB70DBA9567}" type="datetimeFigureOut">
               <a:rPr lang="en-US" dirty="0"/>
               <a:pPr/>
-              <a:t>10/21/2019</a:t>
+              <a:t>10/23/2019</a:t>
             </a:fld>
             <a:endParaRPr lang="en-US" dirty="0"/>
           </a:p>
@@ -6275,7 +6278,7 @@
           <p:cNvPr id="2" name="Title 1">
             <a:extLst>
               <a:ext uri="{FF2B5EF4-FFF2-40B4-BE49-F238E27FC236}">
-                <a16:creationId xmlns:a16="http://schemas.microsoft.com/office/drawing/2014/main" id="{9A80211F-D10D-461A-9C13-62348DA09BF3}"/>
+                <a16:creationId xmlns:a16="http://schemas.microsoft.com/office/drawing/2014/main" id="{60F64C4D-1802-413A-ABAD-782AE74CB4A4}"/>
               </a:ext>
             </a:extLst>
           </p:cNvPr>
@@ -6293,57 +6296,40 @@
           <a:p>
             <a:r>
               <a:rPr lang="en-US" dirty="0"/>
-              <a:t>Alcohol by Volume and </a:t>
-            </a:r>
-            <a:br>
-              <a:rPr lang="en-US" dirty="0"/>
-            </a:br>
-            <a:r>
-              <a:rPr lang="en-US" dirty="0"/>
-              <a:t>International Bitterness Units by Style</a:t>
-            </a:r>
-          </a:p>
-        </p:txBody>
-      </p:sp>
-      <p:pic>
-        <p:nvPicPr>
-          <p:cNvPr id="4" name="Content Placeholder 4" descr="A screenshot of a cell phone&#10;&#10;Description automatically generated">
+              <a:t>KNN Investigation between IPAs and other ALEs</a:t>
+            </a:r>
+          </a:p>
+        </p:txBody>
+      </p:sp>
+      <p:sp>
+        <p:nvSpPr>
+          <p:cNvPr id="3" name="Content Placeholder 2">
             <a:extLst>
               <a:ext uri="{FF2B5EF4-FFF2-40B4-BE49-F238E27FC236}">
-                <a16:creationId xmlns:a16="http://schemas.microsoft.com/office/drawing/2014/main" id="{636F93D3-8DBE-411A-BFEE-DAE8908DD57E}"/>
+                <a16:creationId xmlns:a16="http://schemas.microsoft.com/office/drawing/2014/main" id="{794A5E61-C420-444D-94D9-9A1CEBF3B1C1}"/>
               </a:ext>
             </a:extLst>
           </p:cNvPr>
-          <p:cNvPicPr>
-            <a:picLocks noGrp="1" noChangeAspect="1"/>
-          </p:cNvPicPr>
+          <p:cNvSpPr>
+            <a:spLocks noGrp="1"/>
+          </p:cNvSpPr>
           <p:nvPr>
             <p:ph idx="1"/>
           </p:nvPr>
-        </p:nvPicPr>
-        <p:blipFill>
-          <a:blip r:embed="rId2">
-            <a:extLst>
-              <a:ext uri="{28A0092B-C50C-407E-A947-70E740481C1C}">
-                <a14:useLocalDpi xmlns:a14="http://schemas.microsoft.com/office/drawing/2010/main" val="0"/>
-              </a:ext>
-            </a:extLst>
-          </a:blip>
-          <a:stretch>
-            <a:fillRect/>
-          </a:stretch>
-        </p:blipFill>
-        <p:spPr>
-          <a:xfrm>
-            <a:off x="1692075" y="2450661"/>
-            <a:ext cx="6567185" cy="3797739"/>
-          </a:xfrm>
-        </p:spPr>
-      </p:pic>
+        </p:nvSpPr>
+        <p:spPr/>
+        <p:txBody>
+          <a:bodyPr/>
+          <a:lstStyle/>
+          <a:p>
+            <a:endParaRPr lang="en-US" dirty="0"/>
+          </a:p>
+        </p:txBody>
+      </p:sp>
     </p:spTree>
     <p:extLst>
       <p:ext uri="{BB962C8B-B14F-4D97-AF65-F5344CB8AC3E}">
-        <p14:creationId xmlns:p14="http://schemas.microsoft.com/office/powerpoint/2010/main" val="1598884026"/>
+        <p14:creationId xmlns:p14="http://schemas.microsoft.com/office/powerpoint/2010/main" val="2540766281"/>
       </p:ext>
     </p:extLst>
   </p:cSld>
@@ -6375,7 +6361,7 @@
           <p:cNvPr id="2" name="Title 1">
             <a:extLst>
               <a:ext uri="{FF2B5EF4-FFF2-40B4-BE49-F238E27FC236}">
-                <a16:creationId xmlns:a16="http://schemas.microsoft.com/office/drawing/2014/main" id="{60F64C4D-1802-413A-ABAD-782AE74CB4A4}"/>
+                <a16:creationId xmlns:a16="http://schemas.microsoft.com/office/drawing/2014/main" id="{BFB958DD-223E-42B2-AC6E-8A7A97B29625}"/>
               </a:ext>
             </a:extLst>
           </p:cNvPr>
@@ -6391,42 +6377,78 @@
           <a:bodyPr/>
           <a:lstStyle/>
           <a:p>
+            <a:pPr algn="ctr"/>
             <a:r>
               <a:rPr lang="en-US" dirty="0"/>
-              <a:t>KNN Investigation between IPAs and other ALEs</a:t>
-            </a:r>
-          </a:p>
-        </p:txBody>
-      </p:sp>
-      <p:sp>
-        <p:nvSpPr>
-          <p:cNvPr id="3" name="Content Placeholder 2">
+              <a:t>North Eastern Region – Top Ten Beer Styles</a:t>
+            </a:r>
+          </a:p>
+        </p:txBody>
+      </p:sp>
+      <p:pic>
+        <p:nvPicPr>
+          <p:cNvPr id="4" name="Picture 3">
             <a:extLst>
               <a:ext uri="{FF2B5EF4-FFF2-40B4-BE49-F238E27FC236}">
-                <a16:creationId xmlns:a16="http://schemas.microsoft.com/office/drawing/2014/main" id="{794A5E61-C420-444D-94D9-9A1CEBF3B1C1}"/>
+                <a16:creationId xmlns:a16="http://schemas.microsoft.com/office/drawing/2014/main" id="{8C214703-6ECE-48B9-8C45-87F9E8BC0816}"/>
               </a:ext>
             </a:extLst>
           </p:cNvPr>
-          <p:cNvSpPr>
-            <a:spLocks noGrp="1"/>
-          </p:cNvSpPr>
-          <p:nvPr>
-            <p:ph idx="1"/>
-          </p:nvPr>
-        </p:nvSpPr>
-        <p:spPr/>
-        <p:txBody>
-          <a:bodyPr/>
-          <a:lstStyle/>
-          <a:p>
-            <a:endParaRPr lang="en-US" dirty="0"/>
-          </a:p>
-        </p:txBody>
-      </p:sp>
+          <p:cNvPicPr>
+            <a:picLocks noChangeAspect="1"/>
+          </p:cNvPicPr>
+          <p:nvPr/>
+        </p:nvPicPr>
+        <p:blipFill>
+          <a:blip r:embed="rId2"/>
+          <a:stretch>
+            <a:fillRect/>
+          </a:stretch>
+        </p:blipFill>
+        <p:spPr>
+          <a:xfrm>
+            <a:off x="1792150" y="2108818"/>
+            <a:ext cx="2092377" cy="2932076"/>
+          </a:xfrm>
+          <a:prstGeom prst="rect">
+            <a:avLst/>
+          </a:prstGeom>
+        </p:spPr>
+      </p:pic>
+      <p:pic>
+        <p:nvPicPr>
+          <p:cNvPr id="5" name="Picture 4">
+            <a:extLst>
+              <a:ext uri="{FF2B5EF4-FFF2-40B4-BE49-F238E27FC236}">
+                <a16:creationId xmlns:a16="http://schemas.microsoft.com/office/drawing/2014/main" id="{3B657AA3-5204-43D5-84C5-2D85BBAECD54}"/>
+              </a:ext>
+            </a:extLst>
+          </p:cNvPr>
+          <p:cNvPicPr>
+            <a:picLocks noChangeAspect="1"/>
+          </p:cNvPicPr>
+          <p:nvPr/>
+        </p:nvPicPr>
+        <p:blipFill>
+          <a:blip r:embed="rId3"/>
+          <a:stretch>
+            <a:fillRect/>
+          </a:stretch>
+        </p:blipFill>
+        <p:spPr>
+          <a:xfrm>
+            <a:off x="4494239" y="2108818"/>
+            <a:ext cx="4779763" cy="2952489"/>
+          </a:xfrm>
+          <a:prstGeom prst="rect">
+            <a:avLst/>
+          </a:prstGeom>
+        </p:spPr>
+      </p:pic>
     </p:spTree>
     <p:extLst>
       <p:ext uri="{BB962C8B-B14F-4D97-AF65-F5344CB8AC3E}">
-        <p14:creationId xmlns:p14="http://schemas.microsoft.com/office/powerpoint/2010/main" val="2540766281"/>
+        <p14:creationId xmlns:p14="http://schemas.microsoft.com/office/powerpoint/2010/main" val="2643732790"/>
       </p:ext>
     </p:extLst>
   </p:cSld>
@@ -6458,7 +6480,7 @@
           <p:cNvPr id="2" name="Title 1">
             <a:extLst>
               <a:ext uri="{FF2B5EF4-FFF2-40B4-BE49-F238E27FC236}">
-                <a16:creationId xmlns:a16="http://schemas.microsoft.com/office/drawing/2014/main" id="{7D6FC849-78FF-4EAD-9778-F385D6B86F75}"/>
+                <a16:creationId xmlns:a16="http://schemas.microsoft.com/office/drawing/2014/main" id="{3A523DE7-CA85-4037-9A22-B2BA58B78361}"/>
               </a:ext>
             </a:extLst>
           </p:cNvPr>
@@ -6476,70 +6498,75 @@
           <a:p>
             <a:r>
               <a:rPr lang="en-US" dirty="0"/>
-              <a:t>Regional Study:  Beer Styles, ABV and IBU</a:t>
-            </a:r>
-          </a:p>
-        </p:txBody>
-      </p:sp>
-      <p:sp>
-        <p:nvSpPr>
-          <p:cNvPr id="3" name="Content Placeholder 2">
+              <a:t>Midwest Region: Top 10 Beer Styles</a:t>
+            </a:r>
+          </a:p>
+        </p:txBody>
+      </p:sp>
+      <p:pic>
+        <p:nvPicPr>
+          <p:cNvPr id="4" name="Picture 3">
             <a:extLst>
               <a:ext uri="{FF2B5EF4-FFF2-40B4-BE49-F238E27FC236}">
-                <a16:creationId xmlns:a16="http://schemas.microsoft.com/office/drawing/2014/main" id="{7BBB27BC-A03B-4BBB-BF11-48DDB5D54DDA}"/>
+                <a16:creationId xmlns:a16="http://schemas.microsoft.com/office/drawing/2014/main" id="{D21277BD-9A59-4CFE-8F47-AAFFC542EC06}"/>
               </a:ext>
             </a:extLst>
           </p:cNvPr>
-          <p:cNvSpPr>
-            <a:spLocks noGrp="1"/>
-          </p:cNvSpPr>
-          <p:nvPr>
-            <p:ph idx="1"/>
-          </p:nvPr>
-        </p:nvSpPr>
-        <p:spPr/>
-        <p:txBody>
-          <a:bodyPr/>
-          <a:lstStyle/>
-          <a:p>
-            <a:r>
-              <a:rPr lang="en-US" dirty="0"/>
-              <a:t>The beer data was broken up into five regions:  Northeast, North Central, Midwest, South and West.</a:t>
-            </a:r>
-          </a:p>
-          <a:p>
-            <a:r>
-              <a:rPr lang="en-US" dirty="0"/>
-              <a:t>Key metrics</a:t>
-            </a:r>
-          </a:p>
-          <a:p>
-            <a:pPr lvl="1"/>
-            <a:r>
-              <a:rPr lang="en-US" dirty="0"/>
-              <a:t>Northeast</a:t>
-            </a:r>
-          </a:p>
-          <a:p>
-            <a:pPr lvl="2"/>
-            <a:r>
-              <a:rPr lang="en-US" dirty="0"/>
-              <a:t>Most popular beer style(as measured by number of offerings)</a:t>
-            </a:r>
-          </a:p>
-          <a:p>
-            <a:pPr lvl="2"/>
-            <a:r>
-              <a:rPr lang="en-US" dirty="0"/>
-              <a:t>Leas popular</a:t>
-            </a:r>
-          </a:p>
-        </p:txBody>
-      </p:sp>
+          <p:cNvPicPr>
+            <a:picLocks noChangeAspect="1"/>
+          </p:cNvPicPr>
+          <p:nvPr/>
+        </p:nvPicPr>
+        <p:blipFill>
+          <a:blip r:embed="rId2"/>
+          <a:stretch>
+            <a:fillRect/>
+          </a:stretch>
+        </p:blipFill>
+        <p:spPr>
+          <a:xfrm>
+            <a:off x="4308277" y="1989110"/>
+            <a:ext cx="5140524" cy="3175334"/>
+          </a:xfrm>
+          <a:prstGeom prst="rect">
+            <a:avLst/>
+          </a:prstGeom>
+        </p:spPr>
+      </p:pic>
+      <p:pic>
+        <p:nvPicPr>
+          <p:cNvPr id="5" name="Picture 4">
+            <a:extLst>
+              <a:ext uri="{FF2B5EF4-FFF2-40B4-BE49-F238E27FC236}">
+                <a16:creationId xmlns:a16="http://schemas.microsoft.com/office/drawing/2014/main" id="{6C132B9E-7ED1-49DD-80D4-98B9263EB9DC}"/>
+              </a:ext>
+            </a:extLst>
+          </p:cNvPr>
+          <p:cNvPicPr>
+            <a:picLocks noChangeAspect="1"/>
+          </p:cNvPicPr>
+          <p:nvPr/>
+        </p:nvPicPr>
+        <p:blipFill>
+          <a:blip r:embed="rId3"/>
+          <a:stretch>
+            <a:fillRect/>
+          </a:stretch>
+        </p:blipFill>
+        <p:spPr>
+          <a:xfrm>
+            <a:off x="1748753" y="2178916"/>
+            <a:ext cx="2130521" cy="2985528"/>
+          </a:xfrm>
+          <a:prstGeom prst="rect">
+            <a:avLst/>
+          </a:prstGeom>
+        </p:spPr>
+      </p:pic>
     </p:spTree>
     <p:extLst>
       <p:ext uri="{BB962C8B-B14F-4D97-AF65-F5344CB8AC3E}">
-        <p14:creationId xmlns:p14="http://schemas.microsoft.com/office/powerpoint/2010/main" val="625987431"/>
+        <p14:creationId xmlns:p14="http://schemas.microsoft.com/office/powerpoint/2010/main" val="916509845"/>
       </p:ext>
     </p:extLst>
   </p:cSld>
@@ -6571,7 +6598,7 @@
           <p:cNvPr id="2" name="Title 1">
             <a:extLst>
               <a:ext uri="{FF2B5EF4-FFF2-40B4-BE49-F238E27FC236}">
-                <a16:creationId xmlns:a16="http://schemas.microsoft.com/office/drawing/2014/main" id="{F69C8142-A23F-4F98-A5BB-4318843625FA}"/>
+                <a16:creationId xmlns:a16="http://schemas.microsoft.com/office/drawing/2014/main" id="{98AEDA8E-1111-461D-9BDC-ABEE8E229C11}"/>
               </a:ext>
             </a:extLst>
           </p:cNvPr>
@@ -6589,40 +6616,75 @@
           <a:p>
             <a:r>
               <a:rPr lang="en-US" dirty="0"/>
-              <a:t>Thank You for your Time!</a:t>
-            </a:r>
-          </a:p>
-        </p:txBody>
-      </p:sp>
-      <p:sp>
-        <p:nvSpPr>
-          <p:cNvPr id="3" name="Content Placeholder 2">
+              <a:t>South Region:  Top Ten Beer Styles</a:t>
+            </a:r>
+          </a:p>
+        </p:txBody>
+      </p:sp>
+      <p:pic>
+        <p:nvPicPr>
+          <p:cNvPr id="4" name="Picture 3">
             <a:extLst>
               <a:ext uri="{FF2B5EF4-FFF2-40B4-BE49-F238E27FC236}">
-                <a16:creationId xmlns:a16="http://schemas.microsoft.com/office/drawing/2014/main" id="{8C0C09CA-ACFC-4500-92FC-07CAF0572B09}"/>
+                <a16:creationId xmlns:a16="http://schemas.microsoft.com/office/drawing/2014/main" id="{2DFE0069-AD9E-48EF-9784-7CC69F29ACD3}"/>
               </a:ext>
             </a:extLst>
           </p:cNvPr>
-          <p:cNvSpPr>
-            <a:spLocks noGrp="1"/>
-          </p:cNvSpPr>
-          <p:nvPr>
-            <p:ph idx="1"/>
-          </p:nvPr>
-        </p:nvSpPr>
-        <p:spPr/>
-        <p:txBody>
-          <a:bodyPr/>
-          <a:lstStyle/>
-          <a:p>
-            <a:endParaRPr lang="en-US"/>
-          </a:p>
-        </p:txBody>
-      </p:sp>
+          <p:cNvPicPr>
+            <a:picLocks noChangeAspect="1"/>
+          </p:cNvPicPr>
+          <p:nvPr/>
+        </p:nvPicPr>
+        <p:blipFill>
+          <a:blip r:embed="rId2"/>
+          <a:stretch>
+            <a:fillRect/>
+          </a:stretch>
+        </p:blipFill>
+        <p:spPr>
+          <a:xfrm>
+            <a:off x="4468150" y="2321622"/>
+            <a:ext cx="4931187" cy="3046025"/>
+          </a:xfrm>
+          <a:prstGeom prst="rect">
+            <a:avLst/>
+          </a:prstGeom>
+        </p:spPr>
+      </p:pic>
+      <p:pic>
+        <p:nvPicPr>
+          <p:cNvPr id="5" name="Picture 4">
+            <a:extLst>
+              <a:ext uri="{FF2B5EF4-FFF2-40B4-BE49-F238E27FC236}">
+                <a16:creationId xmlns:a16="http://schemas.microsoft.com/office/drawing/2014/main" id="{B1079D20-055D-481D-AA2E-CBDD98EC701D}"/>
+              </a:ext>
+            </a:extLst>
+          </p:cNvPr>
+          <p:cNvPicPr>
+            <a:picLocks noChangeAspect="1"/>
+          </p:cNvPicPr>
+          <p:nvPr/>
+        </p:nvPicPr>
+        <p:blipFill>
+          <a:blip r:embed="rId3"/>
+          <a:stretch>
+            <a:fillRect/>
+          </a:stretch>
+        </p:blipFill>
+        <p:spPr>
+          <a:xfrm>
+            <a:off x="1672710" y="2226337"/>
+            <a:ext cx="2239906" cy="3236593"/>
+          </a:xfrm>
+          <a:prstGeom prst="rect">
+            <a:avLst/>
+          </a:prstGeom>
+        </p:spPr>
+      </p:pic>
     </p:spTree>
     <p:extLst>
       <p:ext uri="{BB962C8B-B14F-4D97-AF65-F5344CB8AC3E}">
-        <p14:creationId xmlns:p14="http://schemas.microsoft.com/office/powerpoint/2010/main" val="2620854637"/>
+        <p14:creationId xmlns:p14="http://schemas.microsoft.com/office/powerpoint/2010/main" val="547640249"/>
       </p:ext>
     </p:extLst>
   </p:cSld>
@@ -6654,7 +6716,7 @@
           <p:cNvPr id="2" name="Title 1">
             <a:extLst>
               <a:ext uri="{FF2B5EF4-FFF2-40B4-BE49-F238E27FC236}">
-                <a16:creationId xmlns:a16="http://schemas.microsoft.com/office/drawing/2014/main" id="{A51CAD72-9D39-4447-9D33-E6C0849A74F0}"/>
+                <a16:creationId xmlns:a16="http://schemas.microsoft.com/office/drawing/2014/main" id="{7D6FC849-78FF-4EAD-9778-F385D6B86F75}"/>
               </a:ext>
             </a:extLst>
           </p:cNvPr>
@@ -6670,42 +6732,78 @@
           <a:bodyPr/>
           <a:lstStyle/>
           <a:p>
+            <a:pPr algn="ctr"/>
             <a:r>
               <a:rPr lang="en-US" dirty="0"/>
-              <a:t>Backup</a:t>
-            </a:r>
-          </a:p>
-        </p:txBody>
-      </p:sp>
-      <p:sp>
-        <p:nvSpPr>
-          <p:cNvPr id="3" name="Content Placeholder 2">
+              <a:t>Western Region – Top 10 Beer Styles</a:t>
+            </a:r>
+          </a:p>
+        </p:txBody>
+      </p:sp>
+      <p:pic>
+        <p:nvPicPr>
+          <p:cNvPr id="6" name="Picture 5">
             <a:extLst>
               <a:ext uri="{FF2B5EF4-FFF2-40B4-BE49-F238E27FC236}">
-                <a16:creationId xmlns:a16="http://schemas.microsoft.com/office/drawing/2014/main" id="{161CB13F-AB08-4B5E-B535-EDEE9F95A8D1}"/>
+                <a16:creationId xmlns:a16="http://schemas.microsoft.com/office/drawing/2014/main" id="{AC3B3065-FA90-4FAA-8457-281FBC1A377A}"/>
               </a:ext>
             </a:extLst>
           </p:cNvPr>
-          <p:cNvSpPr>
-            <a:spLocks noGrp="1"/>
-          </p:cNvSpPr>
-          <p:nvPr>
-            <p:ph idx="1"/>
-          </p:nvPr>
-        </p:nvSpPr>
-        <p:spPr/>
-        <p:txBody>
-          <a:bodyPr/>
-          <a:lstStyle/>
-          <a:p>
-            <a:endParaRPr lang="en-US"/>
-          </a:p>
-        </p:txBody>
-      </p:sp>
+          <p:cNvPicPr>
+            <a:picLocks noChangeAspect="1"/>
+          </p:cNvPicPr>
+          <p:nvPr/>
+        </p:nvPicPr>
+        <p:blipFill>
+          <a:blip r:embed="rId2"/>
+          <a:stretch>
+            <a:fillRect/>
+          </a:stretch>
+        </p:blipFill>
+        <p:spPr>
+          <a:xfrm>
+            <a:off x="3723382" y="1930400"/>
+            <a:ext cx="5550620" cy="3428653"/>
+          </a:xfrm>
+          <a:prstGeom prst="rect">
+            <a:avLst/>
+          </a:prstGeom>
+        </p:spPr>
+      </p:pic>
+      <p:pic>
+        <p:nvPicPr>
+          <p:cNvPr id="9" name="Picture 8">
+            <a:extLst>
+              <a:ext uri="{FF2B5EF4-FFF2-40B4-BE49-F238E27FC236}">
+                <a16:creationId xmlns:a16="http://schemas.microsoft.com/office/drawing/2014/main" id="{CAAC9CC9-1E4E-479D-9D9E-300FD90FBA0A}"/>
+              </a:ext>
+            </a:extLst>
+          </p:cNvPr>
+          <p:cNvPicPr>
+            <a:picLocks noChangeAspect="1"/>
+          </p:cNvPicPr>
+          <p:nvPr/>
+        </p:nvPicPr>
+        <p:blipFill>
+          <a:blip r:embed="rId3"/>
+          <a:stretch>
+            <a:fillRect/>
+          </a:stretch>
+        </p:blipFill>
+        <p:spPr>
+          <a:xfrm>
+            <a:off x="1818826" y="2054349"/>
+            <a:ext cx="2072193" cy="2903792"/>
+          </a:xfrm>
+          <a:prstGeom prst="rect">
+            <a:avLst/>
+          </a:prstGeom>
+        </p:spPr>
+      </p:pic>
     </p:spTree>
     <p:extLst>
       <p:ext uri="{BB962C8B-B14F-4D97-AF65-F5344CB8AC3E}">
-        <p14:creationId xmlns:p14="http://schemas.microsoft.com/office/powerpoint/2010/main" val="798485300"/>
+        <p14:creationId xmlns:p14="http://schemas.microsoft.com/office/powerpoint/2010/main" val="625987431"/>
       </p:ext>
     </p:extLst>
   </p:cSld>
@@ -6737,6 +6835,172 @@
           <p:cNvPr id="2" name="Title 1">
             <a:extLst>
               <a:ext uri="{FF2B5EF4-FFF2-40B4-BE49-F238E27FC236}">
+                <a16:creationId xmlns:a16="http://schemas.microsoft.com/office/drawing/2014/main" id="{F69C8142-A23F-4F98-A5BB-4318843625FA}"/>
+              </a:ext>
+            </a:extLst>
+          </p:cNvPr>
+          <p:cNvSpPr>
+            <a:spLocks noGrp="1"/>
+          </p:cNvSpPr>
+          <p:nvPr>
+            <p:ph type="title"/>
+          </p:nvPr>
+        </p:nvSpPr>
+        <p:spPr/>
+        <p:txBody>
+          <a:bodyPr/>
+          <a:lstStyle/>
+          <a:p>
+            <a:r>
+              <a:rPr lang="en-US" dirty="0"/>
+              <a:t>Thank You for your Time!</a:t>
+            </a:r>
+          </a:p>
+        </p:txBody>
+      </p:sp>
+      <p:sp>
+        <p:nvSpPr>
+          <p:cNvPr id="3" name="Content Placeholder 2">
+            <a:extLst>
+              <a:ext uri="{FF2B5EF4-FFF2-40B4-BE49-F238E27FC236}">
+                <a16:creationId xmlns:a16="http://schemas.microsoft.com/office/drawing/2014/main" id="{8C0C09CA-ACFC-4500-92FC-07CAF0572B09}"/>
+              </a:ext>
+            </a:extLst>
+          </p:cNvPr>
+          <p:cNvSpPr>
+            <a:spLocks noGrp="1"/>
+          </p:cNvSpPr>
+          <p:nvPr>
+            <p:ph idx="1"/>
+          </p:nvPr>
+        </p:nvSpPr>
+        <p:spPr/>
+        <p:txBody>
+          <a:bodyPr/>
+          <a:lstStyle/>
+          <a:p>
+            <a:endParaRPr lang="en-US"/>
+          </a:p>
+        </p:txBody>
+      </p:sp>
+    </p:spTree>
+    <p:extLst>
+      <p:ext uri="{BB962C8B-B14F-4D97-AF65-F5344CB8AC3E}">
+        <p14:creationId xmlns:p14="http://schemas.microsoft.com/office/powerpoint/2010/main" val="2620854637"/>
+      </p:ext>
+    </p:extLst>
+  </p:cSld>
+  <p:clrMapOvr>
+    <a:masterClrMapping/>
+  </p:clrMapOvr>
+</p:sld>
+</file>
+
+<file path=ppt/slides/slide16.xml><?xml version="1.0" encoding="utf-8"?>
+<p:sld xmlns:a="http://schemas.openxmlformats.org/drawingml/2006/main" xmlns:r="http://schemas.openxmlformats.org/officeDocument/2006/relationships" xmlns:p="http://schemas.openxmlformats.org/presentationml/2006/main">
+  <p:cSld>
+    <p:spTree>
+      <p:nvGrpSpPr>
+        <p:cNvPr id="1" name=""/>
+        <p:cNvGrpSpPr/>
+        <p:nvPr/>
+      </p:nvGrpSpPr>
+      <p:grpSpPr>
+        <a:xfrm>
+          <a:off x="0" y="0"/>
+          <a:ext cx="0" cy="0"/>
+          <a:chOff x="0" y="0"/>
+          <a:chExt cx="0" cy="0"/>
+        </a:xfrm>
+      </p:grpSpPr>
+      <p:sp>
+        <p:nvSpPr>
+          <p:cNvPr id="2" name="Title 1">
+            <a:extLst>
+              <a:ext uri="{FF2B5EF4-FFF2-40B4-BE49-F238E27FC236}">
+                <a16:creationId xmlns:a16="http://schemas.microsoft.com/office/drawing/2014/main" id="{A51CAD72-9D39-4447-9D33-E6C0849A74F0}"/>
+              </a:ext>
+            </a:extLst>
+          </p:cNvPr>
+          <p:cNvSpPr>
+            <a:spLocks noGrp="1"/>
+          </p:cNvSpPr>
+          <p:nvPr>
+            <p:ph type="title"/>
+          </p:nvPr>
+        </p:nvSpPr>
+        <p:spPr/>
+        <p:txBody>
+          <a:bodyPr/>
+          <a:lstStyle/>
+          <a:p>
+            <a:r>
+              <a:rPr lang="en-US" dirty="0"/>
+              <a:t>Backup</a:t>
+            </a:r>
+          </a:p>
+        </p:txBody>
+      </p:sp>
+      <p:sp>
+        <p:nvSpPr>
+          <p:cNvPr id="3" name="Content Placeholder 2">
+            <a:extLst>
+              <a:ext uri="{FF2B5EF4-FFF2-40B4-BE49-F238E27FC236}">
+                <a16:creationId xmlns:a16="http://schemas.microsoft.com/office/drawing/2014/main" id="{161CB13F-AB08-4B5E-B535-EDEE9F95A8D1}"/>
+              </a:ext>
+            </a:extLst>
+          </p:cNvPr>
+          <p:cNvSpPr>
+            <a:spLocks noGrp="1"/>
+          </p:cNvSpPr>
+          <p:nvPr>
+            <p:ph idx="1"/>
+          </p:nvPr>
+        </p:nvSpPr>
+        <p:spPr/>
+        <p:txBody>
+          <a:bodyPr/>
+          <a:lstStyle/>
+          <a:p>
+            <a:endParaRPr lang="en-US"/>
+          </a:p>
+        </p:txBody>
+      </p:sp>
+    </p:spTree>
+    <p:extLst>
+      <p:ext uri="{BB962C8B-B14F-4D97-AF65-F5344CB8AC3E}">
+        <p14:creationId xmlns:p14="http://schemas.microsoft.com/office/powerpoint/2010/main" val="798485300"/>
+      </p:ext>
+    </p:extLst>
+  </p:cSld>
+  <p:clrMapOvr>
+    <a:masterClrMapping/>
+  </p:clrMapOvr>
+</p:sld>
+</file>
+
+<file path=ppt/slides/slide17.xml><?xml version="1.0" encoding="utf-8"?>
+<p:sld xmlns:a="http://schemas.openxmlformats.org/drawingml/2006/main" xmlns:r="http://schemas.openxmlformats.org/officeDocument/2006/relationships" xmlns:p="http://schemas.openxmlformats.org/presentationml/2006/main">
+  <p:cSld>
+    <p:spTree>
+      <p:nvGrpSpPr>
+        <p:cNvPr id="1" name=""/>
+        <p:cNvGrpSpPr/>
+        <p:nvPr/>
+      </p:nvGrpSpPr>
+      <p:grpSpPr>
+        <a:xfrm>
+          <a:off x="0" y="0"/>
+          <a:ext cx="0" cy="0"/>
+          <a:chOff x="0" y="0"/>
+          <a:chExt cx="0" cy="0"/>
+        </a:xfrm>
+      </p:grpSpPr>
+      <p:sp>
+        <p:nvSpPr>
+          <p:cNvPr id="2" name="Title 1">
+            <a:extLst>
+              <a:ext uri="{FF2B5EF4-FFF2-40B4-BE49-F238E27FC236}">
                 <a16:creationId xmlns:a16="http://schemas.microsoft.com/office/drawing/2014/main" id="{D9D0F948-B4C6-422F-9E04-43BB3ED65E27}"/>
               </a:ext>
             </a:extLst>
@@ -6823,7 +7087,7 @@
 </p:sld>
 </file>
 
-<file path=ppt/slides/slide16.xml><?xml version="1.0" encoding="utf-8"?>
+<file path=ppt/slides/slide18.xml><?xml version="1.0" encoding="utf-8"?>
 <p:sld xmlns:a="http://schemas.openxmlformats.org/drawingml/2006/main" xmlns:r="http://schemas.openxmlformats.org/officeDocument/2006/relationships" xmlns:p="http://schemas.openxmlformats.org/presentationml/2006/main">
   <p:cSld>
     <p:spTree>
@@ -6964,7 +7228,7 @@
 </p:sld>
 </file>
 
-<file path=ppt/slides/slide17.xml><?xml version="1.0" encoding="utf-8"?>
+<file path=ppt/slides/slide19.xml><?xml version="1.0" encoding="utf-8"?>
 <p:sld xmlns:a="http://schemas.openxmlformats.org/drawingml/2006/main" xmlns:r="http://schemas.openxmlformats.org/officeDocument/2006/relationships" xmlns:p="http://schemas.openxmlformats.org/presentationml/2006/main">
   <p:cSld>
     <p:spTree>
@@ -7113,92 +7377,6 @@
     <p:extLst>
       <p:ext uri="{BB962C8B-B14F-4D97-AF65-F5344CB8AC3E}">
         <p14:creationId xmlns:p14="http://schemas.microsoft.com/office/powerpoint/2010/main" val="3504272927"/>
-      </p:ext>
-    </p:extLst>
-  </p:cSld>
-  <p:clrMapOvr>
-    <a:masterClrMapping/>
-  </p:clrMapOvr>
-</p:sld>
-</file>
-
-<file path=ppt/slides/slide18.xml><?xml version="1.0" encoding="utf-8"?>
-<p:sld xmlns:a="http://schemas.openxmlformats.org/drawingml/2006/main" xmlns:r="http://schemas.openxmlformats.org/officeDocument/2006/relationships" xmlns:p="http://schemas.openxmlformats.org/presentationml/2006/main">
-  <p:cSld>
-    <p:spTree>
-      <p:nvGrpSpPr>
-        <p:cNvPr id="1" name=""/>
-        <p:cNvGrpSpPr/>
-        <p:nvPr/>
-      </p:nvGrpSpPr>
-      <p:grpSpPr>
-        <a:xfrm>
-          <a:off x="0" y="0"/>
-          <a:ext cx="0" cy="0"/>
-          <a:chOff x="0" y="0"/>
-          <a:chExt cx="0" cy="0"/>
-        </a:xfrm>
-      </p:grpSpPr>
-      <p:sp>
-        <p:nvSpPr>
-          <p:cNvPr id="2" name="Title 1">
-            <a:extLst>
-              <a:ext uri="{FF2B5EF4-FFF2-40B4-BE49-F238E27FC236}">
-                <a16:creationId xmlns:a16="http://schemas.microsoft.com/office/drawing/2014/main" id="{BA749432-A29A-4F12-8BE8-C8FBC3068259}"/>
-              </a:ext>
-            </a:extLst>
-          </p:cNvPr>
-          <p:cNvSpPr>
-            <a:spLocks noGrp="1"/>
-          </p:cNvSpPr>
-          <p:nvPr>
-            <p:ph type="title"/>
-          </p:nvPr>
-        </p:nvSpPr>
-        <p:spPr/>
-        <p:txBody>
-          <a:bodyPr/>
-          <a:lstStyle/>
-          <a:p>
-            <a:r>
-              <a:rPr lang="en-US" dirty="0"/>
-              <a:t>Feedback</a:t>
-            </a:r>
-          </a:p>
-        </p:txBody>
-      </p:sp>
-      <p:sp>
-        <p:nvSpPr>
-          <p:cNvPr id="3" name="Content Placeholder 2">
-            <a:extLst>
-              <a:ext uri="{FF2B5EF4-FFF2-40B4-BE49-F238E27FC236}">
-                <a16:creationId xmlns:a16="http://schemas.microsoft.com/office/drawing/2014/main" id="{C18616BF-1EE1-4D1D-B109-7232B6B652F3}"/>
-              </a:ext>
-            </a:extLst>
-          </p:cNvPr>
-          <p:cNvSpPr>
-            <a:spLocks noGrp="1"/>
-          </p:cNvSpPr>
-          <p:nvPr>
-            <p:ph idx="1"/>
-          </p:nvPr>
-        </p:nvSpPr>
-        <p:spPr/>
-        <p:txBody>
-          <a:bodyPr/>
-          <a:lstStyle/>
-          <a:p>
-            <a:r>
-              <a:rPr lang="en-US" dirty="0"/>
-              <a:t>Box plot for summary data</a:t>
-            </a:r>
-          </a:p>
-        </p:txBody>
-      </p:sp>
-    </p:spTree>
-    <p:extLst>
-      <p:ext uri="{BB962C8B-B14F-4D97-AF65-F5344CB8AC3E}">
-        <p14:creationId xmlns:p14="http://schemas.microsoft.com/office/powerpoint/2010/main" val="746624713"/>
       </p:ext>
     </p:extLst>
   </p:cSld>
@@ -7330,6 +7508,563 @@
 </p:sld>
 </file>
 
+<file path=ppt/slides/slide20.xml><?xml version="1.0" encoding="utf-8"?>
+<p:sld xmlns:a="http://schemas.openxmlformats.org/drawingml/2006/main" xmlns:r="http://schemas.openxmlformats.org/officeDocument/2006/relationships" xmlns:p="http://schemas.openxmlformats.org/presentationml/2006/main">
+  <p:cSld>
+    <p:spTree>
+      <p:nvGrpSpPr>
+        <p:cNvPr id="1" name=""/>
+        <p:cNvGrpSpPr/>
+        <p:nvPr/>
+      </p:nvGrpSpPr>
+      <p:grpSpPr>
+        <a:xfrm>
+          <a:off x="0" y="0"/>
+          <a:ext cx="0" cy="0"/>
+          <a:chOff x="0" y="0"/>
+          <a:chExt cx="0" cy="0"/>
+        </a:xfrm>
+      </p:grpSpPr>
+      <p:sp>
+        <p:nvSpPr>
+          <p:cNvPr id="2" name="Title 1">
+            <a:extLst>
+              <a:ext uri="{FF2B5EF4-FFF2-40B4-BE49-F238E27FC236}">
+                <a16:creationId xmlns:a16="http://schemas.microsoft.com/office/drawing/2014/main" id="{356AB69A-AA1C-4A9C-B97E-8E133BA197AB}"/>
+              </a:ext>
+            </a:extLst>
+          </p:cNvPr>
+          <p:cNvSpPr>
+            <a:spLocks noGrp="1"/>
+          </p:cNvSpPr>
+          <p:nvPr>
+            <p:ph type="title"/>
+          </p:nvPr>
+        </p:nvSpPr>
+        <p:spPr>
+          <a:xfrm>
+            <a:off x="677334" y="609600"/>
+            <a:ext cx="5075396" cy="1320800"/>
+          </a:xfrm>
+        </p:spPr>
+        <p:txBody>
+          <a:bodyPr/>
+          <a:lstStyle/>
+          <a:p>
+            <a:r>
+              <a:rPr lang="en-US" dirty="0"/>
+              <a:t>IBU </a:t>
+            </a:r>
+            <a:r>
+              <a:rPr lang="en-US" dirty="0">
+                <a:latin typeface="Arial" panose="020B0604020202020204" pitchFamily="34" charset="0"/>
+                <a:cs typeface="Arial" panose="020B0604020202020204" pitchFamily="34" charset="0"/>
+              </a:rPr>
+              <a:t>Analysis</a:t>
+            </a:r>
+            <a:endParaRPr lang="en-US" dirty="0"/>
+          </a:p>
+        </p:txBody>
+      </p:sp>
+      <p:graphicFrame>
+        <p:nvGraphicFramePr>
+          <p:cNvPr id="4" name="Table 3">
+            <a:extLst>
+              <a:ext uri="{FF2B5EF4-FFF2-40B4-BE49-F238E27FC236}">
+                <a16:creationId xmlns:a16="http://schemas.microsoft.com/office/drawing/2014/main" id="{A7D88474-FF05-4603-833D-36DE785E26E1}"/>
+              </a:ext>
+            </a:extLst>
+          </p:cNvPr>
+          <p:cNvGraphicFramePr>
+            <a:graphicFrameLocks noGrp="1"/>
+          </p:cNvGraphicFramePr>
+          <p:nvPr>
+            <p:extLst>
+              <p:ext uri="{D42A27DB-BD31-4B8C-83A1-F6EECF244321}">
+                <p14:modId xmlns:p14="http://schemas.microsoft.com/office/powerpoint/2010/main" val="414285796"/>
+              </p:ext>
+            </p:extLst>
+          </p:nvPr>
+        </p:nvGraphicFramePr>
+        <p:xfrm>
+          <a:off x="597435" y="2307011"/>
+          <a:ext cx="2842528" cy="2560320"/>
+        </p:xfrm>
+        <a:graphic>
+          <a:graphicData uri="http://schemas.openxmlformats.org/drawingml/2006/table">
+            <a:tbl>
+              <a:tblPr firstRow="1" bandRow="1">
+                <a:tableStyleId>{5C22544A-7EE6-4342-B048-85BDC9FD1C3A}</a:tableStyleId>
+              </a:tblPr>
+              <a:tblGrid>
+                <a:gridCol w="1421264">
+                  <a:extLst>
+                    <a:ext uri="{9D8B030D-6E8A-4147-A177-3AD203B41FA5}">
+                      <a16:colId xmlns:a16="http://schemas.microsoft.com/office/drawing/2014/main" val="461675407"/>
+                    </a:ext>
+                  </a:extLst>
+                </a:gridCol>
+                <a:gridCol w="1421264">
+                  <a:extLst>
+                    <a:ext uri="{9D8B030D-6E8A-4147-A177-3AD203B41FA5}">
+                      <a16:colId xmlns:a16="http://schemas.microsoft.com/office/drawing/2014/main" val="4033762415"/>
+                    </a:ext>
+                  </a:extLst>
+                </a:gridCol>
+              </a:tblGrid>
+              <a:tr h="293145">
+                <a:tc gridSpan="2">
+                  <a:txBody>
+                    <a:bodyPr/>
+                    <a:lstStyle/>
+                    <a:p>
+                      <a:pPr algn="ctr"/>
+                      <a:r>
+                        <a:rPr lang="en-US" dirty="0"/>
+                        <a:t>Summary Statistics</a:t>
+                      </a:r>
+                    </a:p>
+                  </a:txBody>
+                  <a:tcPr/>
+                </a:tc>
+                <a:tc hMerge="1">
+                  <a:txBody>
+                    <a:bodyPr/>
+                    <a:lstStyle/>
+                    <a:p>
+                      <a:endParaRPr lang="en-US" dirty="0"/>
+                    </a:p>
+                  </a:txBody>
+                  <a:tcPr/>
+                </a:tc>
+                <a:extLst>
+                  <a:ext uri="{0D108BD9-81ED-4DB2-BD59-A6C34878D82A}">
+                    <a16:rowId xmlns:a16="http://schemas.microsoft.com/office/drawing/2014/main" val="2309065376"/>
+                  </a:ext>
+                </a:extLst>
+              </a:tr>
+              <a:tr h="293145">
+                <a:tc>
+                  <a:txBody>
+                    <a:bodyPr/>
+                    <a:lstStyle/>
+                    <a:p>
+                      <a:r>
+                        <a:rPr lang="en-US" dirty="0"/>
+                        <a:t>Min</a:t>
+                      </a:r>
+                    </a:p>
+                  </a:txBody>
+                  <a:tcPr/>
+                </a:tc>
+                <a:tc>
+                  <a:txBody>
+                    <a:bodyPr/>
+                    <a:lstStyle/>
+                    <a:p>
+                      <a:r>
+                        <a:rPr lang="en-US" sz="1800" dirty="0">
+                          <a:latin typeface="Arial" panose="020B0604020202020204" pitchFamily="34" charset="0"/>
+                          <a:cs typeface="Arial" panose="020B0604020202020204" pitchFamily="34" charset="0"/>
+                        </a:rPr>
+                        <a:t>4</a:t>
+                      </a:r>
+                      <a:endParaRPr lang="en-US" b="1" dirty="0"/>
+                    </a:p>
+                  </a:txBody>
+                  <a:tcPr/>
+                </a:tc>
+                <a:extLst>
+                  <a:ext uri="{0D108BD9-81ED-4DB2-BD59-A6C34878D82A}">
+                    <a16:rowId xmlns:a16="http://schemas.microsoft.com/office/drawing/2014/main" val="3552336859"/>
+                  </a:ext>
+                </a:extLst>
+              </a:tr>
+              <a:tr h="293145">
+                <a:tc>
+                  <a:txBody>
+                    <a:bodyPr/>
+                    <a:lstStyle/>
+                    <a:p>
+                      <a:r>
+                        <a:rPr lang="en-US" dirty="0"/>
+                        <a:t>1</a:t>
+                      </a:r>
+                      <a:r>
+                        <a:rPr lang="en-US" baseline="30000" dirty="0"/>
+                        <a:t>st</a:t>
+                      </a:r>
+                      <a:r>
+                        <a:rPr lang="en-US" dirty="0"/>
+                        <a:t> Quartile</a:t>
+                      </a:r>
+                    </a:p>
+                  </a:txBody>
+                  <a:tcPr/>
+                </a:tc>
+                <a:tc>
+                  <a:txBody>
+                    <a:bodyPr/>
+                    <a:lstStyle/>
+                    <a:p>
+                      <a:r>
+                        <a:rPr lang="en-US" sz="1800" dirty="0">
+                          <a:latin typeface="Arial" panose="020B0604020202020204" pitchFamily="34" charset="0"/>
+                          <a:cs typeface="Arial" panose="020B0604020202020204" pitchFamily="34" charset="0"/>
+                        </a:rPr>
+                        <a:t>20</a:t>
+                      </a:r>
+                      <a:endParaRPr lang="en-US" dirty="0"/>
+                    </a:p>
+                  </a:txBody>
+                  <a:tcPr/>
+                </a:tc>
+                <a:extLst>
+                  <a:ext uri="{0D108BD9-81ED-4DB2-BD59-A6C34878D82A}">
+                    <a16:rowId xmlns:a16="http://schemas.microsoft.com/office/drawing/2014/main" val="1464203332"/>
+                  </a:ext>
+                </a:extLst>
+              </a:tr>
+              <a:tr h="293145">
+                <a:tc>
+                  <a:txBody>
+                    <a:bodyPr/>
+                    <a:lstStyle/>
+                    <a:p>
+                      <a:r>
+                        <a:rPr lang="en-US" dirty="0"/>
+                        <a:t>Median</a:t>
+                      </a:r>
+                    </a:p>
+                  </a:txBody>
+                  <a:tcPr/>
+                </a:tc>
+                <a:tc>
+                  <a:txBody>
+                    <a:bodyPr/>
+                    <a:lstStyle/>
+                    <a:p>
+                      <a:r>
+                        <a:rPr lang="en-US" sz="1800" dirty="0">
+                          <a:latin typeface="Arial" panose="020B0604020202020204" pitchFamily="34" charset="0"/>
+                          <a:cs typeface="Arial" panose="020B0604020202020204" pitchFamily="34" charset="0"/>
+                        </a:rPr>
+                        <a:t>38</a:t>
+                      </a:r>
+                      <a:endParaRPr lang="en-US" dirty="0"/>
+                    </a:p>
+                  </a:txBody>
+                  <a:tcPr/>
+                </a:tc>
+                <a:extLst>
+                  <a:ext uri="{0D108BD9-81ED-4DB2-BD59-A6C34878D82A}">
+                    <a16:rowId xmlns:a16="http://schemas.microsoft.com/office/drawing/2014/main" val="675258789"/>
+                  </a:ext>
+                </a:extLst>
+              </a:tr>
+              <a:tr h="293145">
+                <a:tc>
+                  <a:txBody>
+                    <a:bodyPr/>
+                    <a:lstStyle/>
+                    <a:p>
+                      <a:r>
+                        <a:rPr lang="en-US" dirty="0"/>
+                        <a:t>Mean</a:t>
+                      </a:r>
+                    </a:p>
+                  </a:txBody>
+                  <a:tcPr/>
+                </a:tc>
+                <a:tc>
+                  <a:txBody>
+                    <a:bodyPr/>
+                    <a:lstStyle/>
+                    <a:p>
+                      <a:pPr marL="0" marR="0" lvl="0" indent="0" algn="l" defTabSz="457200" rtl="0" eaLnBrk="1" fontAlgn="auto" latinLnBrk="0" hangingPunct="1">
+                        <a:lnSpc>
+                          <a:spcPct val="100000"/>
+                        </a:lnSpc>
+                        <a:spcBef>
+                          <a:spcPts val="0"/>
+                        </a:spcBef>
+                        <a:spcAft>
+                          <a:spcPts val="0"/>
+                        </a:spcAft>
+                        <a:buClrTx/>
+                        <a:buSzTx/>
+                        <a:buFontTx/>
+                        <a:buNone/>
+                        <a:tabLst/>
+                        <a:defRPr/>
+                      </a:pPr>
+                      <a:r>
+                        <a:rPr lang="en-US" sz="1800" dirty="0">
+                          <a:latin typeface="Arial" panose="020B0604020202020204" pitchFamily="34" charset="0"/>
+                          <a:cs typeface="Arial" panose="020B0604020202020204" pitchFamily="34" charset="0"/>
+                        </a:rPr>
+                        <a:t>47</a:t>
+                      </a:r>
+                      <a:endParaRPr lang="en-US" dirty="0"/>
+                    </a:p>
+                  </a:txBody>
+                  <a:tcPr/>
+                </a:tc>
+                <a:extLst>
+                  <a:ext uri="{0D108BD9-81ED-4DB2-BD59-A6C34878D82A}">
+                    <a16:rowId xmlns:a16="http://schemas.microsoft.com/office/drawing/2014/main" val="4206532118"/>
+                  </a:ext>
+                </a:extLst>
+              </a:tr>
+              <a:tr h="293145">
+                <a:tc>
+                  <a:txBody>
+                    <a:bodyPr/>
+                    <a:lstStyle/>
+                    <a:p>
+                      <a:r>
+                        <a:rPr lang="en-US" dirty="0"/>
+                        <a:t>3</a:t>
+                      </a:r>
+                      <a:r>
+                        <a:rPr lang="en-US" baseline="30000" dirty="0"/>
+                        <a:t>rd</a:t>
+                      </a:r>
+                      <a:r>
+                        <a:rPr lang="en-US" dirty="0"/>
+                        <a:t> Quartile</a:t>
+                      </a:r>
+                    </a:p>
+                  </a:txBody>
+                  <a:tcPr/>
+                </a:tc>
+                <a:tc>
+                  <a:txBody>
+                    <a:bodyPr/>
+                    <a:lstStyle/>
+                    <a:p>
+                      <a:pPr marL="0" marR="0" lvl="0" indent="0" algn="l" defTabSz="457200" rtl="0" eaLnBrk="1" fontAlgn="auto" latinLnBrk="0" hangingPunct="1">
+                        <a:lnSpc>
+                          <a:spcPct val="100000"/>
+                        </a:lnSpc>
+                        <a:spcBef>
+                          <a:spcPts val="0"/>
+                        </a:spcBef>
+                        <a:spcAft>
+                          <a:spcPts val="0"/>
+                        </a:spcAft>
+                        <a:buClrTx/>
+                        <a:buSzTx/>
+                        <a:buFontTx/>
+                        <a:buNone/>
+                        <a:tabLst/>
+                        <a:defRPr/>
+                      </a:pPr>
+                      <a:r>
+                        <a:rPr lang="en-US" sz="1800" dirty="0">
+                          <a:latin typeface="Arial" panose="020B0604020202020204" pitchFamily="34" charset="0"/>
+                          <a:cs typeface="Arial" panose="020B0604020202020204" pitchFamily="34" charset="0"/>
+                        </a:rPr>
+                        <a:t>66</a:t>
+                      </a:r>
+                      <a:endParaRPr lang="en-US" dirty="0"/>
+                    </a:p>
+                  </a:txBody>
+                  <a:tcPr/>
+                </a:tc>
+                <a:extLst>
+                  <a:ext uri="{0D108BD9-81ED-4DB2-BD59-A6C34878D82A}">
+                    <a16:rowId xmlns:a16="http://schemas.microsoft.com/office/drawing/2014/main" val="1762085853"/>
+                  </a:ext>
+                </a:extLst>
+              </a:tr>
+              <a:tr h="293145">
+                <a:tc>
+                  <a:txBody>
+                    <a:bodyPr/>
+                    <a:lstStyle/>
+                    <a:p>
+                      <a:r>
+                        <a:rPr lang="en-US" dirty="0"/>
+                        <a:t>Max</a:t>
+                      </a:r>
+                    </a:p>
+                  </a:txBody>
+                  <a:tcPr/>
+                </a:tc>
+                <a:tc>
+                  <a:txBody>
+                    <a:bodyPr/>
+                    <a:lstStyle/>
+                    <a:p>
+                      <a:pPr marL="0" marR="0" lvl="0" indent="0" algn="l" defTabSz="457200" rtl="0" eaLnBrk="1" fontAlgn="auto" latinLnBrk="0" hangingPunct="1">
+                        <a:lnSpc>
+                          <a:spcPct val="100000"/>
+                        </a:lnSpc>
+                        <a:spcBef>
+                          <a:spcPts val="0"/>
+                        </a:spcBef>
+                        <a:spcAft>
+                          <a:spcPts val="0"/>
+                        </a:spcAft>
+                        <a:buClrTx/>
+                        <a:buSzTx/>
+                        <a:buFontTx/>
+                        <a:buNone/>
+                        <a:tabLst/>
+                        <a:defRPr/>
+                      </a:pPr>
+                      <a:r>
+                        <a:rPr lang="en-US" sz="1800" dirty="0">
+                          <a:latin typeface="Arial" panose="020B0604020202020204" pitchFamily="34" charset="0"/>
+                          <a:cs typeface="Arial" panose="020B0604020202020204" pitchFamily="34" charset="0"/>
+                        </a:rPr>
+                        <a:t>138</a:t>
+                      </a:r>
+                      <a:endParaRPr lang="en-US" dirty="0"/>
+                    </a:p>
+                  </a:txBody>
+                  <a:tcPr/>
+                </a:tc>
+                <a:extLst>
+                  <a:ext uri="{0D108BD9-81ED-4DB2-BD59-A6C34878D82A}">
+                    <a16:rowId xmlns:a16="http://schemas.microsoft.com/office/drawing/2014/main" val="56146931"/>
+                  </a:ext>
+                </a:extLst>
+              </a:tr>
+            </a:tbl>
+          </a:graphicData>
+        </a:graphic>
+      </p:graphicFrame>
+      <p:pic>
+        <p:nvPicPr>
+          <p:cNvPr id="8" name="Picture 7">
+            <a:extLst>
+              <a:ext uri="{FF2B5EF4-FFF2-40B4-BE49-F238E27FC236}">
+                <a16:creationId xmlns:a16="http://schemas.microsoft.com/office/drawing/2014/main" id="{7061A442-0C36-416F-BF24-523EC4917969}"/>
+              </a:ext>
+            </a:extLst>
+          </p:cNvPr>
+          <p:cNvPicPr>
+            <a:picLocks noChangeAspect="1"/>
+          </p:cNvPicPr>
+          <p:nvPr/>
+        </p:nvPicPr>
+        <p:blipFill>
+          <a:blip r:embed="rId2"/>
+          <a:stretch>
+            <a:fillRect/>
+          </a:stretch>
+        </p:blipFill>
+        <p:spPr>
+          <a:xfrm>
+            <a:off x="4533997" y="1992718"/>
+            <a:ext cx="5141662" cy="3171150"/>
+          </a:xfrm>
+          <a:prstGeom prst="rect">
+            <a:avLst/>
+          </a:prstGeom>
+        </p:spPr>
+      </p:pic>
+    </p:spTree>
+    <p:extLst>
+      <p:ext uri="{BB962C8B-B14F-4D97-AF65-F5344CB8AC3E}">
+        <p14:creationId xmlns:p14="http://schemas.microsoft.com/office/powerpoint/2010/main" val="4108676287"/>
+      </p:ext>
+    </p:extLst>
+  </p:cSld>
+  <p:clrMapOvr>
+    <a:masterClrMapping/>
+  </p:clrMapOvr>
+</p:sld>
+</file>
+
+<file path=ppt/slides/slide21.xml><?xml version="1.0" encoding="utf-8"?>
+<p:sld xmlns:a="http://schemas.openxmlformats.org/drawingml/2006/main" xmlns:r="http://schemas.openxmlformats.org/officeDocument/2006/relationships" xmlns:p="http://schemas.openxmlformats.org/presentationml/2006/main">
+  <p:cSld>
+    <p:spTree>
+      <p:nvGrpSpPr>
+        <p:cNvPr id="1" name=""/>
+        <p:cNvGrpSpPr/>
+        <p:nvPr/>
+      </p:nvGrpSpPr>
+      <p:grpSpPr>
+        <a:xfrm>
+          <a:off x="0" y="0"/>
+          <a:ext cx="0" cy="0"/>
+          <a:chOff x="0" y="0"/>
+          <a:chExt cx="0" cy="0"/>
+        </a:xfrm>
+      </p:grpSpPr>
+      <p:sp>
+        <p:nvSpPr>
+          <p:cNvPr id="2" name="Title 1">
+            <a:extLst>
+              <a:ext uri="{FF2B5EF4-FFF2-40B4-BE49-F238E27FC236}">
+                <a16:creationId xmlns:a16="http://schemas.microsoft.com/office/drawing/2014/main" id="{BA749432-A29A-4F12-8BE8-C8FBC3068259}"/>
+              </a:ext>
+            </a:extLst>
+          </p:cNvPr>
+          <p:cNvSpPr>
+            <a:spLocks noGrp="1"/>
+          </p:cNvSpPr>
+          <p:nvPr>
+            <p:ph type="title"/>
+          </p:nvPr>
+        </p:nvSpPr>
+        <p:spPr/>
+        <p:txBody>
+          <a:bodyPr/>
+          <a:lstStyle/>
+          <a:p>
+            <a:r>
+              <a:rPr lang="en-US" dirty="0"/>
+              <a:t>Feedback</a:t>
+            </a:r>
+          </a:p>
+        </p:txBody>
+      </p:sp>
+      <p:sp>
+        <p:nvSpPr>
+          <p:cNvPr id="3" name="Content Placeholder 2">
+            <a:extLst>
+              <a:ext uri="{FF2B5EF4-FFF2-40B4-BE49-F238E27FC236}">
+                <a16:creationId xmlns:a16="http://schemas.microsoft.com/office/drawing/2014/main" id="{C18616BF-1EE1-4D1D-B109-7232B6B652F3}"/>
+              </a:ext>
+            </a:extLst>
+          </p:cNvPr>
+          <p:cNvSpPr>
+            <a:spLocks noGrp="1"/>
+          </p:cNvSpPr>
+          <p:nvPr>
+            <p:ph idx="1"/>
+          </p:nvPr>
+        </p:nvSpPr>
+        <p:spPr/>
+        <p:txBody>
+          <a:bodyPr/>
+          <a:lstStyle/>
+          <a:p>
+            <a:r>
+              <a:rPr lang="en-US" dirty="0"/>
+              <a:t>Box plot for summary data</a:t>
+            </a:r>
+          </a:p>
+        </p:txBody>
+      </p:sp>
+    </p:spTree>
+    <p:extLst>
+      <p:ext uri="{BB962C8B-B14F-4D97-AF65-F5344CB8AC3E}">
+        <p14:creationId xmlns:p14="http://schemas.microsoft.com/office/powerpoint/2010/main" val="746624713"/>
+      </p:ext>
+    </p:extLst>
+  </p:cSld>
+  <p:clrMapOvr>
+    <a:masterClrMapping/>
+  </p:clrMapOvr>
+</p:sld>
+</file>
+
 <file path=ppt/slides/slide3.xml><?xml version="1.0" encoding="utf-8"?>
 <p:sld xmlns:a="http://schemas.openxmlformats.org/drawingml/2006/main" xmlns:r="http://schemas.openxmlformats.org/officeDocument/2006/relationships" xmlns:p="http://schemas.openxmlformats.org/presentationml/2006/main">
   <p:cSld>
@@ -7497,10 +8232,10 @@
       </p:sp>
       <p:pic>
         <p:nvPicPr>
-          <p:cNvPr id="3" name="Picture 2">
+          <p:cNvPr id="4" name="Picture 3">
             <a:extLst>
               <a:ext uri="{FF2B5EF4-FFF2-40B4-BE49-F238E27FC236}">
-                <a16:creationId xmlns:a16="http://schemas.microsoft.com/office/drawing/2014/main" id="{29912360-7E3D-469E-85D2-B0D221304D0E}"/>
+                <a16:creationId xmlns:a16="http://schemas.microsoft.com/office/drawing/2014/main" id="{87CF92D8-8DED-4FB3-A8EF-D94409BB4682}"/>
               </a:ext>
             </a:extLst>
           </p:cNvPr>
@@ -7517,8 +8252,8 @@
         </p:blipFill>
         <p:spPr>
           <a:xfrm>
-            <a:off x="1413763" y="2190029"/>
-            <a:ext cx="7123809" cy="4393651"/>
+            <a:off x="1499658" y="2398113"/>
+            <a:ext cx="6311111" cy="3898413"/>
           </a:xfrm>
           <a:prstGeom prst="rect">
             <a:avLst/>
@@ -7539,7 +8274,7 @@
         </p:nvSpPr>
         <p:spPr>
           <a:xfrm>
-            <a:off x="1772095" y="5940623"/>
+            <a:off x="1683198" y="5940623"/>
             <a:ext cx="1452369" cy="307777"/>
           </a:xfrm>
           <a:prstGeom prst="rect">
@@ -7738,7 +8473,7 @@
         </p:blipFill>
         <p:spPr>
           <a:xfrm>
-            <a:off x="1523465" y="2162610"/>
+            <a:off x="6496298" y="2513339"/>
             <a:ext cx="3767626" cy="2323705"/>
           </a:xfrm>
           <a:prstGeom prst="rect">
@@ -7748,10 +8483,10 @@
       </p:pic>
       <p:pic>
         <p:nvPicPr>
-          <p:cNvPr id="5" name="Picture 4">
+          <p:cNvPr id="3" name="Picture 2">
             <a:extLst>
               <a:ext uri="{FF2B5EF4-FFF2-40B4-BE49-F238E27FC236}">
-                <a16:creationId xmlns:a16="http://schemas.microsoft.com/office/drawing/2014/main" id="{0BAE1DD6-FB34-4538-9C6B-1FB1486DFFA5}"/>
+                <a16:creationId xmlns:a16="http://schemas.microsoft.com/office/drawing/2014/main" id="{D127A0E3-2199-4659-A1A3-7CA1FE8851C5}"/>
               </a:ext>
             </a:extLst>
           </p:cNvPr>
@@ -7768,8 +8503,8 @@
         </p:blipFill>
         <p:spPr>
           <a:xfrm>
-            <a:off x="5777294" y="2278020"/>
-            <a:ext cx="3767626" cy="2323705"/>
+            <a:off x="1928076" y="2513339"/>
+            <a:ext cx="3761828" cy="2323705"/>
           </a:xfrm>
           <a:prstGeom prst="rect">
             <a:avLst/>
@@ -9003,7 +9738,7 @@
           <p:cNvPr id="2" name="Title 1">
             <a:extLst>
               <a:ext uri="{FF2B5EF4-FFF2-40B4-BE49-F238E27FC236}">
-                <a16:creationId xmlns:a16="http://schemas.microsoft.com/office/drawing/2014/main" id="{356AB69A-AA1C-4A9C-B97E-8E133BA197AB}"/>
+                <a16:creationId xmlns:a16="http://schemas.microsoft.com/office/drawing/2014/main" id="{9A80211F-D10D-461A-9C13-62348DA09BF3}"/>
               </a:ext>
             </a:extLst>
           </p:cNvPr>
@@ -9014,435 +9749,64 @@
             <p:ph type="title"/>
           </p:nvPr>
         </p:nvSpPr>
-        <p:spPr>
-          <a:xfrm>
-            <a:off x="677334" y="609600"/>
-            <a:ext cx="5075396" cy="1320800"/>
-          </a:xfrm>
-        </p:spPr>
+        <p:spPr/>
         <p:txBody>
           <a:bodyPr/>
           <a:lstStyle/>
           <a:p>
             <a:r>
               <a:rPr lang="en-US" dirty="0"/>
-              <a:t>IBU </a:t>
-            </a:r>
-            <a:r>
-              <a:rPr lang="en-US" dirty="0">
-                <a:latin typeface="Arial" panose="020B0604020202020204" pitchFamily="34" charset="0"/>
-                <a:cs typeface="Arial" panose="020B0604020202020204" pitchFamily="34" charset="0"/>
-              </a:rPr>
-              <a:t>Analysis</a:t>
-            </a:r>
-            <a:endParaRPr lang="en-US" dirty="0"/>
-          </a:p>
-        </p:txBody>
-      </p:sp>
-      <p:graphicFrame>
-        <p:nvGraphicFramePr>
-          <p:cNvPr id="4" name="Table 3">
+              <a:t>Alcohol by Volume and </a:t>
+            </a:r>
+            <a:br>
+              <a:rPr lang="en-US" dirty="0"/>
+            </a:br>
+            <a:r>
+              <a:rPr lang="en-US" dirty="0"/>
+              <a:t>International Bitterness Units by Style</a:t>
+            </a:r>
+          </a:p>
+        </p:txBody>
+      </p:sp>
+      <p:pic>
+        <p:nvPicPr>
+          <p:cNvPr id="4" name="Content Placeholder 4" descr="A screenshot of a cell phone&#10;&#10;Description automatically generated">
             <a:extLst>
               <a:ext uri="{FF2B5EF4-FFF2-40B4-BE49-F238E27FC236}">
-                <a16:creationId xmlns:a16="http://schemas.microsoft.com/office/drawing/2014/main" id="{A7D88474-FF05-4603-833D-36DE785E26E1}"/>
-              </a:ext>
-            </a:extLst>
-          </p:cNvPr>
-          <p:cNvGraphicFramePr>
-            <a:graphicFrameLocks noGrp="1"/>
-          </p:cNvGraphicFramePr>
-          <p:nvPr>
-            <p:extLst>
-              <p:ext uri="{D42A27DB-BD31-4B8C-83A1-F6EECF244321}">
-                <p14:modId xmlns:p14="http://schemas.microsoft.com/office/powerpoint/2010/main" val="414285796"/>
-              </p:ext>
-            </p:extLst>
-          </p:nvPr>
-        </p:nvGraphicFramePr>
-        <p:xfrm>
-          <a:off x="597435" y="2307011"/>
-          <a:ext cx="2842528" cy="2560320"/>
-        </p:xfrm>
-        <a:graphic>
-          <a:graphicData uri="http://schemas.openxmlformats.org/drawingml/2006/table">
-            <a:tbl>
-              <a:tblPr firstRow="1" bandRow="1">
-                <a:tableStyleId>{5C22544A-7EE6-4342-B048-85BDC9FD1C3A}</a:tableStyleId>
-              </a:tblPr>
-              <a:tblGrid>
-                <a:gridCol w="1421264">
-                  <a:extLst>
-                    <a:ext uri="{9D8B030D-6E8A-4147-A177-3AD203B41FA5}">
-                      <a16:colId xmlns:a16="http://schemas.microsoft.com/office/drawing/2014/main" val="461675407"/>
-                    </a:ext>
-                  </a:extLst>
-                </a:gridCol>
-                <a:gridCol w="1421264">
-                  <a:extLst>
-                    <a:ext uri="{9D8B030D-6E8A-4147-A177-3AD203B41FA5}">
-                      <a16:colId xmlns:a16="http://schemas.microsoft.com/office/drawing/2014/main" val="4033762415"/>
-                    </a:ext>
-                  </a:extLst>
-                </a:gridCol>
-              </a:tblGrid>
-              <a:tr h="293145">
-                <a:tc gridSpan="2">
-                  <a:txBody>
-                    <a:bodyPr/>
-                    <a:lstStyle/>
-                    <a:p>
-                      <a:pPr algn="ctr"/>
-                      <a:r>
-                        <a:rPr lang="en-US" dirty="0"/>
-                        <a:t>Summary Statistics</a:t>
-                      </a:r>
-                    </a:p>
-                  </a:txBody>
-                  <a:tcPr/>
-                </a:tc>
-                <a:tc hMerge="1">
-                  <a:txBody>
-                    <a:bodyPr/>
-                    <a:lstStyle/>
-                    <a:p>
-                      <a:endParaRPr lang="en-US" dirty="0"/>
-                    </a:p>
-                  </a:txBody>
-                  <a:tcPr/>
-                </a:tc>
-                <a:extLst>
-                  <a:ext uri="{0D108BD9-81ED-4DB2-BD59-A6C34878D82A}">
-                    <a16:rowId xmlns:a16="http://schemas.microsoft.com/office/drawing/2014/main" val="2309065376"/>
-                  </a:ext>
-                </a:extLst>
-              </a:tr>
-              <a:tr h="293145">
-                <a:tc>
-                  <a:txBody>
-                    <a:bodyPr/>
-                    <a:lstStyle/>
-                    <a:p>
-                      <a:r>
-                        <a:rPr lang="en-US" dirty="0"/>
-                        <a:t>Min</a:t>
-                      </a:r>
-                    </a:p>
-                  </a:txBody>
-                  <a:tcPr/>
-                </a:tc>
-                <a:tc>
-                  <a:txBody>
-                    <a:bodyPr/>
-                    <a:lstStyle/>
-                    <a:p>
-                      <a:r>
-                        <a:rPr lang="en-US" sz="1800" dirty="0">
-                          <a:latin typeface="Arial" panose="020B0604020202020204" pitchFamily="34" charset="0"/>
-                          <a:cs typeface="Arial" panose="020B0604020202020204" pitchFamily="34" charset="0"/>
-                        </a:rPr>
-                        <a:t>4</a:t>
-                      </a:r>
-                      <a:endParaRPr lang="en-US" b="1" dirty="0"/>
-                    </a:p>
-                  </a:txBody>
-                  <a:tcPr/>
-                </a:tc>
-                <a:extLst>
-                  <a:ext uri="{0D108BD9-81ED-4DB2-BD59-A6C34878D82A}">
-                    <a16:rowId xmlns:a16="http://schemas.microsoft.com/office/drawing/2014/main" val="3552336859"/>
-                  </a:ext>
-                </a:extLst>
-              </a:tr>
-              <a:tr h="293145">
-                <a:tc>
-                  <a:txBody>
-                    <a:bodyPr/>
-                    <a:lstStyle/>
-                    <a:p>
-                      <a:r>
-                        <a:rPr lang="en-US" dirty="0"/>
-                        <a:t>1</a:t>
-                      </a:r>
-                      <a:r>
-                        <a:rPr lang="en-US" baseline="30000" dirty="0"/>
-                        <a:t>st</a:t>
-                      </a:r>
-                      <a:r>
-                        <a:rPr lang="en-US" dirty="0"/>
-                        <a:t> Quartile</a:t>
-                      </a:r>
-                    </a:p>
-                  </a:txBody>
-                  <a:tcPr/>
-                </a:tc>
-                <a:tc>
-                  <a:txBody>
-                    <a:bodyPr/>
-                    <a:lstStyle/>
-                    <a:p>
-                      <a:r>
-                        <a:rPr lang="en-US" sz="1800" dirty="0">
-                          <a:latin typeface="Arial" panose="020B0604020202020204" pitchFamily="34" charset="0"/>
-                          <a:cs typeface="Arial" panose="020B0604020202020204" pitchFamily="34" charset="0"/>
-                        </a:rPr>
-                        <a:t>20</a:t>
-                      </a:r>
-                      <a:endParaRPr lang="en-US" dirty="0"/>
-                    </a:p>
-                  </a:txBody>
-                  <a:tcPr/>
-                </a:tc>
-                <a:extLst>
-                  <a:ext uri="{0D108BD9-81ED-4DB2-BD59-A6C34878D82A}">
-                    <a16:rowId xmlns:a16="http://schemas.microsoft.com/office/drawing/2014/main" val="1464203332"/>
-                  </a:ext>
-                </a:extLst>
-              </a:tr>
-              <a:tr h="293145">
-                <a:tc>
-                  <a:txBody>
-                    <a:bodyPr/>
-                    <a:lstStyle/>
-                    <a:p>
-                      <a:r>
-                        <a:rPr lang="en-US" dirty="0"/>
-                        <a:t>Median</a:t>
-                      </a:r>
-                    </a:p>
-                  </a:txBody>
-                  <a:tcPr/>
-                </a:tc>
-                <a:tc>
-                  <a:txBody>
-                    <a:bodyPr/>
-                    <a:lstStyle/>
-                    <a:p>
-                      <a:r>
-                        <a:rPr lang="en-US" sz="1800" dirty="0">
-                          <a:latin typeface="Arial" panose="020B0604020202020204" pitchFamily="34" charset="0"/>
-                          <a:cs typeface="Arial" panose="020B0604020202020204" pitchFamily="34" charset="0"/>
-                        </a:rPr>
-                        <a:t>38</a:t>
-                      </a:r>
-                      <a:endParaRPr lang="en-US" dirty="0"/>
-                    </a:p>
-                  </a:txBody>
-                  <a:tcPr/>
-                </a:tc>
-                <a:extLst>
-                  <a:ext uri="{0D108BD9-81ED-4DB2-BD59-A6C34878D82A}">
-                    <a16:rowId xmlns:a16="http://schemas.microsoft.com/office/drawing/2014/main" val="675258789"/>
-                  </a:ext>
-                </a:extLst>
-              </a:tr>
-              <a:tr h="293145">
-                <a:tc>
-                  <a:txBody>
-                    <a:bodyPr/>
-                    <a:lstStyle/>
-                    <a:p>
-                      <a:r>
-                        <a:rPr lang="en-US" dirty="0"/>
-                        <a:t>Mean</a:t>
-                      </a:r>
-                    </a:p>
-                  </a:txBody>
-                  <a:tcPr/>
-                </a:tc>
-                <a:tc>
-                  <a:txBody>
-                    <a:bodyPr/>
-                    <a:lstStyle/>
-                    <a:p>
-                      <a:pPr marL="0" marR="0" lvl="0" indent="0" algn="l" defTabSz="457200" rtl="0" eaLnBrk="1" fontAlgn="auto" latinLnBrk="0" hangingPunct="1">
-                        <a:lnSpc>
-                          <a:spcPct val="100000"/>
-                        </a:lnSpc>
-                        <a:spcBef>
-                          <a:spcPts val="0"/>
-                        </a:spcBef>
-                        <a:spcAft>
-                          <a:spcPts val="0"/>
-                        </a:spcAft>
-                        <a:buClrTx/>
-                        <a:buSzTx/>
-                        <a:buFontTx/>
-                        <a:buNone/>
-                        <a:tabLst/>
-                        <a:defRPr/>
-                      </a:pPr>
-                      <a:r>
-                        <a:rPr lang="en-US" sz="1800" dirty="0">
-                          <a:latin typeface="Arial" panose="020B0604020202020204" pitchFamily="34" charset="0"/>
-                          <a:cs typeface="Arial" panose="020B0604020202020204" pitchFamily="34" charset="0"/>
-                        </a:rPr>
-                        <a:t>47</a:t>
-                      </a:r>
-                      <a:endParaRPr lang="en-US" dirty="0"/>
-                    </a:p>
-                  </a:txBody>
-                  <a:tcPr/>
-                </a:tc>
-                <a:extLst>
-                  <a:ext uri="{0D108BD9-81ED-4DB2-BD59-A6C34878D82A}">
-                    <a16:rowId xmlns:a16="http://schemas.microsoft.com/office/drawing/2014/main" val="4206532118"/>
-                  </a:ext>
-                </a:extLst>
-              </a:tr>
-              <a:tr h="293145">
-                <a:tc>
-                  <a:txBody>
-                    <a:bodyPr/>
-                    <a:lstStyle/>
-                    <a:p>
-                      <a:r>
-                        <a:rPr lang="en-US" dirty="0"/>
-                        <a:t>3</a:t>
-                      </a:r>
-                      <a:r>
-                        <a:rPr lang="en-US" baseline="30000" dirty="0"/>
-                        <a:t>rd</a:t>
-                      </a:r>
-                      <a:r>
-                        <a:rPr lang="en-US" dirty="0"/>
-                        <a:t> Quartile</a:t>
-                      </a:r>
-                    </a:p>
-                  </a:txBody>
-                  <a:tcPr/>
-                </a:tc>
-                <a:tc>
-                  <a:txBody>
-                    <a:bodyPr/>
-                    <a:lstStyle/>
-                    <a:p>
-                      <a:pPr marL="0" marR="0" lvl="0" indent="0" algn="l" defTabSz="457200" rtl="0" eaLnBrk="1" fontAlgn="auto" latinLnBrk="0" hangingPunct="1">
-                        <a:lnSpc>
-                          <a:spcPct val="100000"/>
-                        </a:lnSpc>
-                        <a:spcBef>
-                          <a:spcPts val="0"/>
-                        </a:spcBef>
-                        <a:spcAft>
-                          <a:spcPts val="0"/>
-                        </a:spcAft>
-                        <a:buClrTx/>
-                        <a:buSzTx/>
-                        <a:buFontTx/>
-                        <a:buNone/>
-                        <a:tabLst/>
-                        <a:defRPr/>
-                      </a:pPr>
-                      <a:r>
-                        <a:rPr lang="en-US" sz="1800" dirty="0">
-                          <a:latin typeface="Arial" panose="020B0604020202020204" pitchFamily="34" charset="0"/>
-                          <a:cs typeface="Arial" panose="020B0604020202020204" pitchFamily="34" charset="0"/>
-                        </a:rPr>
-                        <a:t>66</a:t>
-                      </a:r>
-                      <a:endParaRPr lang="en-US" dirty="0"/>
-                    </a:p>
-                  </a:txBody>
-                  <a:tcPr/>
-                </a:tc>
-                <a:extLst>
-                  <a:ext uri="{0D108BD9-81ED-4DB2-BD59-A6C34878D82A}">
-                    <a16:rowId xmlns:a16="http://schemas.microsoft.com/office/drawing/2014/main" val="1762085853"/>
-                  </a:ext>
-                </a:extLst>
-              </a:tr>
-              <a:tr h="293145">
-                <a:tc>
-                  <a:txBody>
-                    <a:bodyPr/>
-                    <a:lstStyle/>
-                    <a:p>
-                      <a:r>
-                        <a:rPr lang="en-US" dirty="0"/>
-                        <a:t>Max</a:t>
-                      </a:r>
-                    </a:p>
-                  </a:txBody>
-                  <a:tcPr/>
-                </a:tc>
-                <a:tc>
-                  <a:txBody>
-                    <a:bodyPr/>
-                    <a:lstStyle/>
-                    <a:p>
-                      <a:pPr marL="0" marR="0" lvl="0" indent="0" algn="l" defTabSz="457200" rtl="0" eaLnBrk="1" fontAlgn="auto" latinLnBrk="0" hangingPunct="1">
-                        <a:lnSpc>
-                          <a:spcPct val="100000"/>
-                        </a:lnSpc>
-                        <a:spcBef>
-                          <a:spcPts val="0"/>
-                        </a:spcBef>
-                        <a:spcAft>
-                          <a:spcPts val="0"/>
-                        </a:spcAft>
-                        <a:buClrTx/>
-                        <a:buSzTx/>
-                        <a:buFontTx/>
-                        <a:buNone/>
-                        <a:tabLst/>
-                        <a:defRPr/>
-                      </a:pPr>
-                      <a:r>
-                        <a:rPr lang="en-US" sz="1800" dirty="0">
-                          <a:latin typeface="Arial" panose="020B0604020202020204" pitchFamily="34" charset="0"/>
-                          <a:cs typeface="Arial" panose="020B0604020202020204" pitchFamily="34" charset="0"/>
-                        </a:rPr>
-                        <a:t>138</a:t>
-                      </a:r>
-                      <a:endParaRPr lang="en-US" dirty="0"/>
-                    </a:p>
-                  </a:txBody>
-                  <a:tcPr/>
-                </a:tc>
-                <a:extLst>
-                  <a:ext uri="{0D108BD9-81ED-4DB2-BD59-A6C34878D82A}">
-                    <a16:rowId xmlns:a16="http://schemas.microsoft.com/office/drawing/2014/main" val="56146931"/>
-                  </a:ext>
-                </a:extLst>
-              </a:tr>
-            </a:tbl>
-          </a:graphicData>
-        </a:graphic>
-      </p:graphicFrame>
-      <p:pic>
-        <p:nvPicPr>
-          <p:cNvPr id="8" name="Picture 7">
-            <a:extLst>
-              <a:ext uri="{FF2B5EF4-FFF2-40B4-BE49-F238E27FC236}">
-                <a16:creationId xmlns:a16="http://schemas.microsoft.com/office/drawing/2014/main" id="{7061A442-0C36-416F-BF24-523EC4917969}"/>
+                <a16:creationId xmlns:a16="http://schemas.microsoft.com/office/drawing/2014/main" id="{636F93D3-8DBE-411A-BFEE-DAE8908DD57E}"/>
               </a:ext>
             </a:extLst>
           </p:cNvPr>
           <p:cNvPicPr>
-            <a:picLocks noChangeAspect="1"/>
+            <a:picLocks noGrp="1" noChangeAspect="1"/>
           </p:cNvPicPr>
-          <p:nvPr/>
+          <p:nvPr>
+            <p:ph idx="1"/>
+          </p:nvPr>
         </p:nvPicPr>
         <p:blipFill>
-          <a:blip r:embed="rId2"/>
+          <a:blip r:embed="rId2">
+            <a:extLst>
+              <a:ext uri="{28A0092B-C50C-407E-A947-70E740481C1C}">
+                <a14:useLocalDpi xmlns:a14="http://schemas.microsoft.com/office/drawing/2010/main" val="0"/>
+              </a:ext>
+            </a:extLst>
+          </a:blip>
           <a:stretch>
             <a:fillRect/>
           </a:stretch>
         </p:blipFill>
         <p:spPr>
           <a:xfrm>
-            <a:off x="4533997" y="1992718"/>
-            <a:ext cx="5141662" cy="3171150"/>
+            <a:off x="1692075" y="2450661"/>
+            <a:ext cx="6567185" cy="3797739"/>
           </a:xfrm>
-          <a:prstGeom prst="rect">
-            <a:avLst/>
-          </a:prstGeom>
         </p:spPr>
       </p:pic>
     </p:spTree>
     <p:extLst>
       <p:ext uri="{BB962C8B-B14F-4D97-AF65-F5344CB8AC3E}">
-        <p14:creationId xmlns:p14="http://schemas.microsoft.com/office/powerpoint/2010/main" val="4108676287"/>
+        <p14:creationId xmlns:p14="http://schemas.microsoft.com/office/powerpoint/2010/main" val="1598884026"/>
       </p:ext>
     </p:extLst>
   </p:cSld>

</xml_diff>

<commit_message>
Cleaned up .rmd to get knitr html working. added knn
</commit_message>
<xml_diff>
--- a/MalcolmCarlsonBeerDataEDA.DDS6306.pptx
+++ b/MalcolmCarlsonBeerDataEDA.DDS6306.pptx
@@ -229,7 +229,7 @@
           <a:p>
             <a:fld id="{A6D10619-A5AD-4FBE-8267-47BE2B1199F7}" type="datetimeFigureOut">
               <a:rPr lang="en-US" smtClean="0"/>
-              <a:t>10/23/2019</a:t>
+              <a:t>10/25/2019</a:t>
             </a:fld>
             <a:endParaRPr lang="en-US"/>
           </a:p>
@@ -1219,7 +1219,7 @@
             <a:fld id="{B61BEF0D-F0BB-DE4B-95CE-6DB70DBA9567}" type="datetimeFigureOut">
               <a:rPr lang="en-US" dirty="0"/>
               <a:pPr/>
-              <a:t>10/23/2019</a:t>
+              <a:t>10/25/2019</a:t>
             </a:fld>
             <a:endParaRPr lang="en-US" dirty="0"/>
           </a:p>
@@ -1467,7 +1467,7 @@
             <a:fld id="{B61BEF0D-F0BB-DE4B-95CE-6DB70DBA9567}" type="datetimeFigureOut">
               <a:rPr lang="en-US" dirty="0"/>
               <a:pPr/>
-              <a:t>10/23/2019</a:t>
+              <a:t>10/25/2019</a:t>
             </a:fld>
             <a:endParaRPr lang="en-US" dirty="0"/>
           </a:p>
@@ -1778,7 +1778,7 @@
             <a:fld id="{B61BEF0D-F0BB-DE4B-95CE-6DB70DBA9567}" type="datetimeFigureOut">
               <a:rPr lang="en-US" dirty="0"/>
               <a:pPr/>
-              <a:t>10/23/2019</a:t>
+              <a:t>10/25/2019</a:t>
             </a:fld>
             <a:endParaRPr lang="en-US" dirty="0"/>
           </a:p>
@@ -2116,7 +2116,7 @@
             <a:fld id="{B61BEF0D-F0BB-DE4B-95CE-6DB70DBA9567}" type="datetimeFigureOut">
               <a:rPr lang="en-US" dirty="0"/>
               <a:pPr/>
-              <a:t>10/23/2019</a:t>
+              <a:t>10/25/2019</a:t>
             </a:fld>
             <a:endParaRPr lang="en-US" dirty="0"/>
           </a:p>
@@ -2427,7 +2427,7 @@
             <a:fld id="{B61BEF0D-F0BB-DE4B-95CE-6DB70DBA9567}" type="datetimeFigureOut">
               <a:rPr lang="en-US" dirty="0"/>
               <a:pPr/>
-              <a:t>10/23/2019</a:t>
+              <a:t>10/25/2019</a:t>
             </a:fld>
             <a:endParaRPr lang="en-US" dirty="0"/>
           </a:p>
@@ -2817,7 +2817,7 @@
             <a:fld id="{B61BEF0D-F0BB-DE4B-95CE-6DB70DBA9567}" type="datetimeFigureOut">
               <a:rPr lang="en-US" dirty="0"/>
               <a:pPr/>
-              <a:t>10/23/2019</a:t>
+              <a:t>10/25/2019</a:t>
             </a:fld>
             <a:endParaRPr lang="en-US" dirty="0"/>
           </a:p>
@@ -2983,7 +2983,7 @@
           <a:p>
             <a:fld id="{55C6B4A9-1611-4792-9094-5F34BCA07E0B}" type="datetimeFigureOut">
               <a:rPr lang="en-US" dirty="0"/>
-              <a:t>10/23/2019</a:t>
+              <a:t>10/25/2019</a:t>
             </a:fld>
             <a:endParaRPr lang="en-US" dirty="0"/>
           </a:p>
@@ -3159,7 +3159,7 @@
             <a:fld id="{B61BEF0D-F0BB-DE4B-95CE-6DB70DBA9567}" type="datetimeFigureOut">
               <a:rPr lang="en-US" dirty="0"/>
               <a:pPr/>
-              <a:t>10/23/2019</a:t>
+              <a:t>10/25/2019</a:t>
             </a:fld>
             <a:endParaRPr lang="en-US" dirty="0"/>
           </a:p>
@@ -3332,7 +3332,7 @@
             <a:fld id="{B61BEF0D-F0BB-DE4B-95CE-6DB70DBA9567}" type="datetimeFigureOut">
               <a:rPr lang="en-US" dirty="0"/>
               <a:pPr/>
-              <a:t>10/23/2019</a:t>
+              <a:t>10/25/2019</a:t>
             </a:fld>
             <a:endParaRPr lang="en-US" dirty="0"/>
           </a:p>
@@ -3576,7 +3576,7 @@
             <a:fld id="{B61BEF0D-F0BB-DE4B-95CE-6DB70DBA9567}" type="datetimeFigureOut">
               <a:rPr lang="en-US" dirty="0"/>
               <a:pPr/>
-              <a:t>10/23/2019</a:t>
+              <a:t>10/25/2019</a:t>
             </a:fld>
             <a:endParaRPr lang="en-US" dirty="0"/>
           </a:p>
@@ -3804,7 +3804,7 @@
           <a:p>
             <a:fld id="{EB712588-04B1-427B-82EE-E8DB90309F08}" type="datetimeFigureOut">
               <a:rPr lang="en-US" dirty="0"/>
-              <a:t>10/23/2019</a:t>
+              <a:t>10/25/2019</a:t>
             </a:fld>
             <a:endParaRPr lang="en-US" dirty="0"/>
           </a:p>
@@ -4174,7 +4174,7 @@
             <a:fld id="{B61BEF0D-F0BB-DE4B-95CE-6DB70DBA9567}" type="datetimeFigureOut">
               <a:rPr lang="en-US" dirty="0"/>
               <a:pPr/>
-              <a:t>10/23/2019</a:t>
+              <a:t>10/25/2019</a:t>
             </a:fld>
             <a:endParaRPr lang="en-US" dirty="0"/>
           </a:p>
@@ -4294,7 +4294,7 @@
             <a:fld id="{B61BEF0D-F0BB-DE4B-95CE-6DB70DBA9567}" type="datetimeFigureOut">
               <a:rPr lang="en-US" dirty="0"/>
               <a:pPr/>
-              <a:t>10/23/2019</a:t>
+              <a:t>10/25/2019</a:t>
             </a:fld>
             <a:endParaRPr lang="en-US" dirty="0"/>
           </a:p>
@@ -4386,7 +4386,7 @@
             <a:fld id="{B61BEF0D-F0BB-DE4B-95CE-6DB70DBA9567}" type="datetimeFigureOut">
               <a:rPr lang="en-US" dirty="0"/>
               <a:pPr/>
-              <a:t>10/23/2019</a:t>
+              <a:t>10/25/2019</a:t>
             </a:fld>
             <a:endParaRPr lang="en-US" dirty="0"/>
           </a:p>
@@ -4637,7 +4637,7 @@
           <a:p>
             <a:fld id="{42A54C80-263E-416B-A8E0-580EDEADCBDC}" type="datetimeFigureOut">
               <a:rPr lang="en-US" dirty="0"/>
-              <a:t>10/23/2019</a:t>
+              <a:t>10/25/2019</a:t>
             </a:fld>
             <a:endParaRPr lang="en-US" dirty="0"/>
           </a:p>
@@ -4896,7 +4896,7 @@
             <a:fld id="{B61BEF0D-F0BB-DE4B-95CE-6DB70DBA9567}" type="datetimeFigureOut">
               <a:rPr lang="en-US" dirty="0"/>
               <a:pPr/>
-              <a:t>10/23/2019</a:t>
+              <a:t>10/25/2019</a:t>
             </a:fld>
             <a:endParaRPr lang="en-US" dirty="0"/>
           </a:p>
@@ -5636,7 +5636,7 @@
             <a:fld id="{B61BEF0D-F0BB-DE4B-95CE-6DB70DBA9567}" type="datetimeFigureOut">
               <a:rPr lang="en-US" dirty="0"/>
               <a:pPr/>
-              <a:t>10/23/2019</a:t>
+              <a:t>10/25/2019</a:t>
             </a:fld>
             <a:endParaRPr lang="en-US" dirty="0"/>
           </a:p>
@@ -6294,38 +6294,240 @@
           <a:bodyPr/>
           <a:lstStyle/>
           <a:p>
+            <a:pPr algn="ctr"/>
             <a:r>
               <a:rPr lang="en-US" dirty="0"/>
-              <a:t>KNN Investigation between IPAs and other ALEs</a:t>
-            </a:r>
-          </a:p>
-        </p:txBody>
-      </p:sp>
-      <p:sp>
-        <p:nvSpPr>
-          <p:cNvPr id="3" name="Content Placeholder 2">
+              <a:t>KNN results between IPAs and other ALEs, classifying ABV and IBU</a:t>
+            </a:r>
+          </a:p>
+        </p:txBody>
+      </p:sp>
+      <p:graphicFrame>
+        <p:nvGraphicFramePr>
+          <p:cNvPr id="5" name="Content Placeholder 4">
             <a:extLst>
               <a:ext uri="{FF2B5EF4-FFF2-40B4-BE49-F238E27FC236}">
-                <a16:creationId xmlns:a16="http://schemas.microsoft.com/office/drawing/2014/main" id="{794A5E61-C420-444D-94D9-9A1CEBF3B1C1}"/>
+                <a16:creationId xmlns:a16="http://schemas.microsoft.com/office/drawing/2014/main" id="{1A3C2356-8EB1-459E-AF81-737CDEDD411C}"/>
               </a:ext>
             </a:extLst>
           </p:cNvPr>
-          <p:cNvSpPr>
-            <a:spLocks noGrp="1"/>
-          </p:cNvSpPr>
+          <p:cNvGraphicFramePr>
+            <a:graphicFrameLocks noGrp="1"/>
+          </p:cNvGraphicFramePr>
           <p:nvPr>
             <p:ph idx="1"/>
-          </p:nvPr>
-        </p:nvSpPr>
-        <p:spPr/>
-        <p:txBody>
-          <a:bodyPr/>
-          <a:lstStyle/>
-          <a:p>
-            <a:endParaRPr lang="en-US" dirty="0"/>
-          </a:p>
-        </p:txBody>
-      </p:sp>
+            <p:extLst>
+              <p:ext uri="{D42A27DB-BD31-4B8C-83A1-F6EECF244321}">
+                <p14:modId xmlns:p14="http://schemas.microsoft.com/office/powerpoint/2010/main" val="1887992867"/>
+              </p:ext>
+            </p:extLst>
+          </p:nvPr>
+        </p:nvGraphicFramePr>
+        <p:xfrm>
+          <a:off x="1334196" y="5737248"/>
+          <a:ext cx="7282944" cy="741680"/>
+        </p:xfrm>
+        <a:graphic>
+          <a:graphicData uri="http://schemas.openxmlformats.org/drawingml/2006/table">
+            <a:tbl>
+              <a:tblPr firstRow="1" bandRow="1">
+                <a:tableStyleId>{5C22544A-7EE6-4342-B048-85BDC9FD1C3A}</a:tableStyleId>
+              </a:tblPr>
+              <a:tblGrid>
+                <a:gridCol w="1353878">
+                  <a:extLst>
+                    <a:ext uri="{9D8B030D-6E8A-4147-A177-3AD203B41FA5}">
+                      <a16:colId xmlns:a16="http://schemas.microsoft.com/office/drawing/2014/main" val="3174116389"/>
+                    </a:ext>
+                  </a:extLst>
+                </a:gridCol>
+                <a:gridCol w="2264331">
+                  <a:extLst>
+                    <a:ext uri="{9D8B030D-6E8A-4147-A177-3AD203B41FA5}">
+                      <a16:colId xmlns:a16="http://schemas.microsoft.com/office/drawing/2014/main" val="2572968694"/>
+                    </a:ext>
+                  </a:extLst>
+                </a:gridCol>
+                <a:gridCol w="1809104">
+                  <a:extLst>
+                    <a:ext uri="{9D8B030D-6E8A-4147-A177-3AD203B41FA5}">
+                      <a16:colId xmlns:a16="http://schemas.microsoft.com/office/drawing/2014/main" val="3619162727"/>
+                    </a:ext>
+                  </a:extLst>
+                </a:gridCol>
+                <a:gridCol w="1855631">
+                  <a:extLst>
+                    <a:ext uri="{9D8B030D-6E8A-4147-A177-3AD203B41FA5}">
+                      <a16:colId xmlns:a16="http://schemas.microsoft.com/office/drawing/2014/main" val="2428075734"/>
+                    </a:ext>
+                  </a:extLst>
+                </a:gridCol>
+              </a:tblGrid>
+              <a:tr h="370840">
+                <a:tc>
+                  <a:txBody>
+                    <a:bodyPr/>
+                    <a:lstStyle/>
+                    <a:p>
+                      <a:pPr algn="ctr"/>
+                      <a:r>
+                        <a:rPr lang="en-US" sz="1600" dirty="0"/>
+                        <a:t>Best K</a:t>
+                      </a:r>
+                    </a:p>
+                  </a:txBody>
+                  <a:tcPr/>
+                </a:tc>
+                <a:tc>
+                  <a:txBody>
+                    <a:bodyPr/>
+                    <a:lstStyle/>
+                    <a:p>
+                      <a:pPr algn="ctr"/>
+                      <a:r>
+                        <a:rPr lang="en-US" sz="1600" dirty="0"/>
+                        <a:t>Specificity</a:t>
+                      </a:r>
+                    </a:p>
+                  </a:txBody>
+                  <a:tcPr/>
+                </a:tc>
+                <a:tc>
+                  <a:txBody>
+                    <a:bodyPr/>
+                    <a:lstStyle/>
+                    <a:p>
+                      <a:pPr algn="ctr"/>
+                      <a:r>
+                        <a:rPr lang="en-US" sz="1600" dirty="0"/>
+                        <a:t>Sensitivity</a:t>
+                      </a:r>
+                    </a:p>
+                  </a:txBody>
+                  <a:tcPr/>
+                </a:tc>
+                <a:tc>
+                  <a:txBody>
+                    <a:bodyPr/>
+                    <a:lstStyle/>
+                    <a:p>
+                      <a:pPr algn="ctr"/>
+                      <a:r>
+                        <a:rPr lang="en-US" sz="1600" dirty="0"/>
+                        <a:t>Accuracy</a:t>
+                      </a:r>
+                    </a:p>
+                  </a:txBody>
+                  <a:tcPr/>
+                </a:tc>
+                <a:extLst>
+                  <a:ext uri="{0D108BD9-81ED-4DB2-BD59-A6C34878D82A}">
+                    <a16:rowId xmlns:a16="http://schemas.microsoft.com/office/drawing/2014/main" val="3022534811"/>
+                  </a:ext>
+                </a:extLst>
+              </a:tr>
+              <a:tr h="370840">
+                <a:tc>
+                  <a:txBody>
+                    <a:bodyPr/>
+                    <a:lstStyle/>
+                    <a:p>
+                      <a:pPr algn="ctr"/>
+                      <a:r>
+                        <a:rPr lang="en-US" dirty="0"/>
+                        <a:t>5</a:t>
+                      </a:r>
+                    </a:p>
+                  </a:txBody>
+                  <a:tcPr/>
+                </a:tc>
+                <a:tc>
+                  <a:txBody>
+                    <a:bodyPr/>
+                    <a:lstStyle/>
+                    <a:p>
+                      <a:pPr algn="ctr"/>
+                      <a:r>
+                        <a:rPr lang="en-US" dirty="0"/>
+                        <a:t>72%</a:t>
+                      </a:r>
+                    </a:p>
+                  </a:txBody>
+                  <a:tcPr/>
+                </a:tc>
+                <a:tc>
+                  <a:txBody>
+                    <a:bodyPr/>
+                    <a:lstStyle/>
+                    <a:p>
+                      <a:pPr algn="ctr"/>
+                      <a:r>
+                        <a:rPr lang="en-US" dirty="0"/>
+                        <a:t>90%</a:t>
+                      </a:r>
+                    </a:p>
+                  </a:txBody>
+                  <a:tcPr/>
+                </a:tc>
+                <a:tc>
+                  <a:txBody>
+                    <a:bodyPr/>
+                    <a:lstStyle/>
+                    <a:p>
+                      <a:pPr algn="ctr"/>
+                      <a:r>
+                        <a:rPr lang="en-US" dirty="0"/>
+                        <a:t>83%</a:t>
+                      </a:r>
+                    </a:p>
+                  </a:txBody>
+                  <a:tcPr/>
+                </a:tc>
+                <a:extLst>
+                  <a:ext uri="{0D108BD9-81ED-4DB2-BD59-A6C34878D82A}">
+                    <a16:rowId xmlns:a16="http://schemas.microsoft.com/office/drawing/2014/main" val="4085454544"/>
+                  </a:ext>
+                </a:extLst>
+              </a:tr>
+            </a:tbl>
+          </a:graphicData>
+        </a:graphic>
+      </p:graphicFrame>
+      <p:pic>
+        <p:nvPicPr>
+          <p:cNvPr id="6" name="Picture 5">
+            <a:extLst>
+              <a:ext uri="{FF2B5EF4-FFF2-40B4-BE49-F238E27FC236}">
+                <a16:creationId xmlns:a16="http://schemas.microsoft.com/office/drawing/2014/main" id="{50494600-E250-47B3-98E8-1046C6CAF1E0}"/>
+              </a:ext>
+            </a:extLst>
+          </p:cNvPr>
+          <p:cNvPicPr>
+            <a:picLocks noChangeAspect="1"/>
+          </p:cNvPicPr>
+          <p:nvPr/>
+        </p:nvPicPr>
+        <p:blipFill>
+          <a:blip r:embed="rId2"/>
+          <a:stretch>
+            <a:fillRect/>
+          </a:stretch>
+        </p:blipFill>
+        <p:spPr>
+          <a:xfrm>
+            <a:off x="1334196" y="1928290"/>
+            <a:ext cx="7282944" cy="3808958"/>
+          </a:xfrm>
+          <a:prstGeom prst="rect">
+            <a:avLst/>
+          </a:prstGeom>
+          <a:ln>
+            <a:solidFill>
+              <a:schemeClr val="accent1"/>
+            </a:solidFill>
+          </a:ln>
+        </p:spPr>
+      </p:pic>
     </p:spTree>
     <p:extLst>
       <p:ext uri="{BB962C8B-B14F-4D97-AF65-F5344CB8AC3E}">
@@ -6445,6 +6647,45 @@
           </a:prstGeom>
         </p:spPr>
       </p:pic>
+      <p:sp>
+        <p:nvSpPr>
+          <p:cNvPr id="3" name="TextBox 2">
+            <a:extLst>
+              <a:ext uri="{FF2B5EF4-FFF2-40B4-BE49-F238E27FC236}">
+                <a16:creationId xmlns:a16="http://schemas.microsoft.com/office/drawing/2014/main" id="{94B4D8DC-9206-4B90-B9F7-636D210871B7}"/>
+              </a:ext>
+            </a:extLst>
+          </p:cNvPr>
+          <p:cNvSpPr txBox="1"/>
+          <p:nvPr/>
+        </p:nvSpPr>
+        <p:spPr>
+          <a:xfrm>
+            <a:off x="1792150" y="5423770"/>
+            <a:ext cx="2092377" cy="584775"/>
+          </a:xfrm>
+          <a:prstGeom prst="rect">
+            <a:avLst/>
+          </a:prstGeom>
+          <a:noFill/>
+        </p:spPr>
+        <p:txBody>
+          <a:bodyPr wrap="square" rtlCol="0">
+            <a:spAutoFit/>
+          </a:bodyPr>
+          <a:lstStyle/>
+          <a:p>
+            <a:r>
+              <a:rPr lang="en-US" sz="1600" dirty="0" err="1"/>
+              <a:t>Budweizer</a:t>
+            </a:r>
+            <a:r>
+              <a:rPr lang="en-US" sz="1600" dirty="0"/>
+              <a:t> and Bud Light or Lagers</a:t>
+            </a:r>
+          </a:p>
+        </p:txBody>
+      </p:sp>
     </p:spTree>
     <p:extLst>
       <p:ext uri="{BB962C8B-B14F-4D97-AF65-F5344CB8AC3E}">
@@ -6496,6 +6737,7 @@
           <a:bodyPr/>
           <a:lstStyle/>
           <a:p>
+            <a:pPr algn="ctr"/>
             <a:r>
               <a:rPr lang="en-US" dirty="0"/>
               <a:t>Midwest Region: Top 10 Beer Styles</a:t>
@@ -8252,7 +8494,7 @@
         </p:blipFill>
         <p:spPr>
           <a:xfrm>
-            <a:off x="1499658" y="2398113"/>
+            <a:off x="1499658" y="2407349"/>
             <a:ext cx="6311111" cy="3898413"/>
           </a:xfrm>
           <a:prstGeom prst="rect">
@@ -8274,8 +8516,8 @@
         </p:nvSpPr>
         <p:spPr>
           <a:xfrm>
-            <a:off x="1683198" y="5940623"/>
-            <a:ext cx="1452369" cy="307777"/>
+            <a:off x="1665962" y="5940623"/>
+            <a:ext cx="1469605" cy="307777"/>
           </a:xfrm>
           <a:prstGeom prst="rect">
             <a:avLst/>
@@ -8379,8 +8621,38 @@
         </p:blipFill>
         <p:spPr>
           <a:xfrm>
-            <a:off x="1429638" y="2562050"/>
+            <a:off x="1429638" y="2571286"/>
             <a:ext cx="5977002" cy="3686350"/>
+          </a:xfrm>
+          <a:prstGeom prst="rect">
+            <a:avLst/>
+          </a:prstGeom>
+        </p:spPr>
+      </p:pic>
+      <p:pic>
+        <p:nvPicPr>
+          <p:cNvPr id="3" name="Picture 2">
+            <a:extLst>
+              <a:ext uri="{FF2B5EF4-FFF2-40B4-BE49-F238E27FC236}">
+                <a16:creationId xmlns:a16="http://schemas.microsoft.com/office/drawing/2014/main" id="{D3022B7F-293C-4F79-890F-D16EB4D3C82B}"/>
+              </a:ext>
+            </a:extLst>
+          </p:cNvPr>
+          <p:cNvPicPr>
+            <a:picLocks noChangeAspect="1"/>
+          </p:cNvPicPr>
+          <p:nvPr/>
+        </p:nvPicPr>
+        <p:blipFill>
+          <a:blip r:embed="rId3"/>
+          <a:stretch>
+            <a:fillRect/>
+          </a:stretch>
+        </p:blipFill>
+        <p:spPr>
+          <a:xfrm>
+            <a:off x="1429638" y="6001490"/>
+            <a:ext cx="1658256" cy="493819"/>
           </a:xfrm>
           <a:prstGeom prst="rect">
             <a:avLst/>
@@ -8473,7 +8745,7 @@
         </p:blipFill>
         <p:spPr>
           <a:xfrm>
-            <a:off x="6496298" y="2513339"/>
+            <a:off x="5886698" y="2513338"/>
             <a:ext cx="3767626" cy="2323705"/>
           </a:xfrm>
           <a:prstGeom prst="rect">
@@ -8503,7 +8775,7 @@
         </p:blipFill>
         <p:spPr>
           <a:xfrm>
-            <a:off x="1928076" y="2513339"/>
+            <a:off x="1069094" y="2513338"/>
             <a:ext cx="3761828" cy="2323705"/>
           </a:xfrm>
           <a:prstGeom prst="rect">
@@ -9695,7 +9967,7 @@
         </p:blipFill>
         <p:spPr>
           <a:xfrm>
-            <a:off x="4334318" y="1914618"/>
+            <a:off x="4014499" y="1938867"/>
             <a:ext cx="5472728" cy="3375337"/>
           </a:xfrm>
           <a:prstGeom prst="rect">

</xml_diff>

<commit_message>
Added new plot for knn data. added to slide
</commit_message>
<xml_diff>
--- a/MalcolmCarlsonBeerDataEDA.DDS6306.pptx
+++ b/MalcolmCarlsonBeerDataEDA.DDS6306.pptx
@@ -5,7 +5,7 @@
     <p:sldMasterId id="2147483648" r:id="rId1"/>
   </p:sldMasterIdLst>
   <p:notesMasterIdLst>
-    <p:notesMasterId r:id="rId23"/>
+    <p:notesMasterId r:id="rId24"/>
   </p:notesMasterIdLst>
   <p:sldIdLst>
     <p:sldId id="256" r:id="rId2"/>
@@ -17,18 +17,19 @@
     <p:sldId id="274" r:id="rId8"/>
     <p:sldId id="262" r:id="rId9"/>
     <p:sldId id="271" r:id="rId10"/>
-    <p:sldId id="272" r:id="rId11"/>
-    <p:sldId id="275" r:id="rId12"/>
-    <p:sldId id="276" r:id="rId13"/>
-    <p:sldId id="277" r:id="rId14"/>
-    <p:sldId id="273" r:id="rId15"/>
-    <p:sldId id="265" r:id="rId16"/>
-    <p:sldId id="270" r:id="rId17"/>
-    <p:sldId id="266" r:id="rId18"/>
-    <p:sldId id="264" r:id="rId19"/>
-    <p:sldId id="263" r:id="rId20"/>
-    <p:sldId id="269" r:id="rId21"/>
-    <p:sldId id="267" r:id="rId22"/>
+    <p:sldId id="278" r:id="rId11"/>
+    <p:sldId id="272" r:id="rId12"/>
+    <p:sldId id="275" r:id="rId13"/>
+    <p:sldId id="276" r:id="rId14"/>
+    <p:sldId id="277" r:id="rId15"/>
+    <p:sldId id="273" r:id="rId16"/>
+    <p:sldId id="265" r:id="rId17"/>
+    <p:sldId id="270" r:id="rId18"/>
+    <p:sldId id="266" r:id="rId19"/>
+    <p:sldId id="264" r:id="rId20"/>
+    <p:sldId id="263" r:id="rId21"/>
+    <p:sldId id="269" r:id="rId22"/>
+    <p:sldId id="267" r:id="rId23"/>
   </p:sldIdLst>
   <p:sldSz cx="12192000" cy="6858000"/>
   <p:notesSz cx="6858000" cy="9144000"/>
@@ -6278,6 +6279,94 @@
           <p:cNvPr id="2" name="Title 1">
             <a:extLst>
               <a:ext uri="{FF2B5EF4-FFF2-40B4-BE49-F238E27FC236}">
+                <a16:creationId xmlns:a16="http://schemas.microsoft.com/office/drawing/2014/main" id="{39500BED-7B1D-4791-B590-2714E6014A7E}"/>
+              </a:ext>
+            </a:extLst>
+          </p:cNvPr>
+          <p:cNvSpPr>
+            <a:spLocks noGrp="1"/>
+          </p:cNvSpPr>
+          <p:nvPr>
+            <p:ph type="title"/>
+          </p:nvPr>
+        </p:nvSpPr>
+        <p:spPr/>
+        <p:txBody>
+          <a:bodyPr/>
+          <a:lstStyle/>
+          <a:p>
+            <a:r>
+              <a:rPr lang="en-US" dirty="0"/>
+              <a:t>Scatter Plot of ABV and IBU for all Ales</a:t>
+            </a:r>
+          </a:p>
+        </p:txBody>
+      </p:sp>
+      <p:pic>
+        <p:nvPicPr>
+          <p:cNvPr id="7" name="Picture 6">
+            <a:extLst>
+              <a:ext uri="{FF2B5EF4-FFF2-40B4-BE49-F238E27FC236}">
+                <a16:creationId xmlns:a16="http://schemas.microsoft.com/office/drawing/2014/main" id="{5A1DD4FF-BC1D-489D-9F7A-4707B5CC7B59}"/>
+              </a:ext>
+            </a:extLst>
+          </p:cNvPr>
+          <p:cNvPicPr>
+            <a:picLocks noChangeAspect="1"/>
+          </p:cNvPicPr>
+          <p:nvPr/>
+        </p:nvPicPr>
+        <p:blipFill>
+          <a:blip r:embed="rId2"/>
+          <a:stretch>
+            <a:fillRect/>
+          </a:stretch>
+        </p:blipFill>
+        <p:spPr>
+          <a:xfrm>
+            <a:off x="505268" y="1628136"/>
+            <a:ext cx="8940800" cy="3878819"/>
+          </a:xfrm>
+          <a:prstGeom prst="rect">
+            <a:avLst/>
+          </a:prstGeom>
+        </p:spPr>
+      </p:pic>
+    </p:spTree>
+    <p:extLst>
+      <p:ext uri="{BB962C8B-B14F-4D97-AF65-F5344CB8AC3E}">
+        <p14:creationId xmlns:p14="http://schemas.microsoft.com/office/powerpoint/2010/main" val="3651669500"/>
+      </p:ext>
+    </p:extLst>
+  </p:cSld>
+  <p:clrMapOvr>
+    <a:masterClrMapping/>
+  </p:clrMapOvr>
+</p:sld>
+</file>
+
+<file path=ppt/slides/slide11.xml><?xml version="1.0" encoding="utf-8"?>
+<p:sld xmlns:a="http://schemas.openxmlformats.org/drawingml/2006/main" xmlns:r="http://schemas.openxmlformats.org/officeDocument/2006/relationships" xmlns:p="http://schemas.openxmlformats.org/presentationml/2006/main">
+  <p:cSld>
+    <p:spTree>
+      <p:nvGrpSpPr>
+        <p:cNvPr id="1" name=""/>
+        <p:cNvGrpSpPr/>
+        <p:nvPr/>
+      </p:nvGrpSpPr>
+      <p:grpSpPr>
+        <a:xfrm>
+          <a:off x="0" y="0"/>
+          <a:ext cx="0" cy="0"/>
+          <a:chOff x="0" y="0"/>
+          <a:chExt cx="0" cy="0"/>
+        </a:xfrm>
+      </p:grpSpPr>
+      <p:sp>
+        <p:nvSpPr>
+          <p:cNvPr id="2" name="Title 1">
+            <a:extLst>
+              <a:ext uri="{FF2B5EF4-FFF2-40B4-BE49-F238E27FC236}">
                 <a16:creationId xmlns:a16="http://schemas.microsoft.com/office/drawing/2014/main" id="{60F64C4D-1802-413A-ABAD-782AE74CB4A4}"/>
               </a:ext>
             </a:extLst>
@@ -6297,7 +6386,7 @@
             <a:pPr algn="ctr"/>
             <a:r>
               <a:rPr lang="en-US" dirty="0"/>
-              <a:t>KNN results between IPAs and other ALEs, classifying ABV and IBU</a:t>
+              <a:t>KNN results classifying IPAs or ALEs, using ABV and IBU</a:t>
             </a:r>
           </a:p>
         </p:txBody>
@@ -6541,7 +6630,7 @@
 </p:sld>
 </file>
 
-<file path=ppt/slides/slide11.xml><?xml version="1.0" encoding="utf-8"?>
+<file path=ppt/slides/slide12.xml><?xml version="1.0" encoding="utf-8"?>
 <p:sld xmlns:a="http://schemas.openxmlformats.org/drawingml/2006/main" xmlns:r="http://schemas.openxmlformats.org/officeDocument/2006/relationships" xmlns:p="http://schemas.openxmlformats.org/presentationml/2006/main">
   <p:cSld>
     <p:spTree>
@@ -6699,7 +6788,7 @@
 </p:sld>
 </file>
 
-<file path=ppt/slides/slide12.xml><?xml version="1.0" encoding="utf-8"?>
+<file path=ppt/slides/slide13.xml><?xml version="1.0" encoding="utf-8"?>
 <p:sld xmlns:a="http://schemas.openxmlformats.org/drawingml/2006/main" xmlns:r="http://schemas.openxmlformats.org/officeDocument/2006/relationships" xmlns:p="http://schemas.openxmlformats.org/presentationml/2006/main">
   <p:cSld>
     <p:spTree>
@@ -6818,7 +6907,7 @@
 </p:sld>
 </file>
 
-<file path=ppt/slides/slide13.xml><?xml version="1.0" encoding="utf-8"?>
+<file path=ppt/slides/slide14.xml><?xml version="1.0" encoding="utf-8"?>
 <p:sld xmlns:a="http://schemas.openxmlformats.org/drawingml/2006/main" xmlns:r="http://schemas.openxmlformats.org/officeDocument/2006/relationships" xmlns:p="http://schemas.openxmlformats.org/presentationml/2006/main">
   <p:cSld>
     <p:spTree>
@@ -6936,7 +7025,7 @@
 </p:sld>
 </file>
 
-<file path=ppt/slides/slide14.xml><?xml version="1.0" encoding="utf-8"?>
+<file path=ppt/slides/slide15.xml><?xml version="1.0" encoding="utf-8"?>
 <p:sld xmlns:a="http://schemas.openxmlformats.org/drawingml/2006/main" xmlns:r="http://schemas.openxmlformats.org/officeDocument/2006/relationships" xmlns:p="http://schemas.openxmlformats.org/presentationml/2006/main">
   <p:cSld>
     <p:spTree>
@@ -7055,89 +7144,6 @@
 </p:sld>
 </file>
 
-<file path=ppt/slides/slide15.xml><?xml version="1.0" encoding="utf-8"?>
-<p:sld xmlns:a="http://schemas.openxmlformats.org/drawingml/2006/main" xmlns:r="http://schemas.openxmlformats.org/officeDocument/2006/relationships" xmlns:p="http://schemas.openxmlformats.org/presentationml/2006/main">
-  <p:cSld>
-    <p:spTree>
-      <p:nvGrpSpPr>
-        <p:cNvPr id="1" name=""/>
-        <p:cNvGrpSpPr/>
-        <p:nvPr/>
-      </p:nvGrpSpPr>
-      <p:grpSpPr>
-        <a:xfrm>
-          <a:off x="0" y="0"/>
-          <a:ext cx="0" cy="0"/>
-          <a:chOff x="0" y="0"/>
-          <a:chExt cx="0" cy="0"/>
-        </a:xfrm>
-      </p:grpSpPr>
-      <p:sp>
-        <p:nvSpPr>
-          <p:cNvPr id="2" name="Title 1">
-            <a:extLst>
-              <a:ext uri="{FF2B5EF4-FFF2-40B4-BE49-F238E27FC236}">
-                <a16:creationId xmlns:a16="http://schemas.microsoft.com/office/drawing/2014/main" id="{F69C8142-A23F-4F98-A5BB-4318843625FA}"/>
-              </a:ext>
-            </a:extLst>
-          </p:cNvPr>
-          <p:cNvSpPr>
-            <a:spLocks noGrp="1"/>
-          </p:cNvSpPr>
-          <p:nvPr>
-            <p:ph type="title"/>
-          </p:nvPr>
-        </p:nvSpPr>
-        <p:spPr/>
-        <p:txBody>
-          <a:bodyPr/>
-          <a:lstStyle/>
-          <a:p>
-            <a:r>
-              <a:rPr lang="en-US" dirty="0"/>
-              <a:t>Thank You for your Time!</a:t>
-            </a:r>
-          </a:p>
-        </p:txBody>
-      </p:sp>
-      <p:sp>
-        <p:nvSpPr>
-          <p:cNvPr id="3" name="Content Placeholder 2">
-            <a:extLst>
-              <a:ext uri="{FF2B5EF4-FFF2-40B4-BE49-F238E27FC236}">
-                <a16:creationId xmlns:a16="http://schemas.microsoft.com/office/drawing/2014/main" id="{8C0C09CA-ACFC-4500-92FC-07CAF0572B09}"/>
-              </a:ext>
-            </a:extLst>
-          </p:cNvPr>
-          <p:cNvSpPr>
-            <a:spLocks noGrp="1"/>
-          </p:cNvSpPr>
-          <p:nvPr>
-            <p:ph idx="1"/>
-          </p:nvPr>
-        </p:nvSpPr>
-        <p:spPr/>
-        <p:txBody>
-          <a:bodyPr/>
-          <a:lstStyle/>
-          <a:p>
-            <a:endParaRPr lang="en-US"/>
-          </a:p>
-        </p:txBody>
-      </p:sp>
-    </p:spTree>
-    <p:extLst>
-      <p:ext uri="{BB962C8B-B14F-4D97-AF65-F5344CB8AC3E}">
-        <p14:creationId xmlns:p14="http://schemas.microsoft.com/office/powerpoint/2010/main" val="2620854637"/>
-      </p:ext>
-    </p:extLst>
-  </p:cSld>
-  <p:clrMapOvr>
-    <a:masterClrMapping/>
-  </p:clrMapOvr>
-</p:sld>
-</file>
-
 <file path=ppt/slides/slide16.xml><?xml version="1.0" encoding="utf-8"?>
 <p:sld xmlns:a="http://schemas.openxmlformats.org/drawingml/2006/main" xmlns:r="http://schemas.openxmlformats.org/officeDocument/2006/relationships" xmlns:p="http://schemas.openxmlformats.org/presentationml/2006/main">
   <p:cSld>
@@ -7160,7 +7166,7 @@
           <p:cNvPr id="2" name="Title 1">
             <a:extLst>
               <a:ext uri="{FF2B5EF4-FFF2-40B4-BE49-F238E27FC236}">
-                <a16:creationId xmlns:a16="http://schemas.microsoft.com/office/drawing/2014/main" id="{A51CAD72-9D39-4447-9D33-E6C0849A74F0}"/>
+                <a16:creationId xmlns:a16="http://schemas.microsoft.com/office/drawing/2014/main" id="{F69C8142-A23F-4F98-A5BB-4318843625FA}"/>
               </a:ext>
             </a:extLst>
           </p:cNvPr>
@@ -7178,7 +7184,7 @@
           <a:p>
             <a:r>
               <a:rPr lang="en-US" dirty="0"/>
-              <a:t>Backup</a:t>
+              <a:t>Thank You for your Time!</a:t>
             </a:r>
           </a:p>
         </p:txBody>
@@ -7188,7 +7194,7 @@
           <p:cNvPr id="3" name="Content Placeholder 2">
             <a:extLst>
               <a:ext uri="{FF2B5EF4-FFF2-40B4-BE49-F238E27FC236}">
-                <a16:creationId xmlns:a16="http://schemas.microsoft.com/office/drawing/2014/main" id="{161CB13F-AB08-4B5E-B535-EDEE9F95A8D1}"/>
+                <a16:creationId xmlns:a16="http://schemas.microsoft.com/office/drawing/2014/main" id="{8C0C09CA-ACFC-4500-92FC-07CAF0572B09}"/>
               </a:ext>
             </a:extLst>
           </p:cNvPr>
@@ -7211,7 +7217,7 @@
     </p:spTree>
     <p:extLst>
       <p:ext uri="{BB962C8B-B14F-4D97-AF65-F5344CB8AC3E}">
-        <p14:creationId xmlns:p14="http://schemas.microsoft.com/office/powerpoint/2010/main" val="798485300"/>
+        <p14:creationId xmlns:p14="http://schemas.microsoft.com/office/powerpoint/2010/main" val="2620854637"/>
       </p:ext>
     </p:extLst>
   </p:cSld>
@@ -7243,6 +7249,89 @@
           <p:cNvPr id="2" name="Title 1">
             <a:extLst>
               <a:ext uri="{FF2B5EF4-FFF2-40B4-BE49-F238E27FC236}">
+                <a16:creationId xmlns:a16="http://schemas.microsoft.com/office/drawing/2014/main" id="{A51CAD72-9D39-4447-9D33-E6C0849A74F0}"/>
+              </a:ext>
+            </a:extLst>
+          </p:cNvPr>
+          <p:cNvSpPr>
+            <a:spLocks noGrp="1"/>
+          </p:cNvSpPr>
+          <p:nvPr>
+            <p:ph type="title"/>
+          </p:nvPr>
+        </p:nvSpPr>
+        <p:spPr/>
+        <p:txBody>
+          <a:bodyPr/>
+          <a:lstStyle/>
+          <a:p>
+            <a:r>
+              <a:rPr lang="en-US" dirty="0"/>
+              <a:t>Backup</a:t>
+            </a:r>
+          </a:p>
+        </p:txBody>
+      </p:sp>
+      <p:sp>
+        <p:nvSpPr>
+          <p:cNvPr id="3" name="Content Placeholder 2">
+            <a:extLst>
+              <a:ext uri="{FF2B5EF4-FFF2-40B4-BE49-F238E27FC236}">
+                <a16:creationId xmlns:a16="http://schemas.microsoft.com/office/drawing/2014/main" id="{161CB13F-AB08-4B5E-B535-EDEE9F95A8D1}"/>
+              </a:ext>
+            </a:extLst>
+          </p:cNvPr>
+          <p:cNvSpPr>
+            <a:spLocks noGrp="1"/>
+          </p:cNvSpPr>
+          <p:nvPr>
+            <p:ph idx="1"/>
+          </p:nvPr>
+        </p:nvSpPr>
+        <p:spPr/>
+        <p:txBody>
+          <a:bodyPr/>
+          <a:lstStyle/>
+          <a:p>
+            <a:endParaRPr lang="en-US"/>
+          </a:p>
+        </p:txBody>
+      </p:sp>
+    </p:spTree>
+    <p:extLst>
+      <p:ext uri="{BB962C8B-B14F-4D97-AF65-F5344CB8AC3E}">
+        <p14:creationId xmlns:p14="http://schemas.microsoft.com/office/powerpoint/2010/main" val="798485300"/>
+      </p:ext>
+    </p:extLst>
+  </p:cSld>
+  <p:clrMapOvr>
+    <a:masterClrMapping/>
+  </p:clrMapOvr>
+</p:sld>
+</file>
+
+<file path=ppt/slides/slide18.xml><?xml version="1.0" encoding="utf-8"?>
+<p:sld xmlns:a="http://schemas.openxmlformats.org/drawingml/2006/main" xmlns:r="http://schemas.openxmlformats.org/officeDocument/2006/relationships" xmlns:p="http://schemas.openxmlformats.org/presentationml/2006/main">
+  <p:cSld>
+    <p:spTree>
+      <p:nvGrpSpPr>
+        <p:cNvPr id="1" name=""/>
+        <p:cNvGrpSpPr/>
+        <p:nvPr/>
+      </p:nvGrpSpPr>
+      <p:grpSpPr>
+        <a:xfrm>
+          <a:off x="0" y="0"/>
+          <a:ext cx="0" cy="0"/>
+          <a:chOff x="0" y="0"/>
+          <a:chExt cx="0" cy="0"/>
+        </a:xfrm>
+      </p:grpSpPr>
+      <p:sp>
+        <p:nvSpPr>
+          <p:cNvPr id="2" name="Title 1">
+            <a:extLst>
+              <a:ext uri="{FF2B5EF4-FFF2-40B4-BE49-F238E27FC236}">
                 <a16:creationId xmlns:a16="http://schemas.microsoft.com/office/drawing/2014/main" id="{D9D0F948-B4C6-422F-9E04-43BB3ED65E27}"/>
               </a:ext>
             </a:extLst>
@@ -7329,7 +7418,7 @@
 </p:sld>
 </file>
 
-<file path=ppt/slides/slide18.xml><?xml version="1.0" encoding="utf-8"?>
+<file path=ppt/slides/slide19.xml><?xml version="1.0" encoding="utf-8"?>
 <p:sld xmlns:a="http://schemas.openxmlformats.org/drawingml/2006/main" xmlns:r="http://schemas.openxmlformats.org/officeDocument/2006/relationships" xmlns:p="http://schemas.openxmlformats.org/presentationml/2006/main">
   <p:cSld>
     <p:spTree>
@@ -7461,164 +7550,6 @@
     <p:extLst>
       <p:ext uri="{BB962C8B-B14F-4D97-AF65-F5344CB8AC3E}">
         <p14:creationId xmlns:p14="http://schemas.microsoft.com/office/powerpoint/2010/main" val="4059305275"/>
-      </p:ext>
-    </p:extLst>
-  </p:cSld>
-  <p:clrMapOvr>
-    <a:masterClrMapping/>
-  </p:clrMapOvr>
-</p:sld>
-</file>
-
-<file path=ppt/slides/slide19.xml><?xml version="1.0" encoding="utf-8"?>
-<p:sld xmlns:a="http://schemas.openxmlformats.org/drawingml/2006/main" xmlns:r="http://schemas.openxmlformats.org/officeDocument/2006/relationships" xmlns:p="http://schemas.openxmlformats.org/presentationml/2006/main">
-  <p:cSld>
-    <p:spTree>
-      <p:nvGrpSpPr>
-        <p:cNvPr id="1" name=""/>
-        <p:cNvGrpSpPr/>
-        <p:nvPr/>
-      </p:nvGrpSpPr>
-      <p:grpSpPr>
-        <a:xfrm>
-          <a:off x="0" y="0"/>
-          <a:ext cx="0" cy="0"/>
-          <a:chOff x="0" y="0"/>
-          <a:chExt cx="0" cy="0"/>
-        </a:xfrm>
-      </p:grpSpPr>
-      <p:sp>
-        <p:nvSpPr>
-          <p:cNvPr id="2" name="Title 1">
-            <a:extLst>
-              <a:ext uri="{FF2B5EF4-FFF2-40B4-BE49-F238E27FC236}">
-                <a16:creationId xmlns:a16="http://schemas.microsoft.com/office/drawing/2014/main" id="{2A8A4ABE-5343-4348-8236-6BC0C27406A1}"/>
-              </a:ext>
-            </a:extLst>
-          </p:cNvPr>
-          <p:cNvSpPr>
-            <a:spLocks noGrp="1"/>
-          </p:cNvSpPr>
-          <p:nvPr>
-            <p:ph type="title"/>
-          </p:nvPr>
-        </p:nvSpPr>
-        <p:spPr/>
-        <p:txBody>
-          <a:bodyPr>
-            <a:normAutofit fontScale="90000"/>
-          </a:bodyPr>
-          <a:lstStyle/>
-          <a:p>
-            <a:r>
-              <a:rPr lang="en-US" dirty="0">
-                <a:latin typeface="Arial" panose="020B0604020202020204" pitchFamily="34" charset="0"/>
-                <a:cs typeface="Arial" panose="020B0604020202020204" pitchFamily="34" charset="0"/>
-              </a:rPr>
-              <a:t>Question of Interest:  A relationship exists between Alcohol by Volume and International Bitterness Units.</a:t>
-            </a:r>
-          </a:p>
-        </p:txBody>
-      </p:sp>
-      <p:sp>
-        <p:nvSpPr>
-          <p:cNvPr id="3" name="Content Placeholder 2">
-            <a:extLst>
-              <a:ext uri="{FF2B5EF4-FFF2-40B4-BE49-F238E27FC236}">
-                <a16:creationId xmlns:a16="http://schemas.microsoft.com/office/drawing/2014/main" id="{20F2F60B-6F4B-4E43-8E80-7EE872BE35CF}"/>
-              </a:ext>
-            </a:extLst>
-          </p:cNvPr>
-          <p:cNvSpPr>
-            <a:spLocks noGrp="1"/>
-          </p:cNvSpPr>
-          <p:nvPr>
-            <p:ph idx="1"/>
-          </p:nvPr>
-        </p:nvSpPr>
-        <p:spPr>
-          <a:xfrm>
-            <a:off x="677334" y="2160589"/>
-            <a:ext cx="3491895" cy="3379077"/>
-          </a:xfrm>
-        </p:spPr>
-        <p:txBody>
-          <a:bodyPr>
-            <a:normAutofit/>
-          </a:bodyPr>
-          <a:lstStyle/>
-          <a:p>
-            <a:pPr marL="0" indent="0">
-              <a:buNone/>
-            </a:pPr>
-            <a:r>
-              <a:rPr lang="en-US" dirty="0">
-                <a:latin typeface="Arial" panose="020B0604020202020204" pitchFamily="34" charset="0"/>
-                <a:cs typeface="Arial" panose="020B0604020202020204" pitchFamily="34" charset="0"/>
-              </a:rPr>
-              <a:t>A scatter plot of Alcohol by Volume and International Bitterness Unit does not appear to have a relationship.  </a:t>
-            </a:r>
-          </a:p>
-          <a:p>
-            <a:pPr marL="0" indent="0">
-              <a:buNone/>
-            </a:pPr>
-            <a:r>
-              <a:rPr lang="en-US" dirty="0">
-                <a:latin typeface="Arial" panose="020B0604020202020204" pitchFamily="34" charset="0"/>
-                <a:cs typeface="Arial" panose="020B0604020202020204" pitchFamily="34" charset="0"/>
-              </a:rPr>
-              <a:t>The scatter plots of ABV and IBU do not show much of a pattern.</a:t>
-            </a:r>
-          </a:p>
-          <a:p>
-            <a:pPr marL="0" indent="0">
-              <a:buNone/>
-            </a:pPr>
-            <a:r>
-              <a:rPr lang="en-US" dirty="0">
-                <a:latin typeface="Arial" panose="020B0604020202020204" pitchFamily="34" charset="0"/>
-                <a:cs typeface="Arial" panose="020B0604020202020204" pitchFamily="34" charset="0"/>
-              </a:rPr>
-              <a:t>A linear regression was used to test if there was a relationship between ABV and IBU. </a:t>
-            </a:r>
-          </a:p>
-        </p:txBody>
-      </p:sp>
-      <p:pic>
-        <p:nvPicPr>
-          <p:cNvPr id="4" name="Picture 3">
-            <a:extLst>
-              <a:ext uri="{FF2B5EF4-FFF2-40B4-BE49-F238E27FC236}">
-                <a16:creationId xmlns:a16="http://schemas.microsoft.com/office/drawing/2014/main" id="{DF0AE0DA-992B-4C8E-86CB-ACE29FC114AD}"/>
-              </a:ext>
-            </a:extLst>
-          </p:cNvPr>
-          <p:cNvPicPr>
-            <a:picLocks noChangeAspect="1"/>
-          </p:cNvPicPr>
-          <p:nvPr/>
-        </p:nvPicPr>
-        <p:blipFill>
-          <a:blip r:embed="rId2"/>
-          <a:stretch>
-            <a:fillRect/>
-          </a:stretch>
-        </p:blipFill>
-        <p:spPr>
-          <a:xfrm>
-            <a:off x="4528458" y="2160589"/>
-            <a:ext cx="5741536" cy="3542649"/>
-          </a:xfrm>
-          <a:prstGeom prst="rect">
-            <a:avLst/>
-          </a:prstGeom>
-        </p:spPr>
-      </p:pic>
-    </p:spTree>
-    <p:extLst>
-      <p:ext uri="{BB962C8B-B14F-4D97-AF65-F5344CB8AC3E}">
-        <p14:creationId xmlns:p14="http://schemas.microsoft.com/office/powerpoint/2010/main" val="3504272927"/>
       </p:ext>
     </p:extLst>
   </p:cSld>
@@ -7751,6 +7682,164 @@
 </file>
 
 <file path=ppt/slides/slide20.xml><?xml version="1.0" encoding="utf-8"?>
+<p:sld xmlns:a="http://schemas.openxmlformats.org/drawingml/2006/main" xmlns:r="http://schemas.openxmlformats.org/officeDocument/2006/relationships" xmlns:p="http://schemas.openxmlformats.org/presentationml/2006/main">
+  <p:cSld>
+    <p:spTree>
+      <p:nvGrpSpPr>
+        <p:cNvPr id="1" name=""/>
+        <p:cNvGrpSpPr/>
+        <p:nvPr/>
+      </p:nvGrpSpPr>
+      <p:grpSpPr>
+        <a:xfrm>
+          <a:off x="0" y="0"/>
+          <a:ext cx="0" cy="0"/>
+          <a:chOff x="0" y="0"/>
+          <a:chExt cx="0" cy="0"/>
+        </a:xfrm>
+      </p:grpSpPr>
+      <p:sp>
+        <p:nvSpPr>
+          <p:cNvPr id="2" name="Title 1">
+            <a:extLst>
+              <a:ext uri="{FF2B5EF4-FFF2-40B4-BE49-F238E27FC236}">
+                <a16:creationId xmlns:a16="http://schemas.microsoft.com/office/drawing/2014/main" id="{2A8A4ABE-5343-4348-8236-6BC0C27406A1}"/>
+              </a:ext>
+            </a:extLst>
+          </p:cNvPr>
+          <p:cNvSpPr>
+            <a:spLocks noGrp="1"/>
+          </p:cNvSpPr>
+          <p:nvPr>
+            <p:ph type="title"/>
+          </p:nvPr>
+        </p:nvSpPr>
+        <p:spPr/>
+        <p:txBody>
+          <a:bodyPr>
+            <a:normAutofit fontScale="90000"/>
+          </a:bodyPr>
+          <a:lstStyle/>
+          <a:p>
+            <a:r>
+              <a:rPr lang="en-US" dirty="0">
+                <a:latin typeface="Arial" panose="020B0604020202020204" pitchFamily="34" charset="0"/>
+                <a:cs typeface="Arial" panose="020B0604020202020204" pitchFamily="34" charset="0"/>
+              </a:rPr>
+              <a:t>Question of Interest:  A relationship exists between Alcohol by Volume and International Bitterness Units.</a:t>
+            </a:r>
+          </a:p>
+        </p:txBody>
+      </p:sp>
+      <p:sp>
+        <p:nvSpPr>
+          <p:cNvPr id="3" name="Content Placeholder 2">
+            <a:extLst>
+              <a:ext uri="{FF2B5EF4-FFF2-40B4-BE49-F238E27FC236}">
+                <a16:creationId xmlns:a16="http://schemas.microsoft.com/office/drawing/2014/main" id="{20F2F60B-6F4B-4E43-8E80-7EE872BE35CF}"/>
+              </a:ext>
+            </a:extLst>
+          </p:cNvPr>
+          <p:cNvSpPr>
+            <a:spLocks noGrp="1"/>
+          </p:cNvSpPr>
+          <p:nvPr>
+            <p:ph idx="1"/>
+          </p:nvPr>
+        </p:nvSpPr>
+        <p:spPr>
+          <a:xfrm>
+            <a:off x="677334" y="2160589"/>
+            <a:ext cx="3491895" cy="3379077"/>
+          </a:xfrm>
+        </p:spPr>
+        <p:txBody>
+          <a:bodyPr>
+            <a:normAutofit/>
+          </a:bodyPr>
+          <a:lstStyle/>
+          <a:p>
+            <a:pPr marL="0" indent="0">
+              <a:buNone/>
+            </a:pPr>
+            <a:r>
+              <a:rPr lang="en-US" dirty="0">
+                <a:latin typeface="Arial" panose="020B0604020202020204" pitchFamily="34" charset="0"/>
+                <a:cs typeface="Arial" panose="020B0604020202020204" pitchFamily="34" charset="0"/>
+              </a:rPr>
+              <a:t>A scatter plot of Alcohol by Volume and International Bitterness Unit does not appear to have a relationship.  </a:t>
+            </a:r>
+          </a:p>
+          <a:p>
+            <a:pPr marL="0" indent="0">
+              <a:buNone/>
+            </a:pPr>
+            <a:r>
+              <a:rPr lang="en-US" dirty="0">
+                <a:latin typeface="Arial" panose="020B0604020202020204" pitchFamily="34" charset="0"/>
+                <a:cs typeface="Arial" panose="020B0604020202020204" pitchFamily="34" charset="0"/>
+              </a:rPr>
+              <a:t>The scatter plots of ABV and IBU do not show much of a pattern.</a:t>
+            </a:r>
+          </a:p>
+          <a:p>
+            <a:pPr marL="0" indent="0">
+              <a:buNone/>
+            </a:pPr>
+            <a:r>
+              <a:rPr lang="en-US" dirty="0">
+                <a:latin typeface="Arial" panose="020B0604020202020204" pitchFamily="34" charset="0"/>
+                <a:cs typeface="Arial" panose="020B0604020202020204" pitchFamily="34" charset="0"/>
+              </a:rPr>
+              <a:t>A linear regression was used to test if there was a relationship between ABV and IBU. </a:t>
+            </a:r>
+          </a:p>
+        </p:txBody>
+      </p:sp>
+      <p:pic>
+        <p:nvPicPr>
+          <p:cNvPr id="4" name="Picture 3">
+            <a:extLst>
+              <a:ext uri="{FF2B5EF4-FFF2-40B4-BE49-F238E27FC236}">
+                <a16:creationId xmlns:a16="http://schemas.microsoft.com/office/drawing/2014/main" id="{DF0AE0DA-992B-4C8E-86CB-ACE29FC114AD}"/>
+              </a:ext>
+            </a:extLst>
+          </p:cNvPr>
+          <p:cNvPicPr>
+            <a:picLocks noChangeAspect="1"/>
+          </p:cNvPicPr>
+          <p:nvPr/>
+        </p:nvPicPr>
+        <p:blipFill>
+          <a:blip r:embed="rId2"/>
+          <a:stretch>
+            <a:fillRect/>
+          </a:stretch>
+        </p:blipFill>
+        <p:spPr>
+          <a:xfrm>
+            <a:off x="4528458" y="2160589"/>
+            <a:ext cx="5741536" cy="3542649"/>
+          </a:xfrm>
+          <a:prstGeom prst="rect">
+            <a:avLst/>
+          </a:prstGeom>
+        </p:spPr>
+      </p:pic>
+    </p:spTree>
+    <p:extLst>
+      <p:ext uri="{BB962C8B-B14F-4D97-AF65-F5344CB8AC3E}">
+        <p14:creationId xmlns:p14="http://schemas.microsoft.com/office/powerpoint/2010/main" val="3504272927"/>
+      </p:ext>
+    </p:extLst>
+  </p:cSld>
+  <p:clrMapOvr>
+    <a:masterClrMapping/>
+  </p:clrMapOvr>
+</p:sld>
+</file>
+
+<file path=ppt/slides/slide21.xml><?xml version="1.0" encoding="utf-8"?>
 <p:sld xmlns:a="http://schemas.openxmlformats.org/drawingml/2006/main" xmlns:r="http://schemas.openxmlformats.org/officeDocument/2006/relationships" xmlns:p="http://schemas.openxmlformats.org/presentationml/2006/main">
   <p:cSld>
     <p:spTree>
@@ -8221,7 +8310,7 @@
 </p:sld>
 </file>
 
-<file path=ppt/slides/slide21.xml><?xml version="1.0" encoding="utf-8"?>
+<file path=ppt/slides/slide22.xml><?xml version="1.0" encoding="utf-8"?>
 <p:sld xmlns:a="http://schemas.openxmlformats.org/drawingml/2006/main" xmlns:r="http://schemas.openxmlformats.org/officeDocument/2006/relationships" xmlns:p="http://schemas.openxmlformats.org/presentationml/2006/main">
   <p:cSld>
     <p:spTree>

</xml_diff>

<commit_message>
Final changes and updates
</commit_message>
<xml_diff>
--- a/MalcolmCarlsonBeerDataEDA.DDS6306.pptx
+++ b/MalcolmCarlsonBeerDataEDA.DDS6306.pptx
@@ -230,7 +230,7 @@
           <a:p>
             <a:fld id="{A6D10619-A5AD-4FBE-8267-47BE2B1199F7}" type="datetimeFigureOut">
               <a:rPr lang="en-US" smtClean="0"/>
-              <a:t>10/25/2019</a:t>
+              <a:t>10/26/2019</a:t>
             </a:fld>
             <a:endParaRPr lang="en-US"/>
           </a:p>
@@ -495,6 +495,1492 @@
     </a:lvl9pPr>
   </p:notesStyle>
 </p:notesMaster>
+</file>
+
+<file path=ppt/notesSlides/notesSlide1.xml><?xml version="1.0" encoding="utf-8"?>
+<p:notes xmlns:a="http://schemas.openxmlformats.org/drawingml/2006/main" xmlns:r="http://schemas.openxmlformats.org/officeDocument/2006/relationships" xmlns:p="http://schemas.openxmlformats.org/presentationml/2006/main">
+  <p:cSld>
+    <p:spTree>
+      <p:nvGrpSpPr>
+        <p:cNvPr id="1" name=""/>
+        <p:cNvGrpSpPr/>
+        <p:nvPr/>
+      </p:nvGrpSpPr>
+      <p:grpSpPr>
+        <a:xfrm>
+          <a:off x="0" y="0"/>
+          <a:ext cx="0" cy="0"/>
+          <a:chOff x="0" y="0"/>
+          <a:chExt cx="0" cy="0"/>
+        </a:xfrm>
+      </p:grpSpPr>
+      <p:sp>
+        <p:nvSpPr>
+          <p:cNvPr id="2" name="Slide Image Placeholder 1"/>
+          <p:cNvSpPr>
+            <a:spLocks noGrp="1" noRot="1" noChangeAspect="1"/>
+          </p:cNvSpPr>
+          <p:nvPr>
+            <p:ph type="sldImg"/>
+          </p:nvPr>
+        </p:nvSpPr>
+        <p:spPr/>
+      </p:sp>
+      <p:sp>
+        <p:nvSpPr>
+          <p:cNvPr id="3" name="Notes Placeholder 2"/>
+          <p:cNvSpPr>
+            <a:spLocks noGrp="1"/>
+          </p:cNvSpPr>
+          <p:nvPr>
+            <p:ph type="body" idx="1"/>
+          </p:nvPr>
+        </p:nvSpPr>
+        <p:spPr/>
+        <p:txBody>
+          <a:bodyPr/>
+          <a:lstStyle/>
+          <a:p>
+            <a:r>
+              <a:rPr lang="en-US" dirty="0"/>
+              <a:t>Hello,</a:t>
+            </a:r>
+          </a:p>
+          <a:p>
+            <a:r>
+              <a:rPr lang="en-US" dirty="0"/>
+              <a:t>I’m Malcolm Carlson and I will be presenting a case study that Jason Burk and I worked on about Craft Beer in the United States.</a:t>
+            </a:r>
+          </a:p>
+        </p:txBody>
+      </p:sp>
+      <p:sp>
+        <p:nvSpPr>
+          <p:cNvPr id="4" name="Slide Number Placeholder 3"/>
+          <p:cNvSpPr>
+            <a:spLocks noGrp="1"/>
+          </p:cNvSpPr>
+          <p:nvPr>
+            <p:ph type="sldNum" sz="quarter" idx="5"/>
+          </p:nvPr>
+        </p:nvSpPr>
+        <p:spPr/>
+        <p:txBody>
+          <a:bodyPr/>
+          <a:lstStyle/>
+          <a:p>
+            <a:fld id="{F5C4DEE2-34CF-4AC0-92C7-876E2D6A0326}" type="slidenum">
+              <a:rPr lang="en-US" smtClean="0"/>
+              <a:t>1</a:t>
+            </a:fld>
+            <a:endParaRPr lang="en-US"/>
+          </a:p>
+        </p:txBody>
+      </p:sp>
+    </p:spTree>
+    <p:extLst>
+      <p:ext uri="{BB962C8B-B14F-4D97-AF65-F5344CB8AC3E}">
+        <p14:creationId xmlns:p14="http://schemas.microsoft.com/office/powerpoint/2010/main" val="3008007699"/>
+      </p:ext>
+    </p:extLst>
+  </p:cSld>
+  <p:clrMapOvr>
+    <a:masterClrMapping/>
+  </p:clrMapOvr>
+</p:notes>
+</file>
+
+<file path=ppt/notesSlides/notesSlide10.xml><?xml version="1.0" encoding="utf-8"?>
+<p:notes xmlns:a="http://schemas.openxmlformats.org/drawingml/2006/main" xmlns:r="http://schemas.openxmlformats.org/officeDocument/2006/relationships" xmlns:p="http://schemas.openxmlformats.org/presentationml/2006/main">
+  <p:cSld>
+    <p:spTree>
+      <p:nvGrpSpPr>
+        <p:cNvPr id="1" name=""/>
+        <p:cNvGrpSpPr/>
+        <p:nvPr/>
+      </p:nvGrpSpPr>
+      <p:grpSpPr>
+        <a:xfrm>
+          <a:off x="0" y="0"/>
+          <a:ext cx="0" cy="0"/>
+          <a:chOff x="0" y="0"/>
+          <a:chExt cx="0" cy="0"/>
+        </a:xfrm>
+      </p:grpSpPr>
+      <p:sp>
+        <p:nvSpPr>
+          <p:cNvPr id="2" name="Slide Image Placeholder 1"/>
+          <p:cNvSpPr>
+            <a:spLocks noGrp="1" noRot="1" noChangeAspect="1"/>
+          </p:cNvSpPr>
+          <p:nvPr>
+            <p:ph type="sldImg"/>
+          </p:nvPr>
+        </p:nvSpPr>
+        <p:spPr/>
+      </p:sp>
+      <p:sp>
+        <p:nvSpPr>
+          <p:cNvPr id="3" name="Notes Placeholder 2"/>
+          <p:cNvSpPr>
+            <a:spLocks noGrp="1"/>
+          </p:cNvSpPr>
+          <p:nvPr>
+            <p:ph type="body" idx="1"/>
+          </p:nvPr>
+        </p:nvSpPr>
+        <p:spPr/>
+        <p:txBody>
+          <a:bodyPr/>
+          <a:lstStyle/>
+          <a:p>
+            <a:r>
+              <a:rPr lang="en-US" dirty="0"/>
+              <a:t>This table has the top 10 most popular beer styles by region.  We are looking at the North Eastern states here.  We have a map of the North East regions by both ABV and IBU.</a:t>
+            </a:r>
+          </a:p>
+        </p:txBody>
+      </p:sp>
+      <p:sp>
+        <p:nvSpPr>
+          <p:cNvPr id="4" name="Slide Number Placeholder 3"/>
+          <p:cNvSpPr>
+            <a:spLocks noGrp="1"/>
+          </p:cNvSpPr>
+          <p:nvPr>
+            <p:ph type="sldNum" sz="quarter" idx="5"/>
+          </p:nvPr>
+        </p:nvSpPr>
+        <p:spPr/>
+        <p:txBody>
+          <a:bodyPr/>
+          <a:lstStyle/>
+          <a:p>
+            <a:fld id="{F5C4DEE2-34CF-4AC0-92C7-876E2D6A0326}" type="slidenum">
+              <a:rPr lang="en-US" smtClean="0"/>
+              <a:t>12</a:t>
+            </a:fld>
+            <a:endParaRPr lang="en-US"/>
+          </a:p>
+        </p:txBody>
+      </p:sp>
+    </p:spTree>
+    <p:extLst>
+      <p:ext uri="{BB962C8B-B14F-4D97-AF65-F5344CB8AC3E}">
+        <p14:creationId xmlns:p14="http://schemas.microsoft.com/office/powerpoint/2010/main" val="3451594776"/>
+      </p:ext>
+    </p:extLst>
+  </p:cSld>
+  <p:clrMapOvr>
+    <a:masterClrMapping/>
+  </p:clrMapOvr>
+</p:notes>
+</file>
+
+<file path=ppt/notesSlides/notesSlide11.xml><?xml version="1.0" encoding="utf-8"?>
+<p:notes xmlns:a="http://schemas.openxmlformats.org/drawingml/2006/main" xmlns:r="http://schemas.openxmlformats.org/officeDocument/2006/relationships" xmlns:p="http://schemas.openxmlformats.org/presentationml/2006/main">
+  <p:cSld>
+    <p:spTree>
+      <p:nvGrpSpPr>
+        <p:cNvPr id="1" name=""/>
+        <p:cNvGrpSpPr/>
+        <p:nvPr/>
+      </p:nvGrpSpPr>
+      <p:grpSpPr>
+        <a:xfrm>
+          <a:off x="0" y="0"/>
+          <a:ext cx="0" cy="0"/>
+          <a:chOff x="0" y="0"/>
+          <a:chExt cx="0" cy="0"/>
+        </a:xfrm>
+      </p:grpSpPr>
+      <p:sp>
+        <p:nvSpPr>
+          <p:cNvPr id="2" name="Slide Image Placeholder 1"/>
+          <p:cNvSpPr>
+            <a:spLocks noGrp="1" noRot="1" noChangeAspect="1"/>
+          </p:cNvSpPr>
+          <p:nvPr>
+            <p:ph type="sldImg"/>
+          </p:nvPr>
+        </p:nvSpPr>
+        <p:spPr/>
+      </p:sp>
+      <p:sp>
+        <p:nvSpPr>
+          <p:cNvPr id="3" name="Notes Placeholder 2"/>
+          <p:cNvSpPr>
+            <a:spLocks noGrp="1"/>
+          </p:cNvSpPr>
+          <p:nvPr>
+            <p:ph type="body" idx="1"/>
+          </p:nvPr>
+        </p:nvSpPr>
+        <p:spPr/>
+        <p:txBody>
+          <a:bodyPr/>
+          <a:lstStyle/>
+          <a:p>
+            <a:r>
+              <a:rPr lang="en-US" dirty="0"/>
+              <a:t>In the Midwest part of the country, the same trend holds true in that craft beer drinkers prefer IPAs and most other Ales.</a:t>
+            </a:r>
+          </a:p>
+        </p:txBody>
+      </p:sp>
+      <p:sp>
+        <p:nvSpPr>
+          <p:cNvPr id="4" name="Slide Number Placeholder 3"/>
+          <p:cNvSpPr>
+            <a:spLocks noGrp="1"/>
+          </p:cNvSpPr>
+          <p:nvPr>
+            <p:ph type="sldNum" sz="quarter" idx="5"/>
+          </p:nvPr>
+        </p:nvSpPr>
+        <p:spPr/>
+        <p:txBody>
+          <a:bodyPr/>
+          <a:lstStyle/>
+          <a:p>
+            <a:fld id="{F5C4DEE2-34CF-4AC0-92C7-876E2D6A0326}" type="slidenum">
+              <a:rPr lang="en-US" smtClean="0"/>
+              <a:t>13</a:t>
+            </a:fld>
+            <a:endParaRPr lang="en-US"/>
+          </a:p>
+        </p:txBody>
+      </p:sp>
+    </p:spTree>
+    <p:extLst>
+      <p:ext uri="{BB962C8B-B14F-4D97-AF65-F5344CB8AC3E}">
+        <p14:creationId xmlns:p14="http://schemas.microsoft.com/office/powerpoint/2010/main" val="1733717563"/>
+      </p:ext>
+    </p:extLst>
+  </p:cSld>
+  <p:clrMapOvr>
+    <a:masterClrMapping/>
+  </p:clrMapOvr>
+</p:notes>
+</file>
+
+<file path=ppt/notesSlides/notesSlide12.xml><?xml version="1.0" encoding="utf-8"?>
+<p:notes xmlns:a="http://schemas.openxmlformats.org/drawingml/2006/main" xmlns:r="http://schemas.openxmlformats.org/officeDocument/2006/relationships" xmlns:p="http://schemas.openxmlformats.org/presentationml/2006/main">
+  <p:cSld>
+    <p:spTree>
+      <p:nvGrpSpPr>
+        <p:cNvPr id="1" name=""/>
+        <p:cNvGrpSpPr/>
+        <p:nvPr/>
+      </p:nvGrpSpPr>
+      <p:grpSpPr>
+        <a:xfrm>
+          <a:off x="0" y="0"/>
+          <a:ext cx="0" cy="0"/>
+          <a:chOff x="0" y="0"/>
+          <a:chExt cx="0" cy="0"/>
+        </a:xfrm>
+      </p:grpSpPr>
+      <p:sp>
+        <p:nvSpPr>
+          <p:cNvPr id="2" name="Slide Image Placeholder 1"/>
+          <p:cNvSpPr>
+            <a:spLocks noGrp="1" noRot="1" noChangeAspect="1"/>
+          </p:cNvSpPr>
+          <p:nvPr>
+            <p:ph type="sldImg"/>
+          </p:nvPr>
+        </p:nvSpPr>
+        <p:spPr/>
+      </p:sp>
+      <p:sp>
+        <p:nvSpPr>
+          <p:cNvPr id="3" name="Notes Placeholder 2"/>
+          <p:cNvSpPr>
+            <a:spLocks noGrp="1"/>
+          </p:cNvSpPr>
+          <p:nvPr>
+            <p:ph type="body" idx="1"/>
+          </p:nvPr>
+        </p:nvSpPr>
+        <p:spPr/>
+        <p:txBody>
+          <a:bodyPr/>
+          <a:lstStyle/>
+          <a:p>
+            <a:r>
+              <a:rPr lang="en-US" dirty="0"/>
+              <a:t>Here in the South, we also prefer IPAs and Ales but do not have as many choices as the Midwest and the Western states. </a:t>
+            </a:r>
+          </a:p>
+        </p:txBody>
+      </p:sp>
+      <p:sp>
+        <p:nvSpPr>
+          <p:cNvPr id="4" name="Slide Number Placeholder 3"/>
+          <p:cNvSpPr>
+            <a:spLocks noGrp="1"/>
+          </p:cNvSpPr>
+          <p:nvPr>
+            <p:ph type="sldNum" sz="quarter" idx="5"/>
+          </p:nvPr>
+        </p:nvSpPr>
+        <p:spPr/>
+        <p:txBody>
+          <a:bodyPr/>
+          <a:lstStyle/>
+          <a:p>
+            <a:fld id="{F5C4DEE2-34CF-4AC0-92C7-876E2D6A0326}" type="slidenum">
+              <a:rPr lang="en-US" smtClean="0"/>
+              <a:t>14</a:t>
+            </a:fld>
+            <a:endParaRPr lang="en-US"/>
+          </a:p>
+        </p:txBody>
+      </p:sp>
+    </p:spTree>
+    <p:extLst>
+      <p:ext uri="{BB962C8B-B14F-4D97-AF65-F5344CB8AC3E}">
+        <p14:creationId xmlns:p14="http://schemas.microsoft.com/office/powerpoint/2010/main" val="929405846"/>
+      </p:ext>
+    </p:extLst>
+  </p:cSld>
+  <p:clrMapOvr>
+    <a:masterClrMapping/>
+  </p:clrMapOvr>
+</p:notes>
+</file>
+
+<file path=ppt/notesSlides/notesSlide13.xml><?xml version="1.0" encoding="utf-8"?>
+<p:notes xmlns:a="http://schemas.openxmlformats.org/drawingml/2006/main" xmlns:r="http://schemas.openxmlformats.org/officeDocument/2006/relationships" xmlns:p="http://schemas.openxmlformats.org/presentationml/2006/main">
+  <p:cSld>
+    <p:spTree>
+      <p:nvGrpSpPr>
+        <p:cNvPr id="1" name=""/>
+        <p:cNvGrpSpPr/>
+        <p:nvPr/>
+      </p:nvGrpSpPr>
+      <p:grpSpPr>
+        <a:xfrm>
+          <a:off x="0" y="0"/>
+          <a:ext cx="0" cy="0"/>
+          <a:chOff x="0" y="0"/>
+          <a:chExt cx="0" cy="0"/>
+        </a:xfrm>
+      </p:grpSpPr>
+      <p:sp>
+        <p:nvSpPr>
+          <p:cNvPr id="2" name="Slide Image Placeholder 1"/>
+          <p:cNvSpPr>
+            <a:spLocks noGrp="1" noRot="1" noChangeAspect="1"/>
+          </p:cNvSpPr>
+          <p:nvPr>
+            <p:ph type="sldImg"/>
+          </p:nvPr>
+        </p:nvSpPr>
+        <p:spPr/>
+      </p:sp>
+      <p:sp>
+        <p:nvSpPr>
+          <p:cNvPr id="3" name="Notes Placeholder 2"/>
+          <p:cNvSpPr>
+            <a:spLocks noGrp="1"/>
+          </p:cNvSpPr>
+          <p:nvPr>
+            <p:ph type="body" idx="1"/>
+          </p:nvPr>
+        </p:nvSpPr>
+        <p:spPr/>
+        <p:txBody>
+          <a:bodyPr/>
+          <a:lstStyle/>
+          <a:p>
+            <a:r>
+              <a:rPr lang="en-US" dirty="0"/>
+              <a:t>The Wester part of the country really loves IPA’s and Ales in general and they have the most option when it comes to those beers.  California and Colorado, both very popular craft brew hubs, account for a large part of these result.</a:t>
+            </a:r>
+          </a:p>
+        </p:txBody>
+      </p:sp>
+      <p:sp>
+        <p:nvSpPr>
+          <p:cNvPr id="4" name="Slide Number Placeholder 3"/>
+          <p:cNvSpPr>
+            <a:spLocks noGrp="1"/>
+          </p:cNvSpPr>
+          <p:nvPr>
+            <p:ph type="sldNum" sz="quarter" idx="5"/>
+          </p:nvPr>
+        </p:nvSpPr>
+        <p:spPr/>
+        <p:txBody>
+          <a:bodyPr/>
+          <a:lstStyle/>
+          <a:p>
+            <a:fld id="{F5C4DEE2-34CF-4AC0-92C7-876E2D6A0326}" type="slidenum">
+              <a:rPr lang="en-US" smtClean="0"/>
+              <a:t>15</a:t>
+            </a:fld>
+            <a:endParaRPr lang="en-US"/>
+          </a:p>
+        </p:txBody>
+      </p:sp>
+    </p:spTree>
+    <p:extLst>
+      <p:ext uri="{BB962C8B-B14F-4D97-AF65-F5344CB8AC3E}">
+        <p14:creationId xmlns:p14="http://schemas.microsoft.com/office/powerpoint/2010/main" val="2561837474"/>
+      </p:ext>
+    </p:extLst>
+  </p:cSld>
+  <p:clrMapOvr>
+    <a:masterClrMapping/>
+  </p:clrMapOvr>
+</p:notes>
+</file>
+
+<file path=ppt/notesSlides/notesSlide14.xml><?xml version="1.0" encoding="utf-8"?>
+<p:notes xmlns:a="http://schemas.openxmlformats.org/drawingml/2006/main" xmlns:r="http://schemas.openxmlformats.org/officeDocument/2006/relationships" xmlns:p="http://schemas.openxmlformats.org/presentationml/2006/main">
+  <p:cSld>
+    <p:spTree>
+      <p:nvGrpSpPr>
+        <p:cNvPr id="1" name=""/>
+        <p:cNvGrpSpPr/>
+        <p:nvPr/>
+      </p:nvGrpSpPr>
+      <p:grpSpPr>
+        <a:xfrm>
+          <a:off x="0" y="0"/>
+          <a:ext cx="0" cy="0"/>
+          <a:chOff x="0" y="0"/>
+          <a:chExt cx="0" cy="0"/>
+        </a:xfrm>
+      </p:grpSpPr>
+      <p:sp>
+        <p:nvSpPr>
+          <p:cNvPr id="2" name="Slide Image Placeholder 1"/>
+          <p:cNvSpPr>
+            <a:spLocks noGrp="1" noRot="1" noChangeAspect="1"/>
+          </p:cNvSpPr>
+          <p:nvPr>
+            <p:ph type="sldImg"/>
+          </p:nvPr>
+        </p:nvSpPr>
+        <p:spPr/>
+      </p:sp>
+      <p:sp>
+        <p:nvSpPr>
+          <p:cNvPr id="3" name="Notes Placeholder 2"/>
+          <p:cNvSpPr>
+            <a:spLocks noGrp="1"/>
+          </p:cNvSpPr>
+          <p:nvPr>
+            <p:ph type="body" idx="1"/>
+          </p:nvPr>
+        </p:nvSpPr>
+        <p:spPr/>
+        <p:txBody>
+          <a:bodyPr/>
+          <a:lstStyle/>
+          <a:p>
+            <a:r>
+              <a:rPr lang="en-US" dirty="0"/>
+              <a:t>From this study, </a:t>
+            </a:r>
+            <a:r>
+              <a:rPr lang="en-US" dirty="0" err="1"/>
+              <a:t>Budwiezer</a:t>
+            </a:r>
+            <a:r>
+              <a:rPr lang="en-US" dirty="0"/>
+              <a:t> may want to consider investing in beer offerings that have higher bitterness and ABV levels, particularly in IPAs and Ales to reach more of the craft beer market.  There is definitely opportunities for growth in those segments.</a:t>
+            </a:r>
+          </a:p>
+          <a:p>
+            <a:endParaRPr lang="en-US" dirty="0"/>
+          </a:p>
+          <a:p>
+            <a:r>
+              <a:rPr lang="en-US" dirty="0"/>
+              <a:t>Thank you for your time and let me know if you have any questions.</a:t>
+            </a:r>
+          </a:p>
+          <a:p>
+            <a:endParaRPr lang="en-US" dirty="0"/>
+          </a:p>
+          <a:p>
+            <a:endParaRPr lang="en-US" dirty="0"/>
+          </a:p>
+        </p:txBody>
+      </p:sp>
+      <p:sp>
+        <p:nvSpPr>
+          <p:cNvPr id="4" name="Slide Number Placeholder 3"/>
+          <p:cNvSpPr>
+            <a:spLocks noGrp="1"/>
+          </p:cNvSpPr>
+          <p:nvPr>
+            <p:ph type="sldNum" sz="quarter" idx="5"/>
+          </p:nvPr>
+        </p:nvSpPr>
+        <p:spPr/>
+        <p:txBody>
+          <a:bodyPr/>
+          <a:lstStyle/>
+          <a:p>
+            <a:fld id="{F5C4DEE2-34CF-4AC0-92C7-876E2D6A0326}" type="slidenum">
+              <a:rPr lang="en-US" smtClean="0"/>
+              <a:t>16</a:t>
+            </a:fld>
+            <a:endParaRPr lang="en-US"/>
+          </a:p>
+        </p:txBody>
+      </p:sp>
+    </p:spTree>
+    <p:extLst>
+      <p:ext uri="{BB962C8B-B14F-4D97-AF65-F5344CB8AC3E}">
+        <p14:creationId xmlns:p14="http://schemas.microsoft.com/office/powerpoint/2010/main" val="3815116851"/>
+      </p:ext>
+    </p:extLst>
+  </p:cSld>
+  <p:clrMapOvr>
+    <a:masterClrMapping/>
+  </p:clrMapOvr>
+</p:notes>
+</file>
+
+<file path=ppt/notesSlides/notesSlide2.xml><?xml version="1.0" encoding="utf-8"?>
+<p:notes xmlns:a="http://schemas.openxmlformats.org/drawingml/2006/main" xmlns:r="http://schemas.openxmlformats.org/officeDocument/2006/relationships" xmlns:p="http://schemas.openxmlformats.org/presentationml/2006/main">
+  <p:cSld>
+    <p:spTree>
+      <p:nvGrpSpPr>
+        <p:cNvPr id="1" name=""/>
+        <p:cNvGrpSpPr/>
+        <p:nvPr/>
+      </p:nvGrpSpPr>
+      <p:grpSpPr>
+        <a:xfrm>
+          <a:off x="0" y="0"/>
+          <a:ext cx="0" cy="0"/>
+          <a:chOff x="0" y="0"/>
+          <a:chExt cx="0" cy="0"/>
+        </a:xfrm>
+      </p:grpSpPr>
+      <p:sp>
+        <p:nvSpPr>
+          <p:cNvPr id="2" name="Slide Image Placeholder 1"/>
+          <p:cNvSpPr>
+            <a:spLocks noGrp="1" noRot="1" noChangeAspect="1"/>
+          </p:cNvSpPr>
+          <p:nvPr>
+            <p:ph type="sldImg"/>
+          </p:nvPr>
+        </p:nvSpPr>
+        <p:spPr/>
+      </p:sp>
+      <p:sp>
+        <p:nvSpPr>
+          <p:cNvPr id="3" name="Notes Placeholder 2"/>
+          <p:cNvSpPr>
+            <a:spLocks noGrp="1"/>
+          </p:cNvSpPr>
+          <p:nvPr>
+            <p:ph type="body" idx="1"/>
+          </p:nvPr>
+        </p:nvSpPr>
+        <p:spPr/>
+        <p:txBody>
+          <a:bodyPr/>
+          <a:lstStyle/>
+          <a:p>
+            <a:r>
+              <a:rPr lang="en-US" dirty="0"/>
+              <a:t>On the left we are showing a sorted list in ascending order of craft breweries by state.  </a:t>
+            </a:r>
+          </a:p>
+          <a:p>
+            <a:r>
+              <a:rPr lang="en-US" dirty="0"/>
+              <a:t>On the right we have a map of all the states color shaded by number of breweries.  The lighter the color, the more breweries the </a:t>
+            </a:r>
+            <a:r>
+              <a:rPr lang="en-US"/>
+              <a:t>state has.  </a:t>
+            </a:r>
+            <a:endParaRPr lang="en-US" dirty="0"/>
+          </a:p>
+          <a:p>
+            <a:endParaRPr lang="en-US" dirty="0"/>
+          </a:p>
+          <a:p>
+            <a:r>
+              <a:rPr lang="en-US" dirty="0"/>
+              <a:t>My home state of Texas is in the Top 5  with 28 and Jason’s home state of Colorado has the highest number of craft breweries.</a:t>
+            </a:r>
+          </a:p>
+        </p:txBody>
+      </p:sp>
+      <p:sp>
+        <p:nvSpPr>
+          <p:cNvPr id="4" name="Slide Number Placeholder 3"/>
+          <p:cNvSpPr>
+            <a:spLocks noGrp="1"/>
+          </p:cNvSpPr>
+          <p:nvPr>
+            <p:ph type="sldNum" sz="quarter" idx="5"/>
+          </p:nvPr>
+        </p:nvSpPr>
+        <p:spPr/>
+        <p:txBody>
+          <a:bodyPr/>
+          <a:lstStyle/>
+          <a:p>
+            <a:fld id="{F5C4DEE2-34CF-4AC0-92C7-876E2D6A0326}" type="slidenum">
+              <a:rPr lang="en-US" smtClean="0"/>
+              <a:t>2</a:t>
+            </a:fld>
+            <a:endParaRPr lang="en-US"/>
+          </a:p>
+        </p:txBody>
+      </p:sp>
+    </p:spTree>
+    <p:extLst>
+      <p:ext uri="{BB962C8B-B14F-4D97-AF65-F5344CB8AC3E}">
+        <p14:creationId xmlns:p14="http://schemas.microsoft.com/office/powerpoint/2010/main" val="572783984"/>
+      </p:ext>
+    </p:extLst>
+  </p:cSld>
+  <p:clrMapOvr>
+    <a:masterClrMapping/>
+  </p:clrMapOvr>
+</p:notes>
+</file>
+
+<file path=ppt/notesSlides/notesSlide3.xml><?xml version="1.0" encoding="utf-8"?>
+<p:notes xmlns:a="http://schemas.openxmlformats.org/drawingml/2006/main" xmlns:r="http://schemas.openxmlformats.org/officeDocument/2006/relationships" xmlns:p="http://schemas.openxmlformats.org/presentationml/2006/main">
+  <p:cSld>
+    <p:spTree>
+      <p:nvGrpSpPr>
+        <p:cNvPr id="1" name=""/>
+        <p:cNvGrpSpPr/>
+        <p:nvPr/>
+      </p:nvGrpSpPr>
+      <p:grpSpPr>
+        <a:xfrm>
+          <a:off x="0" y="0"/>
+          <a:ext cx="0" cy="0"/>
+          <a:chOff x="0" y="0"/>
+          <a:chExt cx="0" cy="0"/>
+        </a:xfrm>
+      </p:grpSpPr>
+      <p:sp>
+        <p:nvSpPr>
+          <p:cNvPr id="2" name="Slide Image Placeholder 1"/>
+          <p:cNvSpPr>
+            <a:spLocks noGrp="1" noRot="1" noChangeAspect="1"/>
+          </p:cNvSpPr>
+          <p:nvPr>
+            <p:ph type="sldImg"/>
+          </p:nvPr>
+        </p:nvSpPr>
+        <p:spPr/>
+      </p:sp>
+      <p:sp>
+        <p:nvSpPr>
+          <p:cNvPr id="3" name="Notes Placeholder 2"/>
+          <p:cNvSpPr>
+            <a:spLocks noGrp="1"/>
+          </p:cNvSpPr>
+          <p:nvPr>
+            <p:ph type="body" idx="1"/>
+          </p:nvPr>
+        </p:nvSpPr>
+        <p:spPr/>
+        <p:txBody>
+          <a:bodyPr/>
+          <a:lstStyle/>
+          <a:p>
+            <a:r>
+              <a:rPr lang="en-US" dirty="0"/>
+              <a:t>For this study we had to properly address missing data.  There were missing values in the Alcohol By Volume and IBU columns which were important to our study so we used the mice library(or </a:t>
+            </a:r>
+            <a:r>
+              <a:rPr lang="en-US" b="1" dirty="0"/>
+              <a:t>Multivariate Imputation by Chained Equations)</a:t>
+            </a:r>
+            <a:r>
+              <a:rPr lang="en-US" dirty="0"/>
+              <a:t> to synthesize missing values using other columns in the data.  This was important because the IBU data was missing over a thousand values which would have impacted the accuracy of our results.</a:t>
+            </a:r>
+          </a:p>
+        </p:txBody>
+      </p:sp>
+      <p:sp>
+        <p:nvSpPr>
+          <p:cNvPr id="4" name="Slide Number Placeholder 3"/>
+          <p:cNvSpPr>
+            <a:spLocks noGrp="1"/>
+          </p:cNvSpPr>
+          <p:nvPr>
+            <p:ph type="sldNum" sz="quarter" idx="5"/>
+          </p:nvPr>
+        </p:nvSpPr>
+        <p:spPr/>
+        <p:txBody>
+          <a:bodyPr/>
+          <a:lstStyle/>
+          <a:p>
+            <a:fld id="{F5C4DEE2-34CF-4AC0-92C7-876E2D6A0326}" type="slidenum">
+              <a:rPr lang="en-US" smtClean="0"/>
+              <a:t>3</a:t>
+            </a:fld>
+            <a:endParaRPr lang="en-US"/>
+          </a:p>
+        </p:txBody>
+      </p:sp>
+    </p:spTree>
+    <p:extLst>
+      <p:ext uri="{BB962C8B-B14F-4D97-AF65-F5344CB8AC3E}">
+        <p14:creationId xmlns:p14="http://schemas.microsoft.com/office/powerpoint/2010/main" val="449705682"/>
+      </p:ext>
+    </p:extLst>
+  </p:cSld>
+  <p:clrMapOvr>
+    <a:masterClrMapping/>
+  </p:clrMapOvr>
+</p:notes>
+</file>
+
+<file path=ppt/notesSlides/notesSlide4.xml><?xml version="1.0" encoding="utf-8"?>
+<p:notes xmlns:a="http://schemas.openxmlformats.org/drawingml/2006/main" xmlns:r="http://schemas.openxmlformats.org/officeDocument/2006/relationships" xmlns:p="http://schemas.openxmlformats.org/presentationml/2006/main">
+  <p:cSld>
+    <p:spTree>
+      <p:nvGrpSpPr>
+        <p:cNvPr id="1" name=""/>
+        <p:cNvGrpSpPr/>
+        <p:nvPr/>
+      </p:nvGrpSpPr>
+      <p:grpSpPr>
+        <a:xfrm>
+          <a:off x="0" y="0"/>
+          <a:ext cx="0" cy="0"/>
+          <a:chOff x="0" y="0"/>
+          <a:chExt cx="0" cy="0"/>
+        </a:xfrm>
+      </p:grpSpPr>
+      <p:sp>
+        <p:nvSpPr>
+          <p:cNvPr id="2" name="Slide Image Placeholder 1"/>
+          <p:cNvSpPr>
+            <a:spLocks noGrp="1" noRot="1" noChangeAspect="1"/>
+          </p:cNvSpPr>
+          <p:nvPr>
+            <p:ph type="sldImg"/>
+          </p:nvPr>
+        </p:nvSpPr>
+        <p:spPr/>
+      </p:sp>
+      <p:sp>
+        <p:nvSpPr>
+          <p:cNvPr id="3" name="Notes Placeholder 2"/>
+          <p:cNvSpPr>
+            <a:spLocks noGrp="1"/>
+          </p:cNvSpPr>
+          <p:nvPr>
+            <p:ph type="body" idx="1"/>
+          </p:nvPr>
+        </p:nvSpPr>
+        <p:spPr/>
+        <p:txBody>
+          <a:bodyPr/>
+          <a:lstStyle/>
+          <a:p>
+            <a:r>
+              <a:rPr lang="en-US" dirty="0"/>
+              <a:t>This slide shows the median alcohol by volume across all the states where we have the top 10 states on the left and on the right, we have map of all the states shaded by median ABV. The bluest states have craft beers with the highest ABV.  </a:t>
+            </a:r>
+            <a:r>
+              <a:rPr lang="en-US" dirty="0" err="1"/>
+              <a:t>Budweizer</a:t>
+            </a:r>
+            <a:r>
+              <a:rPr lang="en-US" dirty="0"/>
+              <a:t> has an ABV of .05 or 5%</a:t>
+            </a:r>
+          </a:p>
+          <a:p>
+            <a:r>
+              <a:rPr lang="pt-BR" b="1" dirty="0">
+                <a:effectLst/>
+              </a:rPr>
+              <a:t>DE</a:t>
+            </a:r>
+            <a:r>
+              <a:rPr lang="pt-BR" dirty="0">
+                <a:effectLst/>
+              </a:rPr>
+              <a:t> %6.3</a:t>
+            </a:r>
+            <a:r>
+              <a:rPr lang="pt-BR" u="sng" dirty="0">
+                <a:effectLst/>
+              </a:rPr>
+              <a:t>5,</a:t>
+            </a:r>
+            <a:r>
+              <a:rPr lang="pt-BR" b="1" dirty="0">
+                <a:effectLst/>
+              </a:rPr>
+              <a:t>CA</a:t>
+            </a:r>
+            <a:r>
+              <a:rPr lang="pt-BR" dirty="0">
+                <a:effectLst/>
+              </a:rPr>
+              <a:t> %6 ,</a:t>
+            </a:r>
+            <a:r>
+              <a:rPr lang="pt-BR" b="1" dirty="0">
+                <a:effectLst/>
+              </a:rPr>
+              <a:t>AR</a:t>
+            </a:r>
+            <a:r>
+              <a:rPr lang="pt-BR" dirty="0">
+                <a:effectLst/>
+              </a:rPr>
+              <a:t> %5,</a:t>
+            </a:r>
+            <a:r>
+              <a:rPr lang="pt-BR" b="1" dirty="0">
+                <a:effectLst/>
+              </a:rPr>
+              <a:t>AK</a:t>
+            </a:r>
+            <a:r>
+              <a:rPr lang="pt-BR" dirty="0">
+                <a:effectLst/>
+              </a:rPr>
+              <a:t> %5.6,</a:t>
+            </a:r>
+            <a:r>
+              <a:rPr lang="pt-BR" b="1" dirty="0">
+                <a:effectLst/>
+              </a:rPr>
+              <a:t>AL</a:t>
+            </a:r>
+            <a:r>
+              <a:rPr lang="pt-BR" dirty="0">
+                <a:effectLst/>
+              </a:rPr>
+              <a:t> %6 </a:t>
+            </a:r>
+            <a:endParaRPr lang="en-US" dirty="0"/>
+          </a:p>
+        </p:txBody>
+      </p:sp>
+      <p:sp>
+        <p:nvSpPr>
+          <p:cNvPr id="4" name="Slide Number Placeholder 3"/>
+          <p:cNvSpPr>
+            <a:spLocks noGrp="1"/>
+          </p:cNvSpPr>
+          <p:nvPr>
+            <p:ph type="sldNum" sz="quarter" idx="5"/>
+          </p:nvPr>
+        </p:nvSpPr>
+        <p:spPr/>
+        <p:txBody>
+          <a:bodyPr/>
+          <a:lstStyle/>
+          <a:p>
+            <a:fld id="{F5C4DEE2-34CF-4AC0-92C7-876E2D6A0326}" type="slidenum">
+              <a:rPr lang="en-US" smtClean="0"/>
+              <a:t>4</a:t>
+            </a:fld>
+            <a:endParaRPr lang="en-US"/>
+          </a:p>
+        </p:txBody>
+      </p:sp>
+    </p:spTree>
+    <p:extLst>
+      <p:ext uri="{BB962C8B-B14F-4D97-AF65-F5344CB8AC3E}">
+        <p14:creationId xmlns:p14="http://schemas.microsoft.com/office/powerpoint/2010/main" val="2090369450"/>
+      </p:ext>
+    </p:extLst>
+  </p:cSld>
+  <p:clrMapOvr>
+    <a:masterClrMapping/>
+  </p:clrMapOvr>
+</p:notes>
+</file>
+
+<file path=ppt/notesSlides/notesSlide5.xml><?xml version="1.0" encoding="utf-8"?>
+<p:notes xmlns:a="http://schemas.openxmlformats.org/drawingml/2006/main" xmlns:r="http://schemas.openxmlformats.org/officeDocument/2006/relationships" xmlns:p="http://schemas.openxmlformats.org/presentationml/2006/main">
+  <p:cSld>
+    <p:spTree>
+      <p:nvGrpSpPr>
+        <p:cNvPr id="1" name=""/>
+        <p:cNvGrpSpPr/>
+        <p:nvPr/>
+      </p:nvGrpSpPr>
+      <p:grpSpPr>
+        <a:xfrm>
+          <a:off x="0" y="0"/>
+          <a:ext cx="0" cy="0"/>
+          <a:chOff x="0" y="0"/>
+          <a:chExt cx="0" cy="0"/>
+        </a:xfrm>
+      </p:grpSpPr>
+      <p:sp>
+        <p:nvSpPr>
+          <p:cNvPr id="2" name="Slide Image Placeholder 1"/>
+          <p:cNvSpPr>
+            <a:spLocks noGrp="1" noRot="1" noChangeAspect="1"/>
+          </p:cNvSpPr>
+          <p:nvPr>
+            <p:ph type="sldImg"/>
+          </p:nvPr>
+        </p:nvSpPr>
+        <p:spPr/>
+      </p:sp>
+      <p:sp>
+        <p:nvSpPr>
+          <p:cNvPr id="3" name="Notes Placeholder 2"/>
+          <p:cNvSpPr>
+            <a:spLocks noGrp="1"/>
+          </p:cNvSpPr>
+          <p:nvPr>
+            <p:ph type="body" idx="1"/>
+          </p:nvPr>
+        </p:nvSpPr>
+        <p:spPr/>
+        <p:txBody>
+          <a:bodyPr/>
+          <a:lstStyle/>
+          <a:p>
+            <a:pPr marL="0" marR="0" lvl="0" indent="0" algn="l" defTabSz="914400" rtl="0" eaLnBrk="1" fontAlgn="auto" latinLnBrk="0" hangingPunct="1">
+              <a:lnSpc>
+                <a:spcPct val="100000"/>
+              </a:lnSpc>
+              <a:spcBef>
+                <a:spcPts val="0"/>
+              </a:spcBef>
+              <a:spcAft>
+                <a:spcPts val="0"/>
+              </a:spcAft>
+              <a:buClrTx/>
+              <a:buSzTx/>
+              <a:buFontTx/>
+              <a:buNone/>
+              <a:tabLst/>
+              <a:defRPr/>
+            </a:pPr>
+            <a:r>
+              <a:rPr lang="en-US" dirty="0"/>
+              <a:t>This slide shows the median international bitterness units across all the states with a top 10 bar chart on the left and a map of all the states by IBU on the right.. The lightest blue states have craft beers with the highest IBU. </a:t>
+            </a:r>
+            <a:r>
+              <a:rPr lang="en-US" dirty="0" err="1"/>
+              <a:t>Budweizer</a:t>
+            </a:r>
+            <a:r>
+              <a:rPr lang="en-US" dirty="0"/>
+              <a:t> has an IBU of 7.</a:t>
+            </a:r>
+          </a:p>
+          <a:p>
+            <a:r>
+              <a:rPr lang="en-US" b="1" dirty="0"/>
+              <a:t>DE</a:t>
+            </a:r>
+            <a:r>
+              <a:rPr lang="en-US" dirty="0"/>
+              <a:t> 70, </a:t>
+            </a:r>
+            <a:r>
+              <a:rPr lang="en-US" b="1" dirty="0"/>
+              <a:t>CA</a:t>
+            </a:r>
+            <a:r>
+              <a:rPr lang="en-US" dirty="0"/>
+              <a:t> 47, </a:t>
+            </a:r>
+            <a:r>
+              <a:rPr lang="en-US" b="1" dirty="0"/>
+              <a:t>AR</a:t>
+            </a:r>
+            <a:r>
+              <a:rPr lang="en-US" dirty="0"/>
+              <a:t> 45, </a:t>
+            </a:r>
+            <a:r>
+              <a:rPr lang="en-US" b="1" dirty="0"/>
+              <a:t>AK</a:t>
+            </a:r>
+            <a:r>
+              <a:rPr lang="en-US" dirty="0"/>
+              <a:t> 40, </a:t>
+            </a:r>
+            <a:r>
+              <a:rPr lang="en-US" b="1" dirty="0"/>
+              <a:t>AL</a:t>
+            </a:r>
+            <a:r>
+              <a:rPr lang="en-US" dirty="0"/>
+              <a:t> 39.5, </a:t>
+            </a:r>
+            <a:r>
+              <a:rPr lang="en-US" b="1" dirty="0"/>
+              <a:t>CO</a:t>
+            </a:r>
+            <a:r>
+              <a:rPr lang="en-US" dirty="0"/>
+              <a:t> 37, </a:t>
+            </a:r>
+            <a:r>
+              <a:rPr lang="en-US" b="1" dirty="0"/>
+              <a:t>FL</a:t>
+            </a:r>
+            <a:r>
+              <a:rPr lang="en-US" dirty="0"/>
+              <a:t> 29.5, </a:t>
+            </a:r>
+            <a:r>
+              <a:rPr lang="en-US" b="1" dirty="0"/>
+              <a:t>AZ</a:t>
+            </a:r>
+            <a:r>
+              <a:rPr lang="en-US" dirty="0"/>
+              <a:t> 20, </a:t>
+            </a:r>
+            <a:r>
+              <a:rPr lang="en-US" b="1" dirty="0"/>
+              <a:t>CT</a:t>
+            </a:r>
+            <a:r>
+              <a:rPr lang="en-US" dirty="0"/>
+              <a:t> 17, </a:t>
+            </a:r>
+            <a:r>
+              <a:rPr lang="en-US" b="1" dirty="0"/>
+              <a:t>DC</a:t>
+            </a:r>
+            <a:r>
+              <a:rPr lang="en-US" dirty="0"/>
+              <a:t> 16</a:t>
+            </a:r>
+          </a:p>
+        </p:txBody>
+      </p:sp>
+      <p:sp>
+        <p:nvSpPr>
+          <p:cNvPr id="4" name="Slide Number Placeholder 3"/>
+          <p:cNvSpPr>
+            <a:spLocks noGrp="1"/>
+          </p:cNvSpPr>
+          <p:nvPr>
+            <p:ph type="sldNum" sz="quarter" idx="5"/>
+          </p:nvPr>
+        </p:nvSpPr>
+        <p:spPr/>
+        <p:txBody>
+          <a:bodyPr/>
+          <a:lstStyle/>
+          <a:p>
+            <a:fld id="{F5C4DEE2-34CF-4AC0-92C7-876E2D6A0326}" type="slidenum">
+              <a:rPr lang="en-US" smtClean="0"/>
+              <a:t>5</a:t>
+            </a:fld>
+            <a:endParaRPr lang="en-US"/>
+          </a:p>
+        </p:txBody>
+      </p:sp>
+    </p:spTree>
+    <p:extLst>
+      <p:ext uri="{BB962C8B-B14F-4D97-AF65-F5344CB8AC3E}">
+        <p14:creationId xmlns:p14="http://schemas.microsoft.com/office/powerpoint/2010/main" val="1246851044"/>
+      </p:ext>
+    </p:extLst>
+  </p:cSld>
+  <p:clrMapOvr>
+    <a:masterClrMapping/>
+  </p:clrMapOvr>
+</p:notes>
+</file>
+
+<file path=ppt/notesSlides/notesSlide6.xml><?xml version="1.0" encoding="utf-8"?>
+<p:notes xmlns:a="http://schemas.openxmlformats.org/drawingml/2006/main" xmlns:r="http://schemas.openxmlformats.org/officeDocument/2006/relationships" xmlns:p="http://schemas.openxmlformats.org/presentationml/2006/main">
+  <p:cSld>
+    <p:spTree>
+      <p:nvGrpSpPr>
+        <p:cNvPr id="1" name=""/>
+        <p:cNvGrpSpPr/>
+        <p:nvPr/>
+      </p:nvGrpSpPr>
+      <p:grpSpPr>
+        <a:xfrm>
+          <a:off x="0" y="0"/>
+          <a:ext cx="0" cy="0"/>
+          <a:chOff x="0" y="0"/>
+          <a:chExt cx="0" cy="0"/>
+        </a:xfrm>
+      </p:grpSpPr>
+      <p:sp>
+        <p:nvSpPr>
+          <p:cNvPr id="2" name="Slide Image Placeholder 1"/>
+          <p:cNvSpPr>
+            <a:spLocks noGrp="1" noRot="1" noChangeAspect="1"/>
+          </p:cNvSpPr>
+          <p:nvPr>
+            <p:ph type="sldImg"/>
+          </p:nvPr>
+        </p:nvSpPr>
+        <p:spPr/>
+      </p:sp>
+      <p:sp>
+        <p:nvSpPr>
+          <p:cNvPr id="3" name="Notes Placeholder 2"/>
+          <p:cNvSpPr>
+            <a:spLocks noGrp="1"/>
+          </p:cNvSpPr>
+          <p:nvPr>
+            <p:ph type="body" idx="1"/>
+          </p:nvPr>
+        </p:nvSpPr>
+        <p:spPr/>
+        <p:txBody>
+          <a:bodyPr/>
+          <a:lstStyle/>
+          <a:p>
+            <a:r>
+              <a:rPr lang="en-US" dirty="0"/>
+              <a:t>CO ABV Max =~13%, CO IBU=138</a:t>
+            </a:r>
+          </a:p>
+        </p:txBody>
+      </p:sp>
+      <p:sp>
+        <p:nvSpPr>
+          <p:cNvPr id="4" name="Slide Number Placeholder 3"/>
+          <p:cNvSpPr>
+            <a:spLocks noGrp="1"/>
+          </p:cNvSpPr>
+          <p:nvPr>
+            <p:ph type="sldNum" sz="quarter" idx="5"/>
+          </p:nvPr>
+        </p:nvSpPr>
+        <p:spPr/>
+        <p:txBody>
+          <a:bodyPr/>
+          <a:lstStyle/>
+          <a:p>
+            <a:fld id="{F5C4DEE2-34CF-4AC0-92C7-876E2D6A0326}" type="slidenum">
+              <a:rPr lang="en-US" smtClean="0"/>
+              <a:t>6</a:t>
+            </a:fld>
+            <a:endParaRPr lang="en-US"/>
+          </a:p>
+        </p:txBody>
+      </p:sp>
+    </p:spTree>
+    <p:extLst>
+      <p:ext uri="{BB962C8B-B14F-4D97-AF65-F5344CB8AC3E}">
+        <p14:creationId xmlns:p14="http://schemas.microsoft.com/office/powerpoint/2010/main" val="414669882"/>
+      </p:ext>
+    </p:extLst>
+  </p:cSld>
+  <p:clrMapOvr>
+    <a:masterClrMapping/>
+  </p:clrMapOvr>
+</p:notes>
+</file>
+
+<file path=ppt/notesSlides/notesSlide7.xml><?xml version="1.0" encoding="utf-8"?>
+<p:notes xmlns:a="http://schemas.openxmlformats.org/drawingml/2006/main" xmlns:r="http://schemas.openxmlformats.org/officeDocument/2006/relationships" xmlns:p="http://schemas.openxmlformats.org/presentationml/2006/main">
+  <p:cSld>
+    <p:spTree>
+      <p:nvGrpSpPr>
+        <p:cNvPr id="1" name=""/>
+        <p:cNvGrpSpPr/>
+        <p:nvPr/>
+      </p:nvGrpSpPr>
+      <p:grpSpPr>
+        <a:xfrm>
+          <a:off x="0" y="0"/>
+          <a:ext cx="0" cy="0"/>
+          <a:chOff x="0" y="0"/>
+          <a:chExt cx="0" cy="0"/>
+        </a:xfrm>
+      </p:grpSpPr>
+      <p:sp>
+        <p:nvSpPr>
+          <p:cNvPr id="2" name="Slide Image Placeholder 1"/>
+          <p:cNvSpPr>
+            <a:spLocks noGrp="1" noRot="1" noChangeAspect="1"/>
+          </p:cNvSpPr>
+          <p:nvPr>
+            <p:ph type="sldImg"/>
+          </p:nvPr>
+        </p:nvSpPr>
+        <p:spPr/>
+      </p:sp>
+      <p:sp>
+        <p:nvSpPr>
+          <p:cNvPr id="3" name="Notes Placeholder 2"/>
+          <p:cNvSpPr>
+            <a:spLocks noGrp="1"/>
+          </p:cNvSpPr>
+          <p:nvPr>
+            <p:ph type="body" idx="1"/>
+          </p:nvPr>
+        </p:nvSpPr>
+        <p:spPr/>
+        <p:txBody>
+          <a:bodyPr/>
+          <a:lstStyle/>
+          <a:p>
+            <a:r>
+              <a:rPr lang="en-US" dirty="0"/>
+              <a:t>This plot shows Alcohol by volume on the x axis with the bitterness units on the y axis.  The styles of beers are listed in the legend on the right with counts of beer styles represented by the size of dot on this plot.  What this tells us is what beers have the most representation and what their IBU and ABV levels are.</a:t>
+            </a:r>
+          </a:p>
+          <a:p>
+            <a:endParaRPr lang="en-US" dirty="0"/>
+          </a:p>
+          <a:p>
+            <a:r>
+              <a:rPr lang="en-US" dirty="0"/>
+              <a:t>Highest bitterness and alcohol by volume are the IPAs in the upper right hand corner of the plot.  The IPAs have the largest circle, meaning there are more IPAs than the other beers.  Stout beers, the orange dot on the right below IPAs are high in ABV and IBU but not as many offerings as their circle is smaller.</a:t>
+            </a:r>
+          </a:p>
+          <a:p>
+            <a:endParaRPr lang="en-US" dirty="0"/>
+          </a:p>
+          <a:p>
+            <a:r>
+              <a:rPr lang="en-US" dirty="0"/>
+              <a:t>Regular Ales are the second most popular in terms of count and are in the mid range in ABV and lower than the middle in bitterness.</a:t>
+            </a:r>
+          </a:p>
+          <a:p>
+            <a:endParaRPr lang="en-US" dirty="0"/>
+          </a:p>
+          <a:p>
+            <a:r>
+              <a:rPr lang="en-US" dirty="0"/>
+              <a:t>Lowest ABV and IBU beers seem to be the least popular with the craft brew producers (Lagers, Blonde Ale, Pilsner, hefeweizen)</a:t>
+            </a:r>
+          </a:p>
+        </p:txBody>
+      </p:sp>
+      <p:sp>
+        <p:nvSpPr>
+          <p:cNvPr id="4" name="Slide Number Placeholder 3"/>
+          <p:cNvSpPr>
+            <a:spLocks noGrp="1"/>
+          </p:cNvSpPr>
+          <p:nvPr>
+            <p:ph type="sldNum" sz="quarter" idx="5"/>
+          </p:nvPr>
+        </p:nvSpPr>
+        <p:spPr/>
+        <p:txBody>
+          <a:bodyPr/>
+          <a:lstStyle/>
+          <a:p>
+            <a:fld id="{F5C4DEE2-34CF-4AC0-92C7-876E2D6A0326}" type="slidenum">
+              <a:rPr lang="en-US" smtClean="0"/>
+              <a:t>9</a:t>
+            </a:fld>
+            <a:endParaRPr lang="en-US"/>
+          </a:p>
+        </p:txBody>
+      </p:sp>
+    </p:spTree>
+    <p:extLst>
+      <p:ext uri="{BB962C8B-B14F-4D97-AF65-F5344CB8AC3E}">
+        <p14:creationId xmlns:p14="http://schemas.microsoft.com/office/powerpoint/2010/main" val="1105539044"/>
+      </p:ext>
+    </p:extLst>
+  </p:cSld>
+  <p:clrMapOvr>
+    <a:masterClrMapping/>
+  </p:clrMapOvr>
+</p:notes>
+</file>
+
+<file path=ppt/notesSlides/notesSlide8.xml><?xml version="1.0" encoding="utf-8"?>
+<p:notes xmlns:a="http://schemas.openxmlformats.org/drawingml/2006/main" xmlns:r="http://schemas.openxmlformats.org/officeDocument/2006/relationships" xmlns:p="http://schemas.openxmlformats.org/presentationml/2006/main">
+  <p:cSld>
+    <p:spTree>
+      <p:nvGrpSpPr>
+        <p:cNvPr id="1" name=""/>
+        <p:cNvGrpSpPr/>
+        <p:nvPr/>
+      </p:nvGrpSpPr>
+      <p:grpSpPr>
+        <a:xfrm>
+          <a:off x="0" y="0"/>
+          <a:ext cx="0" cy="0"/>
+          <a:chOff x="0" y="0"/>
+          <a:chExt cx="0" cy="0"/>
+        </a:xfrm>
+      </p:grpSpPr>
+      <p:sp>
+        <p:nvSpPr>
+          <p:cNvPr id="2" name="Slide Image Placeholder 1"/>
+          <p:cNvSpPr>
+            <a:spLocks noGrp="1" noRot="1" noChangeAspect="1"/>
+          </p:cNvSpPr>
+          <p:nvPr>
+            <p:ph type="sldImg"/>
+          </p:nvPr>
+        </p:nvSpPr>
+        <p:spPr/>
+      </p:sp>
+      <p:sp>
+        <p:nvSpPr>
+          <p:cNvPr id="3" name="Notes Placeholder 2"/>
+          <p:cNvSpPr>
+            <a:spLocks noGrp="1"/>
+          </p:cNvSpPr>
+          <p:nvPr>
+            <p:ph type="body" idx="1"/>
+          </p:nvPr>
+        </p:nvSpPr>
+        <p:spPr/>
+        <p:txBody>
+          <a:bodyPr/>
+          <a:lstStyle/>
+          <a:p>
+            <a:r>
+              <a:rPr lang="en-US" dirty="0"/>
+              <a:t>This plot has ABV across the x axis and IBU on the y axis and is plotting division between IPAs colored in the blue green color and regular Ales, colored in orange.</a:t>
+            </a:r>
+          </a:p>
+        </p:txBody>
+      </p:sp>
+      <p:sp>
+        <p:nvSpPr>
+          <p:cNvPr id="4" name="Slide Number Placeholder 3"/>
+          <p:cNvSpPr>
+            <a:spLocks noGrp="1"/>
+          </p:cNvSpPr>
+          <p:nvPr>
+            <p:ph type="sldNum" sz="quarter" idx="5"/>
+          </p:nvPr>
+        </p:nvSpPr>
+        <p:spPr/>
+        <p:txBody>
+          <a:bodyPr/>
+          <a:lstStyle/>
+          <a:p>
+            <a:fld id="{F5C4DEE2-34CF-4AC0-92C7-876E2D6A0326}" type="slidenum">
+              <a:rPr lang="en-US" smtClean="0"/>
+              <a:t>10</a:t>
+            </a:fld>
+            <a:endParaRPr lang="en-US"/>
+          </a:p>
+        </p:txBody>
+      </p:sp>
+    </p:spTree>
+    <p:extLst>
+      <p:ext uri="{BB962C8B-B14F-4D97-AF65-F5344CB8AC3E}">
+        <p14:creationId xmlns:p14="http://schemas.microsoft.com/office/powerpoint/2010/main" val="143257541"/>
+      </p:ext>
+    </p:extLst>
+  </p:cSld>
+  <p:clrMapOvr>
+    <a:masterClrMapping/>
+  </p:clrMapOvr>
+</p:notes>
+</file>
+
+<file path=ppt/notesSlides/notesSlide9.xml><?xml version="1.0" encoding="utf-8"?>
+<p:notes xmlns:a="http://schemas.openxmlformats.org/drawingml/2006/main" xmlns:r="http://schemas.openxmlformats.org/officeDocument/2006/relationships" xmlns:p="http://schemas.openxmlformats.org/presentationml/2006/main">
+  <p:cSld>
+    <p:spTree>
+      <p:nvGrpSpPr>
+        <p:cNvPr id="1" name=""/>
+        <p:cNvGrpSpPr/>
+        <p:nvPr/>
+      </p:nvGrpSpPr>
+      <p:grpSpPr>
+        <a:xfrm>
+          <a:off x="0" y="0"/>
+          <a:ext cx="0" cy="0"/>
+          <a:chOff x="0" y="0"/>
+          <a:chExt cx="0" cy="0"/>
+        </a:xfrm>
+      </p:grpSpPr>
+      <p:sp>
+        <p:nvSpPr>
+          <p:cNvPr id="2" name="Slide Image Placeholder 1"/>
+          <p:cNvSpPr>
+            <a:spLocks noGrp="1" noRot="1" noChangeAspect="1"/>
+          </p:cNvSpPr>
+          <p:nvPr>
+            <p:ph type="sldImg"/>
+          </p:nvPr>
+        </p:nvSpPr>
+        <p:spPr/>
+      </p:sp>
+      <p:sp>
+        <p:nvSpPr>
+          <p:cNvPr id="3" name="Notes Placeholder 2"/>
+          <p:cNvSpPr>
+            <a:spLocks noGrp="1"/>
+          </p:cNvSpPr>
+          <p:nvPr>
+            <p:ph type="body" idx="1"/>
+          </p:nvPr>
+        </p:nvSpPr>
+        <p:spPr/>
+        <p:txBody>
+          <a:bodyPr/>
+          <a:lstStyle/>
+          <a:p>
+            <a:r>
+              <a:rPr lang="en-US" dirty="0"/>
+              <a:t>This plot and table of the K Nearest Neighbor classifier describes how the Ales vs IPAs were classified using ABV and IBU.  The best K value is the value the generates the most accurate classifications. We were able to classify our subset of all Ales as either IPA or other Ales.</a:t>
+            </a:r>
+          </a:p>
+        </p:txBody>
+      </p:sp>
+      <p:sp>
+        <p:nvSpPr>
+          <p:cNvPr id="4" name="Slide Number Placeholder 3"/>
+          <p:cNvSpPr>
+            <a:spLocks noGrp="1"/>
+          </p:cNvSpPr>
+          <p:nvPr>
+            <p:ph type="sldNum" sz="quarter" idx="5"/>
+          </p:nvPr>
+        </p:nvSpPr>
+        <p:spPr/>
+        <p:txBody>
+          <a:bodyPr/>
+          <a:lstStyle/>
+          <a:p>
+            <a:fld id="{F5C4DEE2-34CF-4AC0-92C7-876E2D6A0326}" type="slidenum">
+              <a:rPr lang="en-US" smtClean="0"/>
+              <a:t>11</a:t>
+            </a:fld>
+            <a:endParaRPr lang="en-US"/>
+          </a:p>
+        </p:txBody>
+      </p:sp>
+    </p:spTree>
+    <p:extLst>
+      <p:ext uri="{BB962C8B-B14F-4D97-AF65-F5344CB8AC3E}">
+        <p14:creationId xmlns:p14="http://schemas.microsoft.com/office/powerpoint/2010/main" val="3502404967"/>
+      </p:ext>
+    </p:extLst>
+  </p:cSld>
+  <p:clrMapOvr>
+    <a:masterClrMapping/>
+  </p:clrMapOvr>
+</p:notes>
 </file>
 
 <file path=ppt/slideLayouts/slideLayout1.xml><?xml version="1.0" encoding="utf-8"?>
@@ -1220,7 +2706,7 @@
             <a:fld id="{B61BEF0D-F0BB-DE4B-95CE-6DB70DBA9567}" type="datetimeFigureOut">
               <a:rPr lang="en-US" dirty="0"/>
               <a:pPr/>
-              <a:t>10/25/2019</a:t>
+              <a:t>10/26/2019</a:t>
             </a:fld>
             <a:endParaRPr lang="en-US" dirty="0"/>
           </a:p>
@@ -1468,7 +2954,7 @@
             <a:fld id="{B61BEF0D-F0BB-DE4B-95CE-6DB70DBA9567}" type="datetimeFigureOut">
               <a:rPr lang="en-US" dirty="0"/>
               <a:pPr/>
-              <a:t>10/25/2019</a:t>
+              <a:t>10/26/2019</a:t>
             </a:fld>
             <a:endParaRPr lang="en-US" dirty="0"/>
           </a:p>
@@ -1779,7 +3265,7 @@
             <a:fld id="{B61BEF0D-F0BB-DE4B-95CE-6DB70DBA9567}" type="datetimeFigureOut">
               <a:rPr lang="en-US" dirty="0"/>
               <a:pPr/>
-              <a:t>10/25/2019</a:t>
+              <a:t>10/26/2019</a:t>
             </a:fld>
             <a:endParaRPr lang="en-US" dirty="0"/>
           </a:p>
@@ -2117,7 +3603,7 @@
             <a:fld id="{B61BEF0D-F0BB-DE4B-95CE-6DB70DBA9567}" type="datetimeFigureOut">
               <a:rPr lang="en-US" dirty="0"/>
               <a:pPr/>
-              <a:t>10/25/2019</a:t>
+              <a:t>10/26/2019</a:t>
             </a:fld>
             <a:endParaRPr lang="en-US" dirty="0"/>
           </a:p>
@@ -2428,7 +3914,7 @@
             <a:fld id="{B61BEF0D-F0BB-DE4B-95CE-6DB70DBA9567}" type="datetimeFigureOut">
               <a:rPr lang="en-US" dirty="0"/>
               <a:pPr/>
-              <a:t>10/25/2019</a:t>
+              <a:t>10/26/2019</a:t>
             </a:fld>
             <a:endParaRPr lang="en-US" dirty="0"/>
           </a:p>
@@ -2818,7 +4304,7 @@
             <a:fld id="{B61BEF0D-F0BB-DE4B-95CE-6DB70DBA9567}" type="datetimeFigureOut">
               <a:rPr lang="en-US" dirty="0"/>
               <a:pPr/>
-              <a:t>10/25/2019</a:t>
+              <a:t>10/26/2019</a:t>
             </a:fld>
             <a:endParaRPr lang="en-US" dirty="0"/>
           </a:p>
@@ -2984,7 +4470,7 @@
           <a:p>
             <a:fld id="{55C6B4A9-1611-4792-9094-5F34BCA07E0B}" type="datetimeFigureOut">
               <a:rPr lang="en-US" dirty="0"/>
-              <a:t>10/25/2019</a:t>
+              <a:t>10/26/2019</a:t>
             </a:fld>
             <a:endParaRPr lang="en-US" dirty="0"/>
           </a:p>
@@ -3160,7 +4646,7 @@
             <a:fld id="{B61BEF0D-F0BB-DE4B-95CE-6DB70DBA9567}" type="datetimeFigureOut">
               <a:rPr lang="en-US" dirty="0"/>
               <a:pPr/>
-              <a:t>10/25/2019</a:t>
+              <a:t>10/26/2019</a:t>
             </a:fld>
             <a:endParaRPr lang="en-US" dirty="0"/>
           </a:p>
@@ -3333,7 +4819,7 @@
             <a:fld id="{B61BEF0D-F0BB-DE4B-95CE-6DB70DBA9567}" type="datetimeFigureOut">
               <a:rPr lang="en-US" dirty="0"/>
               <a:pPr/>
-              <a:t>10/25/2019</a:t>
+              <a:t>10/26/2019</a:t>
             </a:fld>
             <a:endParaRPr lang="en-US" dirty="0"/>
           </a:p>
@@ -3577,7 +5063,7 @@
             <a:fld id="{B61BEF0D-F0BB-DE4B-95CE-6DB70DBA9567}" type="datetimeFigureOut">
               <a:rPr lang="en-US" dirty="0"/>
               <a:pPr/>
-              <a:t>10/25/2019</a:t>
+              <a:t>10/26/2019</a:t>
             </a:fld>
             <a:endParaRPr lang="en-US" dirty="0"/>
           </a:p>
@@ -3805,7 +5291,7 @@
           <a:p>
             <a:fld id="{EB712588-04B1-427B-82EE-E8DB90309F08}" type="datetimeFigureOut">
               <a:rPr lang="en-US" dirty="0"/>
-              <a:t>10/25/2019</a:t>
+              <a:t>10/26/2019</a:t>
             </a:fld>
             <a:endParaRPr lang="en-US" dirty="0"/>
           </a:p>
@@ -4175,7 +5661,7 @@
             <a:fld id="{B61BEF0D-F0BB-DE4B-95CE-6DB70DBA9567}" type="datetimeFigureOut">
               <a:rPr lang="en-US" dirty="0"/>
               <a:pPr/>
-              <a:t>10/25/2019</a:t>
+              <a:t>10/26/2019</a:t>
             </a:fld>
             <a:endParaRPr lang="en-US" dirty="0"/>
           </a:p>
@@ -4295,7 +5781,7 @@
             <a:fld id="{B61BEF0D-F0BB-DE4B-95CE-6DB70DBA9567}" type="datetimeFigureOut">
               <a:rPr lang="en-US" dirty="0"/>
               <a:pPr/>
-              <a:t>10/25/2019</a:t>
+              <a:t>10/26/2019</a:t>
             </a:fld>
             <a:endParaRPr lang="en-US" dirty="0"/>
           </a:p>
@@ -4387,7 +5873,7 @@
             <a:fld id="{B61BEF0D-F0BB-DE4B-95CE-6DB70DBA9567}" type="datetimeFigureOut">
               <a:rPr lang="en-US" dirty="0"/>
               <a:pPr/>
-              <a:t>10/25/2019</a:t>
+              <a:t>10/26/2019</a:t>
             </a:fld>
             <a:endParaRPr lang="en-US" dirty="0"/>
           </a:p>
@@ -4638,7 +6124,7 @@
           <a:p>
             <a:fld id="{42A54C80-263E-416B-A8E0-580EDEADCBDC}" type="datetimeFigureOut">
               <a:rPr lang="en-US" dirty="0"/>
-              <a:t>10/25/2019</a:t>
+              <a:t>10/26/2019</a:t>
             </a:fld>
             <a:endParaRPr lang="en-US" dirty="0"/>
           </a:p>
@@ -4897,7 +6383,7 @@
             <a:fld id="{B61BEF0D-F0BB-DE4B-95CE-6DB70DBA9567}" type="datetimeFigureOut">
               <a:rPr lang="en-US" dirty="0"/>
               <a:pPr/>
-              <a:t>10/25/2019</a:t>
+              <a:t>10/26/2019</a:t>
             </a:fld>
             <a:endParaRPr lang="en-US" dirty="0"/>
           </a:p>
@@ -5637,7 +7123,7 @@
             <a:fld id="{B61BEF0D-F0BB-DE4B-95CE-6DB70DBA9567}" type="datetimeFigureOut">
               <a:rPr lang="en-US" dirty="0"/>
               <a:pPr/>
-              <a:t>10/25/2019</a:t>
+              <a:t>10/26/2019</a:t>
             </a:fld>
             <a:endParaRPr lang="en-US" dirty="0"/>
           </a:p>
@@ -6304,10 +7790,10 @@
       </p:sp>
       <p:pic>
         <p:nvPicPr>
-          <p:cNvPr id="7" name="Picture 6">
+          <p:cNvPr id="4" name="Picture 3">
             <a:extLst>
               <a:ext uri="{FF2B5EF4-FFF2-40B4-BE49-F238E27FC236}">
-                <a16:creationId xmlns:a16="http://schemas.microsoft.com/office/drawing/2014/main" id="{5A1DD4FF-BC1D-489D-9F7A-4707B5CC7B59}"/>
+                <a16:creationId xmlns:a16="http://schemas.microsoft.com/office/drawing/2014/main" id="{E7453A86-E8B0-469F-9E88-14067E02E948}"/>
               </a:ext>
             </a:extLst>
           </p:cNvPr>
@@ -6317,15 +7803,15 @@
           <p:nvPr/>
         </p:nvPicPr>
         <p:blipFill>
-          <a:blip r:embed="rId2"/>
+          <a:blip r:embed="rId3"/>
           <a:stretch>
             <a:fillRect/>
           </a:stretch>
         </p:blipFill>
         <p:spPr>
           <a:xfrm>
-            <a:off x="505268" y="1628136"/>
-            <a:ext cx="8940800" cy="3878819"/>
+            <a:off x="468782" y="1566444"/>
+            <a:ext cx="8768622" cy="3471112"/>
           </a:xfrm>
           <a:prstGeom prst="rect">
             <a:avLst/>
@@ -6597,7 +8083,7 @@
           <p:nvPr/>
         </p:nvPicPr>
         <p:blipFill>
-          <a:blip r:embed="rId2"/>
+          <a:blip r:embed="rId3"/>
           <a:stretch>
             <a:fillRect/>
           </a:stretch>
@@ -6691,7 +8177,7 @@
           <p:nvPr/>
         </p:nvPicPr>
         <p:blipFill>
-          <a:blip r:embed="rId2"/>
+          <a:blip r:embed="rId3"/>
           <a:stretch>
             <a:fillRect/>
           </a:stretch>
@@ -6708,10 +8194,10 @@
       </p:pic>
       <p:pic>
         <p:nvPicPr>
-          <p:cNvPr id="5" name="Picture 4">
+          <p:cNvPr id="6" name="Picture 5">
             <a:extLst>
               <a:ext uri="{FF2B5EF4-FFF2-40B4-BE49-F238E27FC236}">
-                <a16:creationId xmlns:a16="http://schemas.microsoft.com/office/drawing/2014/main" id="{3B657AA3-5204-43D5-84C5-2D85BBAECD54}"/>
+                <a16:creationId xmlns:a16="http://schemas.microsoft.com/office/drawing/2014/main" id="{0F086295-894F-4999-8B92-C85F4B266CEC}"/>
               </a:ext>
             </a:extLst>
           </p:cNvPr>
@@ -6721,60 +8207,51 @@
           <p:nvPr/>
         </p:nvPicPr>
         <p:blipFill>
-          <a:blip r:embed="rId3"/>
+          <a:blip r:embed="rId4"/>
           <a:stretch>
             <a:fillRect/>
           </a:stretch>
         </p:blipFill>
         <p:spPr>
           <a:xfrm>
-            <a:off x="4494239" y="2108818"/>
-            <a:ext cx="4779763" cy="2952489"/>
+            <a:off x="5217245" y="1930400"/>
+            <a:ext cx="2851488" cy="1710893"/>
           </a:xfrm>
           <a:prstGeom prst="rect">
             <a:avLst/>
           </a:prstGeom>
         </p:spPr>
       </p:pic>
-      <p:sp>
-        <p:nvSpPr>
-          <p:cNvPr id="3" name="TextBox 2">
+      <p:pic>
+        <p:nvPicPr>
+          <p:cNvPr id="7" name="Picture 6">
             <a:extLst>
               <a:ext uri="{FF2B5EF4-FFF2-40B4-BE49-F238E27FC236}">
-                <a16:creationId xmlns:a16="http://schemas.microsoft.com/office/drawing/2014/main" id="{94B4D8DC-9206-4B90-B9F7-636D210871B7}"/>
+                <a16:creationId xmlns:a16="http://schemas.microsoft.com/office/drawing/2014/main" id="{803665DE-6182-45A2-80C5-87E9270E85CD}"/>
               </a:ext>
             </a:extLst>
           </p:cNvPr>
-          <p:cNvSpPr txBox="1"/>
+          <p:cNvPicPr>
+            <a:picLocks noChangeAspect="1"/>
+          </p:cNvPicPr>
           <p:nvPr/>
-        </p:nvSpPr>
+        </p:nvPicPr>
+        <p:blipFill>
+          <a:blip r:embed="rId5"/>
+          <a:stretch>
+            <a:fillRect/>
+          </a:stretch>
+        </p:blipFill>
         <p:spPr>
           <a:xfrm>
-            <a:off x="1792150" y="5423770"/>
-            <a:ext cx="2092377" cy="584775"/>
+            <a:off x="5217245" y="4005264"/>
+            <a:ext cx="2851488" cy="1710893"/>
           </a:xfrm>
           <a:prstGeom prst="rect">
             <a:avLst/>
           </a:prstGeom>
-          <a:noFill/>
         </p:spPr>
-        <p:txBody>
-          <a:bodyPr wrap="square" rtlCol="0">
-            <a:spAutoFit/>
-          </a:bodyPr>
-          <a:lstStyle/>
-          <a:p>
-            <a:r>
-              <a:rPr lang="en-US" sz="1600" dirty="0" err="1"/>
-              <a:t>Budweizer</a:t>
-            </a:r>
-            <a:r>
-              <a:rPr lang="en-US" sz="1600" dirty="0"/>
-              <a:t> and Bud Light or Lagers</a:t>
-            </a:r>
-          </a:p>
-        </p:txBody>
-      </p:sp>
+      </p:pic>
     </p:spTree>
     <p:extLst>
       <p:ext uri="{BB962C8B-B14F-4D97-AF65-F5344CB8AC3E}">
@@ -6836,36 +8313,6 @@
       </p:sp>
       <p:pic>
         <p:nvPicPr>
-          <p:cNvPr id="4" name="Picture 3">
-            <a:extLst>
-              <a:ext uri="{FF2B5EF4-FFF2-40B4-BE49-F238E27FC236}">
-                <a16:creationId xmlns:a16="http://schemas.microsoft.com/office/drawing/2014/main" id="{D21277BD-9A59-4CFE-8F47-AAFFC542EC06}"/>
-              </a:ext>
-            </a:extLst>
-          </p:cNvPr>
-          <p:cNvPicPr>
-            <a:picLocks noChangeAspect="1"/>
-          </p:cNvPicPr>
-          <p:nvPr/>
-        </p:nvPicPr>
-        <p:blipFill>
-          <a:blip r:embed="rId2"/>
-          <a:stretch>
-            <a:fillRect/>
-          </a:stretch>
-        </p:blipFill>
-        <p:spPr>
-          <a:xfrm>
-            <a:off x="4308277" y="1989110"/>
-            <a:ext cx="5140524" cy="3175334"/>
-          </a:xfrm>
-          <a:prstGeom prst="rect">
-            <a:avLst/>
-          </a:prstGeom>
-        </p:spPr>
-      </p:pic>
-      <p:pic>
-        <p:nvPicPr>
           <p:cNvPr id="5" name="Picture 4">
             <a:extLst>
               <a:ext uri="{FF2B5EF4-FFF2-40B4-BE49-F238E27FC236}">
@@ -6888,6 +8335,66 @@
           <a:xfrm>
             <a:off x="1748753" y="2178916"/>
             <a:ext cx="2130521" cy="2985528"/>
+          </a:xfrm>
+          <a:prstGeom prst="rect">
+            <a:avLst/>
+          </a:prstGeom>
+        </p:spPr>
+      </p:pic>
+      <p:pic>
+        <p:nvPicPr>
+          <p:cNvPr id="3" name="Picture 2">
+            <a:extLst>
+              <a:ext uri="{FF2B5EF4-FFF2-40B4-BE49-F238E27FC236}">
+                <a16:creationId xmlns:a16="http://schemas.microsoft.com/office/drawing/2014/main" id="{2F21EE0F-4F4E-4760-A836-4F59349099CD}"/>
+              </a:ext>
+            </a:extLst>
+          </p:cNvPr>
+          <p:cNvPicPr>
+            <a:picLocks noChangeAspect="1"/>
+          </p:cNvPicPr>
+          <p:nvPr/>
+        </p:nvPicPr>
+        <p:blipFill>
+          <a:blip r:embed="rId4"/>
+          <a:stretch>
+            <a:fillRect/>
+          </a:stretch>
+        </p:blipFill>
+        <p:spPr>
+          <a:xfrm>
+            <a:off x="4975668" y="1848716"/>
+            <a:ext cx="3225988" cy="1935593"/>
+          </a:xfrm>
+          <a:prstGeom prst="rect">
+            <a:avLst/>
+          </a:prstGeom>
+        </p:spPr>
+      </p:pic>
+      <p:pic>
+        <p:nvPicPr>
+          <p:cNvPr id="6" name="Picture 5">
+            <a:extLst>
+              <a:ext uri="{FF2B5EF4-FFF2-40B4-BE49-F238E27FC236}">
+                <a16:creationId xmlns:a16="http://schemas.microsoft.com/office/drawing/2014/main" id="{8A3365C1-3856-4B71-92EC-D57DB02877BC}"/>
+              </a:ext>
+            </a:extLst>
+          </p:cNvPr>
+          <p:cNvPicPr>
+            <a:picLocks noChangeAspect="1"/>
+          </p:cNvPicPr>
+          <p:nvPr/>
+        </p:nvPicPr>
+        <p:blipFill>
+          <a:blip r:embed="rId5"/>
+          <a:stretch>
+            <a:fillRect/>
+          </a:stretch>
+        </p:blipFill>
+        <p:spPr>
+          <a:xfrm>
+            <a:off x="4975668" y="4312807"/>
+            <a:ext cx="3225988" cy="1935593"/>
           </a:xfrm>
           <a:prstGeom prst="rect">
             <a:avLst/>
@@ -6954,36 +8461,6 @@
       </p:sp>
       <p:pic>
         <p:nvPicPr>
-          <p:cNvPr id="4" name="Picture 3">
-            <a:extLst>
-              <a:ext uri="{FF2B5EF4-FFF2-40B4-BE49-F238E27FC236}">
-                <a16:creationId xmlns:a16="http://schemas.microsoft.com/office/drawing/2014/main" id="{2DFE0069-AD9E-48EF-9784-7CC69F29ACD3}"/>
-              </a:ext>
-            </a:extLst>
-          </p:cNvPr>
-          <p:cNvPicPr>
-            <a:picLocks noChangeAspect="1"/>
-          </p:cNvPicPr>
-          <p:nvPr/>
-        </p:nvPicPr>
-        <p:blipFill>
-          <a:blip r:embed="rId2"/>
-          <a:stretch>
-            <a:fillRect/>
-          </a:stretch>
-        </p:blipFill>
-        <p:spPr>
-          <a:xfrm>
-            <a:off x="4468150" y="2321622"/>
-            <a:ext cx="4931187" cy="3046025"/>
-          </a:xfrm>
-          <a:prstGeom prst="rect">
-            <a:avLst/>
-          </a:prstGeom>
-        </p:spPr>
-      </p:pic>
-      <p:pic>
-        <p:nvPicPr>
           <p:cNvPr id="5" name="Picture 4">
             <a:extLst>
               <a:ext uri="{FF2B5EF4-FFF2-40B4-BE49-F238E27FC236}">
@@ -7006,6 +8483,66 @@
           <a:xfrm>
             <a:off x="1672710" y="2226337"/>
             <a:ext cx="2239906" cy="3236593"/>
+          </a:xfrm>
+          <a:prstGeom prst="rect">
+            <a:avLst/>
+          </a:prstGeom>
+        </p:spPr>
+      </p:pic>
+      <p:pic>
+        <p:nvPicPr>
+          <p:cNvPr id="3" name="Picture 2">
+            <a:extLst>
+              <a:ext uri="{FF2B5EF4-FFF2-40B4-BE49-F238E27FC236}">
+                <a16:creationId xmlns:a16="http://schemas.microsoft.com/office/drawing/2014/main" id="{81DB26EC-5A2A-4164-B43B-934E53E05E7B}"/>
+              </a:ext>
+            </a:extLst>
+          </p:cNvPr>
+          <p:cNvPicPr>
+            <a:picLocks noChangeAspect="1"/>
+          </p:cNvPicPr>
+          <p:nvPr/>
+        </p:nvPicPr>
+        <p:blipFill>
+          <a:blip r:embed="rId4"/>
+          <a:stretch>
+            <a:fillRect/>
+          </a:stretch>
+        </p:blipFill>
+        <p:spPr>
+          <a:xfrm>
+            <a:off x="4989254" y="1828799"/>
+            <a:ext cx="3290132" cy="1974079"/>
+          </a:xfrm>
+          <a:prstGeom prst="rect">
+            <a:avLst/>
+          </a:prstGeom>
+        </p:spPr>
+      </p:pic>
+      <p:pic>
+        <p:nvPicPr>
+          <p:cNvPr id="6" name="Picture 5">
+            <a:extLst>
+              <a:ext uri="{FF2B5EF4-FFF2-40B4-BE49-F238E27FC236}">
+                <a16:creationId xmlns:a16="http://schemas.microsoft.com/office/drawing/2014/main" id="{D5646DDC-FE45-42B1-861F-4FC1D79FE5B5}"/>
+              </a:ext>
+            </a:extLst>
+          </p:cNvPr>
+          <p:cNvPicPr>
+            <a:picLocks noChangeAspect="1"/>
+          </p:cNvPicPr>
+          <p:nvPr/>
+        </p:nvPicPr>
+        <p:blipFill>
+          <a:blip r:embed="rId5"/>
+          <a:stretch>
+            <a:fillRect/>
+          </a:stretch>
+        </p:blipFill>
+        <p:spPr>
+          <a:xfrm>
+            <a:off x="4989254" y="4325120"/>
+            <a:ext cx="3205467" cy="1923280"/>
           </a:xfrm>
           <a:prstGeom prst="rect">
             <a:avLst/>
@@ -7073,36 +8610,6 @@
       </p:sp>
       <p:pic>
         <p:nvPicPr>
-          <p:cNvPr id="6" name="Picture 5">
-            <a:extLst>
-              <a:ext uri="{FF2B5EF4-FFF2-40B4-BE49-F238E27FC236}">
-                <a16:creationId xmlns:a16="http://schemas.microsoft.com/office/drawing/2014/main" id="{AC3B3065-FA90-4FAA-8457-281FBC1A377A}"/>
-              </a:ext>
-            </a:extLst>
-          </p:cNvPr>
-          <p:cNvPicPr>
-            <a:picLocks noChangeAspect="1"/>
-          </p:cNvPicPr>
-          <p:nvPr/>
-        </p:nvPicPr>
-        <p:blipFill>
-          <a:blip r:embed="rId2"/>
-          <a:stretch>
-            <a:fillRect/>
-          </a:stretch>
-        </p:blipFill>
-        <p:spPr>
-          <a:xfrm>
-            <a:off x="3723382" y="1930400"/>
-            <a:ext cx="5550620" cy="3428653"/>
-          </a:xfrm>
-          <a:prstGeom prst="rect">
-            <a:avLst/>
-          </a:prstGeom>
-        </p:spPr>
-      </p:pic>
-      <p:pic>
-        <p:nvPicPr>
           <p:cNvPr id="9" name="Picture 8">
             <a:extLst>
               <a:ext uri="{FF2B5EF4-FFF2-40B4-BE49-F238E27FC236}">
@@ -7125,6 +8632,66 @@
           <a:xfrm>
             <a:off x="1818826" y="2054349"/>
             <a:ext cx="2072193" cy="2903792"/>
+          </a:xfrm>
+          <a:prstGeom prst="rect">
+            <a:avLst/>
+          </a:prstGeom>
+        </p:spPr>
+      </p:pic>
+      <p:pic>
+        <p:nvPicPr>
+          <p:cNvPr id="3" name="Picture 2">
+            <a:extLst>
+              <a:ext uri="{FF2B5EF4-FFF2-40B4-BE49-F238E27FC236}">
+                <a16:creationId xmlns:a16="http://schemas.microsoft.com/office/drawing/2014/main" id="{A67A30F8-A6D4-4F0B-91B2-6838871293E6}"/>
+              </a:ext>
+            </a:extLst>
+          </p:cNvPr>
+          <p:cNvPicPr>
+            <a:picLocks noChangeAspect="1"/>
+          </p:cNvPicPr>
+          <p:nvPr/>
+        </p:nvPicPr>
+        <p:blipFill>
+          <a:blip r:embed="rId4"/>
+          <a:stretch>
+            <a:fillRect/>
+          </a:stretch>
+        </p:blipFill>
+        <p:spPr>
+          <a:xfrm>
+            <a:off x="4817533" y="1556179"/>
+            <a:ext cx="3565974" cy="2139585"/>
+          </a:xfrm>
+          <a:prstGeom prst="rect">
+            <a:avLst/>
+          </a:prstGeom>
+        </p:spPr>
+      </p:pic>
+      <p:pic>
+        <p:nvPicPr>
+          <p:cNvPr id="4" name="Picture 3">
+            <a:extLst>
+              <a:ext uri="{FF2B5EF4-FFF2-40B4-BE49-F238E27FC236}">
+                <a16:creationId xmlns:a16="http://schemas.microsoft.com/office/drawing/2014/main" id="{A5E8E59E-BBD6-4DF7-AEE5-D192B0956251}"/>
+              </a:ext>
+            </a:extLst>
+          </p:cNvPr>
+          <p:cNvPicPr>
+            <a:picLocks noChangeAspect="1"/>
+          </p:cNvPicPr>
+          <p:nvPr/>
+        </p:nvPicPr>
+        <p:blipFill>
+          <a:blip r:embed="rId5"/>
+          <a:stretch>
+            <a:fillRect/>
+          </a:stretch>
+        </p:blipFill>
+        <p:spPr>
+          <a:xfrm>
+            <a:off x="4817533" y="4232028"/>
+            <a:ext cx="3565975" cy="2139586"/>
           </a:xfrm>
           <a:prstGeom prst="rect">
             <a:avLst/>
@@ -7210,7 +8777,7 @@
           <a:bodyPr/>
           <a:lstStyle/>
           <a:p>
-            <a:endParaRPr lang="en-US"/>
+            <a:endParaRPr lang="en-US" dirty="0"/>
           </a:p>
         </p:txBody>
       </p:sp>
@@ -7623,7 +9190,7 @@
           <p:nvPr/>
         </p:nvPicPr>
         <p:blipFill>
-          <a:blip r:embed="rId2"/>
+          <a:blip r:embed="rId3"/>
           <a:stretch>
             <a:fillRect/>
           </a:stretch>
@@ -7653,14 +9220,14 @@
           <p:nvPr/>
         </p:nvPicPr>
         <p:blipFill>
-          <a:blip r:embed="rId3"/>
+          <a:blip r:embed="rId4"/>
           <a:stretch>
             <a:fillRect/>
           </a:stretch>
         </p:blipFill>
         <p:spPr>
           <a:xfrm>
-            <a:off x="889266" y="1930400"/>
+            <a:off x="796132" y="1930400"/>
             <a:ext cx="3546150" cy="3096117"/>
           </a:xfrm>
           <a:prstGeom prst="rect">
@@ -8440,7 +10007,7 @@
                 <a:latin typeface="Arial" panose="020B0604020202020204" pitchFamily="34" charset="0"/>
                 <a:cs typeface="Arial" panose="020B0604020202020204" pitchFamily="34" charset="0"/>
               </a:rPr>
-              <a:t>Data Imputation</a:t>
+              <a:t>Addressing Missing Data</a:t>
             </a:r>
           </a:p>
         </p:txBody>
@@ -8576,15 +10143,15 @@
           <p:nvPr/>
         </p:nvPicPr>
         <p:blipFill>
-          <a:blip r:embed="rId2"/>
+          <a:blip r:embed="rId3"/>
           <a:stretch>
             <a:fillRect/>
           </a:stretch>
         </p:blipFill>
         <p:spPr>
           <a:xfrm>
-            <a:off x="1499658" y="2407349"/>
-            <a:ext cx="6311111" cy="3898413"/>
+            <a:off x="7167034" y="1930400"/>
+            <a:ext cx="4572269" cy="2824319"/>
           </a:xfrm>
           <a:prstGeom prst="rect">
             <a:avLst/>
@@ -8605,7 +10172,7 @@
         </p:nvSpPr>
         <p:spPr>
           <a:xfrm>
-            <a:off x="1665962" y="5940623"/>
+            <a:off x="7167034" y="4856320"/>
             <a:ext cx="1469605" cy="307777"/>
           </a:xfrm>
           <a:prstGeom prst="rect">
@@ -8621,11 +10188,41 @@
           <a:p>
             <a:r>
               <a:rPr lang="en-US" sz="1400" dirty="0"/>
-              <a:t>Bud ABV:5%</a:t>
-            </a:r>
-          </a:p>
-        </p:txBody>
-      </p:sp>
+              <a:t>Bud ABV: .05</a:t>
+            </a:r>
+          </a:p>
+        </p:txBody>
+      </p:sp>
+      <p:pic>
+        <p:nvPicPr>
+          <p:cNvPr id="3" name="Picture 2">
+            <a:extLst>
+              <a:ext uri="{FF2B5EF4-FFF2-40B4-BE49-F238E27FC236}">
+                <a16:creationId xmlns:a16="http://schemas.microsoft.com/office/drawing/2014/main" id="{E8F8E485-EBC9-4B5C-B1E1-7E496D1716BF}"/>
+              </a:ext>
+            </a:extLst>
+          </p:cNvPr>
+          <p:cNvPicPr>
+            <a:picLocks noChangeAspect="1"/>
+          </p:cNvPicPr>
+          <p:nvPr/>
+        </p:nvPicPr>
+        <p:blipFill>
+          <a:blip r:embed="rId4"/>
+          <a:stretch>
+            <a:fillRect/>
+          </a:stretch>
+        </p:blipFill>
+        <p:spPr>
+          <a:xfrm>
+            <a:off x="550334" y="1991063"/>
+            <a:ext cx="5774266" cy="3562649"/>
+          </a:xfrm>
+          <a:prstGeom prst="rect">
+            <a:avLst/>
+          </a:prstGeom>
+        </p:spPr>
+      </p:pic>
     </p:spTree>
     <p:extLst>
       <p:ext uri="{BB962C8B-B14F-4D97-AF65-F5344CB8AC3E}">
@@ -8703,15 +10300,15 @@
           <p:nvPr/>
         </p:nvPicPr>
         <p:blipFill>
-          <a:blip r:embed="rId2"/>
+          <a:blip r:embed="rId3"/>
           <a:stretch>
             <a:fillRect/>
           </a:stretch>
         </p:blipFill>
         <p:spPr>
           <a:xfrm>
-            <a:off x="1429638" y="2571286"/>
-            <a:ext cx="5977002" cy="3686350"/>
+            <a:off x="7124700" y="1904846"/>
+            <a:ext cx="4584700" cy="2827640"/>
           </a:xfrm>
           <a:prstGeom prst="rect">
             <a:avLst/>
@@ -8733,15 +10330,45 @@
           <p:nvPr/>
         </p:nvPicPr>
         <p:blipFill>
-          <a:blip r:embed="rId3"/>
+          <a:blip r:embed="rId4"/>
           <a:stretch>
             <a:fillRect/>
           </a:stretch>
         </p:blipFill>
         <p:spPr>
           <a:xfrm>
-            <a:off x="1429638" y="6001490"/>
+            <a:off x="7124700" y="4732486"/>
             <a:ext cx="1658256" cy="493819"/>
+          </a:xfrm>
+          <a:prstGeom prst="rect">
+            <a:avLst/>
+          </a:prstGeom>
+        </p:spPr>
+      </p:pic>
+      <p:pic>
+        <p:nvPicPr>
+          <p:cNvPr id="4" name="Picture 3">
+            <a:extLst>
+              <a:ext uri="{FF2B5EF4-FFF2-40B4-BE49-F238E27FC236}">
+                <a16:creationId xmlns:a16="http://schemas.microsoft.com/office/drawing/2014/main" id="{0E28B4AE-CD82-4EF0-9036-D82C9F78AC1D}"/>
+              </a:ext>
+            </a:extLst>
+          </p:cNvPr>
+          <p:cNvPicPr>
+            <a:picLocks noChangeAspect="1"/>
+          </p:cNvPicPr>
+          <p:nvPr/>
+        </p:nvPicPr>
+        <p:blipFill>
+          <a:blip r:embed="rId5"/>
+          <a:stretch>
+            <a:fillRect/>
+          </a:stretch>
+        </p:blipFill>
+        <p:spPr>
+          <a:xfrm>
+            <a:off x="494292" y="1904846"/>
+            <a:ext cx="5804907" cy="3581554"/>
           </a:xfrm>
           <a:prstGeom prst="rect">
             <a:avLst/>
@@ -8827,7 +10454,7 @@
           <p:nvPr/>
         </p:nvPicPr>
         <p:blipFill>
-          <a:blip r:embed="rId2"/>
+          <a:blip r:embed="rId3"/>
           <a:stretch>
             <a:fillRect/>
           </a:stretch>
@@ -8857,7 +10484,7 @@
           <p:nvPr/>
         </p:nvPicPr>
         <p:blipFill>
-          <a:blip r:embed="rId3"/>
+          <a:blip r:embed="rId4"/>
           <a:stretch>
             <a:fillRect/>
           </a:stretch>
@@ -10036,10 +11663,10 @@
       </p:graphicFrame>
       <p:pic>
         <p:nvPicPr>
-          <p:cNvPr id="10" name="Picture 9">
+          <p:cNvPr id="3" name="Picture 2">
             <a:extLst>
               <a:ext uri="{FF2B5EF4-FFF2-40B4-BE49-F238E27FC236}">
-                <a16:creationId xmlns:a16="http://schemas.microsoft.com/office/drawing/2014/main" id="{845FAB86-6A34-4609-8646-09AEEC84B804}"/>
+                <a16:creationId xmlns:a16="http://schemas.microsoft.com/office/drawing/2014/main" id="{74D6463F-F5B9-4DEE-B8C2-E2616729314F}"/>
               </a:ext>
             </a:extLst>
           </p:cNvPr>
@@ -10056,8 +11683,8 @@
         </p:blipFill>
         <p:spPr>
           <a:xfrm>
-            <a:off x="4014499" y="1938867"/>
-            <a:ext cx="5472728" cy="3375337"/>
+            <a:off x="3987750" y="2021946"/>
+            <a:ext cx="5570223" cy="3342134"/>
           </a:xfrm>
           <a:prstGeom prst="rect">
             <a:avLst/>
@@ -10146,7 +11773,7 @@
           </p:nvPr>
         </p:nvPicPr>
         <p:blipFill>
-          <a:blip r:embed="rId2">
+          <a:blip r:embed="rId3">
             <a:extLst>
               <a:ext uri="{28A0092B-C50C-407E-A947-70E740481C1C}">
                 <a14:useLocalDpi xmlns:a14="http://schemas.microsoft.com/office/drawing/2010/main" val="0"/>

</xml_diff>